<commit_message>
Updated project file flow chart
Added Table 1 and Table 2
</commit_message>
<xml_diff>
--- a/images/project_file_flow_diagram.pptx
+++ b/images/project_file_flow_diagram.pptx
@@ -210,7 +210,7 @@
           <a:p>
             <a:fld id="{8FE2B474-E812-5843-ACE1-440DA6EE3C7C}" type="datetimeFigureOut">
               <a:rPr lang="en-US" smtClean="0"/>
-              <a:t>11/9/18</a:t>
+              <a:t>11/13/18</a:t>
             </a:fld>
             <a:endParaRPr lang="en-US"/>
           </a:p>
@@ -792,7 +792,7 @@
           <a:p>
             <a:fld id="{50C38AD0-C4FF-AF45-A138-96117B098541}" type="datetimeFigureOut">
               <a:rPr lang="en-US" smtClean="0"/>
-              <a:t>11/9/18</a:t>
+              <a:t>11/13/18</a:t>
             </a:fld>
             <a:endParaRPr lang="en-US"/>
           </a:p>
@@ -990,7 +990,7 @@
           <a:p>
             <a:fld id="{50C38AD0-C4FF-AF45-A138-96117B098541}" type="datetimeFigureOut">
               <a:rPr lang="en-US" smtClean="0"/>
-              <a:t>11/9/18</a:t>
+              <a:t>11/13/18</a:t>
             </a:fld>
             <a:endParaRPr lang="en-US"/>
           </a:p>
@@ -1198,7 +1198,7 @@
           <a:p>
             <a:fld id="{50C38AD0-C4FF-AF45-A138-96117B098541}" type="datetimeFigureOut">
               <a:rPr lang="en-US" smtClean="0"/>
-              <a:t>11/9/18</a:t>
+              <a:t>11/13/18</a:t>
             </a:fld>
             <a:endParaRPr lang="en-US"/>
           </a:p>
@@ -1396,7 +1396,7 @@
           <a:p>
             <a:fld id="{50C38AD0-C4FF-AF45-A138-96117B098541}" type="datetimeFigureOut">
               <a:rPr lang="en-US" smtClean="0"/>
-              <a:t>11/9/18</a:t>
+              <a:t>11/13/18</a:t>
             </a:fld>
             <a:endParaRPr lang="en-US"/>
           </a:p>
@@ -1671,7 +1671,7 @@
           <a:p>
             <a:fld id="{50C38AD0-C4FF-AF45-A138-96117B098541}" type="datetimeFigureOut">
               <a:rPr lang="en-US" smtClean="0"/>
-              <a:t>11/9/18</a:t>
+              <a:t>11/13/18</a:t>
             </a:fld>
             <a:endParaRPr lang="en-US"/>
           </a:p>
@@ -1936,7 +1936,7 @@
           <a:p>
             <a:fld id="{50C38AD0-C4FF-AF45-A138-96117B098541}" type="datetimeFigureOut">
               <a:rPr lang="en-US" smtClean="0"/>
-              <a:t>11/9/18</a:t>
+              <a:t>11/13/18</a:t>
             </a:fld>
             <a:endParaRPr lang="en-US"/>
           </a:p>
@@ -2348,7 +2348,7 @@
           <a:p>
             <a:fld id="{50C38AD0-C4FF-AF45-A138-96117B098541}" type="datetimeFigureOut">
               <a:rPr lang="en-US" smtClean="0"/>
-              <a:t>11/9/18</a:t>
+              <a:t>11/13/18</a:t>
             </a:fld>
             <a:endParaRPr lang="en-US"/>
           </a:p>
@@ -2489,7 +2489,7 @@
           <a:p>
             <a:fld id="{50C38AD0-C4FF-AF45-A138-96117B098541}" type="datetimeFigureOut">
               <a:rPr lang="en-US" smtClean="0"/>
-              <a:t>11/9/18</a:t>
+              <a:t>11/13/18</a:t>
             </a:fld>
             <a:endParaRPr lang="en-US"/>
           </a:p>
@@ -2602,7 +2602,7 @@
           <a:p>
             <a:fld id="{50C38AD0-C4FF-AF45-A138-96117B098541}" type="datetimeFigureOut">
               <a:rPr lang="en-US" smtClean="0"/>
-              <a:t>11/9/18</a:t>
+              <a:t>11/13/18</a:t>
             </a:fld>
             <a:endParaRPr lang="en-US"/>
           </a:p>
@@ -2913,7 +2913,7 @@
           <a:p>
             <a:fld id="{50C38AD0-C4FF-AF45-A138-96117B098541}" type="datetimeFigureOut">
               <a:rPr lang="en-US" smtClean="0"/>
-              <a:t>11/9/18</a:t>
+              <a:t>11/13/18</a:t>
             </a:fld>
             <a:endParaRPr lang="en-US"/>
           </a:p>
@@ -3201,7 +3201,7 @@
           <a:p>
             <a:fld id="{50C38AD0-C4FF-AF45-A138-96117B098541}" type="datetimeFigureOut">
               <a:rPr lang="en-US" smtClean="0"/>
-              <a:t>11/9/18</a:t>
+              <a:t>11/13/18</a:t>
             </a:fld>
             <a:endParaRPr lang="en-US"/>
           </a:p>
@@ -3442,7 +3442,7 @@
           <a:p>
             <a:fld id="{50C38AD0-C4FF-AF45-A138-96117B098541}" type="datetimeFigureOut">
               <a:rPr lang="en-US" smtClean="0"/>
-              <a:t>11/9/18</a:t>
+              <a:t>11/13/18</a:t>
             </a:fld>
             <a:endParaRPr lang="en-US"/>
           </a:p>
@@ -8466,6 +8466,448 @@
             <a:ext cx="278660" cy="991327"/>
           </a:xfrm>
           <a:prstGeom prst="bentConnector3">
+            <a:avLst/>
+          </a:prstGeom>
+          <a:ln>
+            <a:tailEnd type="triangle"/>
+          </a:ln>
+        </p:spPr>
+        <p:style>
+          <a:lnRef idx="1">
+            <a:schemeClr val="accent1"/>
+          </a:lnRef>
+          <a:fillRef idx="0">
+            <a:schemeClr val="accent1"/>
+          </a:fillRef>
+          <a:effectRef idx="0">
+            <a:schemeClr val="accent1"/>
+          </a:effectRef>
+          <a:fontRef idx="minor">
+            <a:schemeClr val="tx1"/>
+          </a:fontRef>
+        </p:style>
+      </p:cxnSp>
+      <p:sp>
+        <p:nvSpPr>
+          <p:cNvPr id="32" name="Rectangle 31">
+            <a:extLst>
+              <a:ext uri="{FF2B5EF4-FFF2-40B4-BE49-F238E27FC236}">
+                <a16:creationId xmlns:a16="http://schemas.microsoft.com/office/drawing/2014/main" id="{20FE9A9C-FA42-9C46-8FDE-7EBCA2C4E8FA}"/>
+              </a:ext>
+            </a:extLst>
+          </p:cNvPr>
+          <p:cNvSpPr/>
+          <p:nvPr/>
+        </p:nvSpPr>
+        <p:spPr>
+          <a:xfrm>
+            <a:off x="6464704" y="2773907"/>
+            <a:ext cx="2238721" cy="359595"/>
+          </a:xfrm>
+          <a:prstGeom prst="rect">
+            <a:avLst/>
+          </a:prstGeom>
+          <a:solidFill>
+            <a:schemeClr val="accent1">
+              <a:lumMod val="20000"/>
+              <a:lumOff val="80000"/>
+            </a:schemeClr>
+          </a:solidFill>
+          <a:ln>
+            <a:solidFill>
+              <a:schemeClr val="tx1"/>
+            </a:solidFill>
+          </a:ln>
+        </p:spPr>
+        <p:style>
+          <a:lnRef idx="2">
+            <a:schemeClr val="accent1">
+              <a:shade val="50000"/>
+            </a:schemeClr>
+          </a:lnRef>
+          <a:fillRef idx="1">
+            <a:schemeClr val="accent1"/>
+          </a:fillRef>
+          <a:effectRef idx="0">
+            <a:schemeClr val="accent1"/>
+          </a:effectRef>
+          <a:fontRef idx="minor">
+            <a:schemeClr val="lt1"/>
+          </a:fontRef>
+        </p:style>
+        <p:txBody>
+          <a:bodyPr rtlCol="0" anchor="ctr"/>
+          <a:lstStyle/>
+          <a:p>
+            <a:pPr algn="ctr"/>
+            <a:r>
+              <a:rPr lang="en-US" sz="1100" dirty="0" err="1">
+                <a:solidFill>
+                  <a:schemeClr val="tx1"/>
+                </a:solidFill>
+              </a:rPr>
+              <a:t>table_item_response_patterns.Rmd</a:t>
+            </a:r>
+            <a:endParaRPr lang="en-US" sz="1100" dirty="0">
+              <a:solidFill>
+                <a:schemeClr val="tx1"/>
+              </a:solidFill>
+            </a:endParaRPr>
+          </a:p>
+        </p:txBody>
+      </p:sp>
+      <p:sp>
+        <p:nvSpPr>
+          <p:cNvPr id="33" name="Rectangle 32">
+            <a:extLst>
+              <a:ext uri="{FF2B5EF4-FFF2-40B4-BE49-F238E27FC236}">
+                <a16:creationId xmlns:a16="http://schemas.microsoft.com/office/drawing/2014/main" id="{634E61C0-4C61-9F42-A9A7-ED9F4CCFFFF0}"/>
+              </a:ext>
+            </a:extLst>
+          </p:cNvPr>
+          <p:cNvSpPr/>
+          <p:nvPr/>
+        </p:nvSpPr>
+        <p:spPr>
+          <a:xfrm>
+            <a:off x="8798152" y="2765005"/>
+            <a:ext cx="1933580" cy="359595"/>
+          </a:xfrm>
+          <a:prstGeom prst="rect">
+            <a:avLst/>
+          </a:prstGeom>
+          <a:solidFill>
+            <a:schemeClr val="accent1">
+              <a:lumMod val="20000"/>
+              <a:lumOff val="80000"/>
+            </a:schemeClr>
+          </a:solidFill>
+          <a:ln>
+            <a:solidFill>
+              <a:schemeClr val="tx1"/>
+            </a:solidFill>
+          </a:ln>
+        </p:spPr>
+        <p:style>
+          <a:lnRef idx="2">
+            <a:schemeClr val="accent1">
+              <a:shade val="50000"/>
+            </a:schemeClr>
+          </a:lnRef>
+          <a:fillRef idx="1">
+            <a:schemeClr val="accent1"/>
+          </a:fillRef>
+          <a:effectRef idx="0">
+            <a:schemeClr val="accent1"/>
+          </a:effectRef>
+          <a:fontRef idx="minor">
+            <a:schemeClr val="lt1"/>
+          </a:fontRef>
+        </p:style>
+        <p:txBody>
+          <a:bodyPr rtlCol="0" anchor="ctr"/>
+          <a:lstStyle/>
+          <a:p>
+            <a:pPr algn="ctr"/>
+            <a:r>
+              <a:rPr lang="en-US" sz="1100" dirty="0" err="1">
+                <a:solidFill>
+                  <a:schemeClr val="tx1"/>
+                </a:solidFill>
+              </a:rPr>
+              <a:t>table_reporting_patterns.Rmd</a:t>
+            </a:r>
+            <a:endParaRPr lang="en-US" sz="1100" dirty="0">
+              <a:solidFill>
+                <a:schemeClr val="tx1"/>
+              </a:solidFill>
+            </a:endParaRPr>
+          </a:p>
+        </p:txBody>
+      </p:sp>
+      <p:cxnSp>
+        <p:nvCxnSpPr>
+          <p:cNvPr id="4" name="Elbow Connector 3">
+            <a:extLst>
+              <a:ext uri="{FF2B5EF4-FFF2-40B4-BE49-F238E27FC236}">
+                <a16:creationId xmlns:a16="http://schemas.microsoft.com/office/drawing/2014/main" id="{0239B887-24D2-7C47-AFA2-BD913F0CCEF0}"/>
+              </a:ext>
+            </a:extLst>
+          </p:cNvPr>
+          <p:cNvCxnSpPr>
+            <a:stCxn id="56" idx="2"/>
+            <a:endCxn id="32" idx="0"/>
+          </p:cNvCxnSpPr>
+          <p:nvPr/>
+        </p:nvCxnSpPr>
+        <p:spPr>
+          <a:xfrm rot="16200000" flipH="1">
+            <a:off x="6700702" y="1890544"/>
+            <a:ext cx="278660" cy="1488065"/>
+          </a:xfrm>
+          <a:prstGeom prst="bentConnector3">
+            <a:avLst/>
+          </a:prstGeom>
+          <a:ln>
+            <a:tailEnd type="triangle"/>
+          </a:ln>
+        </p:spPr>
+        <p:style>
+          <a:lnRef idx="1">
+            <a:schemeClr val="accent1"/>
+          </a:lnRef>
+          <a:fillRef idx="0">
+            <a:schemeClr val="accent1"/>
+          </a:fillRef>
+          <a:effectRef idx="0">
+            <a:schemeClr val="accent1"/>
+          </a:effectRef>
+          <a:fontRef idx="minor">
+            <a:schemeClr val="tx1"/>
+          </a:fontRef>
+        </p:style>
+      </p:cxnSp>
+      <p:cxnSp>
+        <p:nvCxnSpPr>
+          <p:cNvPr id="7" name="Elbow Connector 6">
+            <a:extLst>
+              <a:ext uri="{FF2B5EF4-FFF2-40B4-BE49-F238E27FC236}">
+                <a16:creationId xmlns:a16="http://schemas.microsoft.com/office/drawing/2014/main" id="{BECC7DEF-8BDC-E845-95CE-6625D7CA7573}"/>
+              </a:ext>
+            </a:extLst>
+          </p:cNvPr>
+          <p:cNvCxnSpPr>
+            <a:stCxn id="56" idx="2"/>
+            <a:endCxn id="33" idx="0"/>
+          </p:cNvCxnSpPr>
+          <p:nvPr/>
+        </p:nvCxnSpPr>
+        <p:spPr>
+          <a:xfrm rot="16200000" flipH="1">
+            <a:off x="7795592" y="795655"/>
+            <a:ext cx="269758" cy="3668942"/>
+          </a:xfrm>
+          <a:prstGeom prst="bentConnector3">
+            <a:avLst/>
+          </a:prstGeom>
+          <a:ln>
+            <a:tailEnd type="triangle"/>
+          </a:ln>
+        </p:spPr>
+        <p:style>
+          <a:lnRef idx="1">
+            <a:schemeClr val="accent1"/>
+          </a:lnRef>
+          <a:fillRef idx="0">
+            <a:schemeClr val="accent1"/>
+          </a:fillRef>
+          <a:effectRef idx="0">
+            <a:schemeClr val="accent1"/>
+          </a:effectRef>
+          <a:fontRef idx="minor">
+            <a:schemeClr val="tx1"/>
+          </a:fontRef>
+        </p:style>
+      </p:cxnSp>
+      <p:sp>
+        <p:nvSpPr>
+          <p:cNvPr id="35" name="Rectangle 34">
+            <a:extLst>
+              <a:ext uri="{FF2B5EF4-FFF2-40B4-BE49-F238E27FC236}">
+                <a16:creationId xmlns:a16="http://schemas.microsoft.com/office/drawing/2014/main" id="{E4471AE2-81CA-5D46-9293-78F35C44291C}"/>
+              </a:ext>
+            </a:extLst>
+          </p:cNvPr>
+          <p:cNvSpPr/>
+          <p:nvPr/>
+        </p:nvSpPr>
+        <p:spPr>
+          <a:xfrm>
+            <a:off x="6464703" y="3403260"/>
+            <a:ext cx="2238721" cy="359595"/>
+          </a:xfrm>
+          <a:prstGeom prst="rect">
+            <a:avLst/>
+          </a:prstGeom>
+          <a:solidFill>
+            <a:schemeClr val="accent6">
+              <a:lumMod val="20000"/>
+              <a:lumOff val="80000"/>
+            </a:schemeClr>
+          </a:solidFill>
+          <a:ln>
+            <a:solidFill>
+              <a:schemeClr val="tx1"/>
+            </a:solidFill>
+          </a:ln>
+        </p:spPr>
+        <p:style>
+          <a:lnRef idx="2">
+            <a:schemeClr val="accent1">
+              <a:shade val="50000"/>
+            </a:schemeClr>
+          </a:lnRef>
+          <a:fillRef idx="1">
+            <a:schemeClr val="accent1"/>
+          </a:fillRef>
+          <a:effectRef idx="0">
+            <a:schemeClr val="accent1"/>
+          </a:effectRef>
+          <a:fontRef idx="minor">
+            <a:schemeClr val="lt1"/>
+          </a:fontRef>
+        </p:style>
+        <p:txBody>
+          <a:bodyPr rtlCol="0" anchor="ctr"/>
+          <a:lstStyle/>
+          <a:p>
+            <a:pPr algn="ctr"/>
+            <a:r>
+              <a:rPr lang="en-US" sz="1100" dirty="0" err="1">
+                <a:solidFill>
+                  <a:schemeClr val="tx1"/>
+                </a:solidFill>
+              </a:rPr>
+              <a:t>table_item_response_patterns.docx</a:t>
+            </a:r>
+            <a:endParaRPr lang="en-US" sz="1100" dirty="0">
+              <a:solidFill>
+                <a:schemeClr val="tx1"/>
+              </a:solidFill>
+            </a:endParaRPr>
+          </a:p>
+        </p:txBody>
+      </p:sp>
+      <p:sp>
+        <p:nvSpPr>
+          <p:cNvPr id="37" name="Rectangle 36">
+            <a:extLst>
+              <a:ext uri="{FF2B5EF4-FFF2-40B4-BE49-F238E27FC236}">
+                <a16:creationId xmlns:a16="http://schemas.microsoft.com/office/drawing/2014/main" id="{18E15EAC-2BF2-7144-BED3-DB34EDCC4EAF}"/>
+              </a:ext>
+            </a:extLst>
+          </p:cNvPr>
+          <p:cNvSpPr/>
+          <p:nvPr/>
+        </p:nvSpPr>
+        <p:spPr>
+          <a:xfrm>
+            <a:off x="8798152" y="3410498"/>
+            <a:ext cx="1933580" cy="359595"/>
+          </a:xfrm>
+          <a:prstGeom prst="rect">
+            <a:avLst/>
+          </a:prstGeom>
+          <a:solidFill>
+            <a:schemeClr val="accent6">
+              <a:lumMod val="20000"/>
+              <a:lumOff val="80000"/>
+            </a:schemeClr>
+          </a:solidFill>
+          <a:ln>
+            <a:solidFill>
+              <a:schemeClr val="tx1"/>
+            </a:solidFill>
+          </a:ln>
+        </p:spPr>
+        <p:style>
+          <a:lnRef idx="2">
+            <a:schemeClr val="accent1">
+              <a:shade val="50000"/>
+            </a:schemeClr>
+          </a:lnRef>
+          <a:fillRef idx="1">
+            <a:schemeClr val="accent1"/>
+          </a:fillRef>
+          <a:effectRef idx="0">
+            <a:schemeClr val="accent1"/>
+          </a:effectRef>
+          <a:fontRef idx="minor">
+            <a:schemeClr val="lt1"/>
+          </a:fontRef>
+        </p:style>
+        <p:txBody>
+          <a:bodyPr rtlCol="0" anchor="ctr"/>
+          <a:lstStyle/>
+          <a:p>
+            <a:pPr algn="ctr"/>
+            <a:r>
+              <a:rPr lang="en-US" sz="1100" dirty="0" err="1">
+                <a:solidFill>
+                  <a:schemeClr val="tx1"/>
+                </a:solidFill>
+              </a:rPr>
+              <a:t>table_reporting_patterns.docx</a:t>
+            </a:r>
+            <a:endParaRPr lang="en-US" sz="1100" dirty="0">
+              <a:solidFill>
+                <a:schemeClr val="tx1"/>
+              </a:solidFill>
+            </a:endParaRPr>
+          </a:p>
+        </p:txBody>
+      </p:sp>
+      <p:cxnSp>
+        <p:nvCxnSpPr>
+          <p:cNvPr id="5" name="Straight Arrow Connector 4">
+            <a:extLst>
+              <a:ext uri="{FF2B5EF4-FFF2-40B4-BE49-F238E27FC236}">
+                <a16:creationId xmlns:a16="http://schemas.microsoft.com/office/drawing/2014/main" id="{90B3395E-0F02-9148-AF66-D1DEC198A4BE}"/>
+              </a:ext>
+            </a:extLst>
+          </p:cNvPr>
+          <p:cNvCxnSpPr>
+            <a:stCxn id="32" idx="2"/>
+          </p:cNvCxnSpPr>
+          <p:nvPr/>
+        </p:nvCxnSpPr>
+        <p:spPr>
+          <a:xfrm flipH="1">
+            <a:off x="7584063" y="3133502"/>
+            <a:ext cx="2" cy="269758"/>
+          </a:xfrm>
+          <a:prstGeom prst="straightConnector1">
+            <a:avLst/>
+          </a:prstGeom>
+          <a:ln>
+            <a:tailEnd type="triangle"/>
+          </a:ln>
+        </p:spPr>
+        <p:style>
+          <a:lnRef idx="1">
+            <a:schemeClr val="accent1"/>
+          </a:lnRef>
+          <a:fillRef idx="0">
+            <a:schemeClr val="accent1"/>
+          </a:fillRef>
+          <a:effectRef idx="0">
+            <a:schemeClr val="accent1"/>
+          </a:effectRef>
+          <a:fontRef idx="minor">
+            <a:schemeClr val="tx1"/>
+          </a:fontRef>
+        </p:style>
+      </p:cxnSp>
+      <p:cxnSp>
+        <p:nvCxnSpPr>
+          <p:cNvPr id="11" name="Straight Arrow Connector 10">
+            <a:extLst>
+              <a:ext uri="{FF2B5EF4-FFF2-40B4-BE49-F238E27FC236}">
+                <a16:creationId xmlns:a16="http://schemas.microsoft.com/office/drawing/2014/main" id="{DA6C22A1-501E-394E-985E-FAD7670F913C}"/>
+              </a:ext>
+            </a:extLst>
+          </p:cNvPr>
+          <p:cNvCxnSpPr>
+            <a:stCxn id="33" idx="2"/>
+          </p:cNvCxnSpPr>
+          <p:nvPr/>
+        </p:nvCxnSpPr>
+        <p:spPr>
+          <a:xfrm>
+            <a:off x="9764942" y="3124600"/>
+            <a:ext cx="0" cy="269759"/>
+          </a:xfrm>
+          <a:prstGeom prst="straightConnector1">
             <a:avLst/>
           </a:prstGeom>
           <a:ln>

</xml_diff>

<commit_message>
Updated project file flow diagram
Added/Repositioned
* analysis_detect_5wk_01_feasibility.nb.
html
* fig_2015_medic_reports_to_compliance.png
* fig_detect_5wk_screening_and_reporting_flow_diagram.jpg
* fig_responses_screenings_validation_line_graph.jpeg
* table_item_response_patterns.docx
</commit_message>
<xml_diff>
--- a/images/project_file_flow_diagram.pptx
+++ b/images/project_file_flow_diagram.pptx
@@ -210,7 +210,7 @@
           <a:p>
             <a:fld id="{8FE2B474-E812-5843-ACE1-440DA6EE3C7C}" type="datetimeFigureOut">
               <a:rPr lang="en-US" smtClean="0"/>
-              <a:t>11/13/18</a:t>
+              <a:t>11/19/18</a:t>
             </a:fld>
             <a:endParaRPr lang="en-US"/>
           </a:p>
@@ -792,7 +792,7 @@
           <a:p>
             <a:fld id="{50C38AD0-C4FF-AF45-A138-96117B098541}" type="datetimeFigureOut">
               <a:rPr lang="en-US" smtClean="0"/>
-              <a:t>11/13/18</a:t>
+              <a:t>11/19/18</a:t>
             </a:fld>
             <a:endParaRPr lang="en-US"/>
           </a:p>
@@ -990,7 +990,7 @@
           <a:p>
             <a:fld id="{50C38AD0-C4FF-AF45-A138-96117B098541}" type="datetimeFigureOut">
               <a:rPr lang="en-US" smtClean="0"/>
-              <a:t>11/13/18</a:t>
+              <a:t>11/19/18</a:t>
             </a:fld>
             <a:endParaRPr lang="en-US"/>
           </a:p>
@@ -1198,7 +1198,7 @@
           <a:p>
             <a:fld id="{50C38AD0-C4FF-AF45-A138-96117B098541}" type="datetimeFigureOut">
               <a:rPr lang="en-US" smtClean="0"/>
-              <a:t>11/13/18</a:t>
+              <a:t>11/19/18</a:t>
             </a:fld>
             <a:endParaRPr lang="en-US"/>
           </a:p>
@@ -1396,7 +1396,7 @@
           <a:p>
             <a:fld id="{50C38AD0-C4FF-AF45-A138-96117B098541}" type="datetimeFigureOut">
               <a:rPr lang="en-US" smtClean="0"/>
-              <a:t>11/13/18</a:t>
+              <a:t>11/19/18</a:t>
             </a:fld>
             <a:endParaRPr lang="en-US"/>
           </a:p>
@@ -1671,7 +1671,7 @@
           <a:p>
             <a:fld id="{50C38AD0-C4FF-AF45-A138-96117B098541}" type="datetimeFigureOut">
               <a:rPr lang="en-US" smtClean="0"/>
-              <a:t>11/13/18</a:t>
+              <a:t>11/19/18</a:t>
             </a:fld>
             <a:endParaRPr lang="en-US"/>
           </a:p>
@@ -1936,7 +1936,7 @@
           <a:p>
             <a:fld id="{50C38AD0-C4FF-AF45-A138-96117B098541}" type="datetimeFigureOut">
               <a:rPr lang="en-US" smtClean="0"/>
-              <a:t>11/13/18</a:t>
+              <a:t>11/19/18</a:t>
             </a:fld>
             <a:endParaRPr lang="en-US"/>
           </a:p>
@@ -2348,7 +2348,7 @@
           <a:p>
             <a:fld id="{50C38AD0-C4FF-AF45-A138-96117B098541}" type="datetimeFigureOut">
               <a:rPr lang="en-US" smtClean="0"/>
-              <a:t>11/13/18</a:t>
+              <a:t>11/19/18</a:t>
             </a:fld>
             <a:endParaRPr lang="en-US"/>
           </a:p>
@@ -2489,7 +2489,7 @@
           <a:p>
             <a:fld id="{50C38AD0-C4FF-AF45-A138-96117B098541}" type="datetimeFigureOut">
               <a:rPr lang="en-US" smtClean="0"/>
-              <a:t>11/13/18</a:t>
+              <a:t>11/19/18</a:t>
             </a:fld>
             <a:endParaRPr lang="en-US"/>
           </a:p>
@@ -2602,7 +2602,7 @@
           <a:p>
             <a:fld id="{50C38AD0-C4FF-AF45-A138-96117B098541}" type="datetimeFigureOut">
               <a:rPr lang="en-US" smtClean="0"/>
-              <a:t>11/13/18</a:t>
+              <a:t>11/19/18</a:t>
             </a:fld>
             <a:endParaRPr lang="en-US"/>
           </a:p>
@@ -2913,7 +2913,7 @@
           <a:p>
             <a:fld id="{50C38AD0-C4FF-AF45-A138-96117B098541}" type="datetimeFigureOut">
               <a:rPr lang="en-US" smtClean="0"/>
-              <a:t>11/13/18</a:t>
+              <a:t>11/19/18</a:t>
             </a:fld>
             <a:endParaRPr lang="en-US"/>
           </a:p>
@@ -3201,7 +3201,7 @@
           <a:p>
             <a:fld id="{50C38AD0-C4FF-AF45-A138-96117B098541}" type="datetimeFigureOut">
               <a:rPr lang="en-US" smtClean="0"/>
-              <a:t>11/13/18</a:t>
+              <a:t>11/19/18</a:t>
             </a:fld>
             <a:endParaRPr lang="en-US"/>
           </a:p>
@@ -3442,7 +3442,7 @@
           <a:p>
             <a:fld id="{50C38AD0-C4FF-AF45-A138-96117B098541}" type="datetimeFigureOut">
               <a:rPr lang="en-US" smtClean="0"/>
-              <a:t>11/13/18</a:t>
+              <a:t>11/19/18</a:t>
             </a:fld>
             <a:endParaRPr lang="en-US"/>
           </a:p>
@@ -7758,10 +7758,10 @@
       </p:cxnSp>
       <p:sp>
         <p:nvSpPr>
-          <p:cNvPr id="29" name="Rectangle 28">
-            <a:extLst>
-              <a:ext uri="{FF2B5EF4-FFF2-40B4-BE49-F238E27FC236}">
-                <a16:creationId xmlns:a16="http://schemas.microsoft.com/office/drawing/2014/main" id="{E439EC78-DE78-A44D-A8D3-C94BB25627C9}"/>
+          <p:cNvPr id="36" name="Rectangle 35">
+            <a:extLst>
+              <a:ext uri="{FF2B5EF4-FFF2-40B4-BE49-F238E27FC236}">
+                <a16:creationId xmlns:a16="http://schemas.microsoft.com/office/drawing/2014/main" id="{5F16A66C-2F0D-BA4E-B941-DC699B089F7D}"/>
               </a:ext>
             </a:extLst>
           </p:cNvPr>
@@ -7770,8 +7770,204 @@
         </p:nvSpPr>
         <p:spPr>
           <a:xfrm>
-            <a:off x="8161" y="3405361"/>
-            <a:ext cx="3730314" cy="359595"/>
+            <a:off x="8907694" y="1506297"/>
+            <a:ext cx="3284306" cy="359595"/>
+          </a:xfrm>
+          <a:prstGeom prst="rect">
+            <a:avLst/>
+          </a:prstGeom>
+          <a:solidFill>
+            <a:schemeClr val="accent1">
+              <a:lumMod val="20000"/>
+              <a:lumOff val="80000"/>
+            </a:schemeClr>
+          </a:solidFill>
+          <a:ln>
+            <a:solidFill>
+              <a:schemeClr val="tx1"/>
+            </a:solidFill>
+          </a:ln>
+        </p:spPr>
+        <p:style>
+          <a:lnRef idx="2">
+            <a:schemeClr val="accent1">
+              <a:shade val="50000"/>
+            </a:schemeClr>
+          </a:lnRef>
+          <a:fillRef idx="1">
+            <a:schemeClr val="accent1"/>
+          </a:fillRef>
+          <a:effectRef idx="0">
+            <a:schemeClr val="accent1"/>
+          </a:effectRef>
+          <a:fontRef idx="minor">
+            <a:schemeClr val="lt1"/>
+          </a:fontRef>
+        </p:style>
+        <p:txBody>
+          <a:bodyPr rtlCol="0" anchor="ctr"/>
+          <a:lstStyle/>
+          <a:p>
+            <a:pPr algn="ctr"/>
+            <a:r>
+              <a:rPr lang="en-US" sz="1100" dirty="0" err="1">
+                <a:solidFill>
+                  <a:schemeClr val="tx1"/>
+                </a:solidFill>
+              </a:rPr>
+              <a:t>fig_responses_screenings_validation_line_graph.Rmd</a:t>
+            </a:r>
+            <a:endParaRPr lang="en-US" sz="1100" dirty="0">
+              <a:solidFill>
+                <a:schemeClr val="tx1"/>
+              </a:solidFill>
+            </a:endParaRPr>
+          </a:p>
+        </p:txBody>
+      </p:sp>
+      <p:cxnSp>
+        <p:nvCxnSpPr>
+          <p:cNvPr id="31" name="Straight Arrow Connector 30">
+            <a:extLst>
+              <a:ext uri="{FF2B5EF4-FFF2-40B4-BE49-F238E27FC236}">
+                <a16:creationId xmlns:a16="http://schemas.microsoft.com/office/drawing/2014/main" id="{2FE661E6-5302-FF46-B024-C46B97E56C9C}"/>
+              </a:ext>
+            </a:extLst>
+          </p:cNvPr>
+          <p:cNvCxnSpPr>
+            <a:cxnSpLocks/>
+            <a:stCxn id="14" idx="2"/>
+            <a:endCxn id="36" idx="0"/>
+          </p:cNvCxnSpPr>
+          <p:nvPr/>
+        </p:nvCxnSpPr>
+        <p:spPr>
+          <a:xfrm>
+            <a:off x="10549847" y="1218735"/>
+            <a:ext cx="0" cy="287562"/>
+          </a:xfrm>
+          <a:prstGeom prst="straightConnector1">
+            <a:avLst/>
+          </a:prstGeom>
+          <a:ln>
+            <a:tailEnd type="triangle"/>
+          </a:ln>
+        </p:spPr>
+        <p:style>
+          <a:lnRef idx="1">
+            <a:schemeClr val="accent1"/>
+          </a:lnRef>
+          <a:fillRef idx="0">
+            <a:schemeClr val="accent1"/>
+          </a:fillRef>
+          <a:effectRef idx="0">
+            <a:schemeClr val="accent1"/>
+          </a:effectRef>
+          <a:fontRef idx="minor">
+            <a:schemeClr val="tx1"/>
+          </a:fontRef>
+        </p:style>
+      </p:cxnSp>
+      <p:cxnSp>
+        <p:nvCxnSpPr>
+          <p:cNvPr id="47" name="Elbow Connector 46">
+            <a:extLst>
+              <a:ext uri="{FF2B5EF4-FFF2-40B4-BE49-F238E27FC236}">
+                <a16:creationId xmlns:a16="http://schemas.microsoft.com/office/drawing/2014/main" id="{E6E89683-4CFB-3A4C-8D3D-6E85DC3DCCD9}"/>
+              </a:ext>
+            </a:extLst>
+          </p:cNvPr>
+          <p:cNvCxnSpPr>
+            <a:stCxn id="9" idx="2"/>
+            <a:endCxn id="15" idx="0"/>
+          </p:cNvCxnSpPr>
+          <p:nvPr/>
+        </p:nvCxnSpPr>
+        <p:spPr>
+          <a:xfrm rot="5400000">
+            <a:off x="6921268" y="447888"/>
+            <a:ext cx="279179" cy="544356"/>
+          </a:xfrm>
+          <a:prstGeom prst="bentConnector3">
+            <a:avLst/>
+          </a:prstGeom>
+          <a:ln>
+            <a:tailEnd type="triangle"/>
+          </a:ln>
+        </p:spPr>
+        <p:style>
+          <a:lnRef idx="1">
+            <a:schemeClr val="accent1"/>
+          </a:lnRef>
+          <a:fillRef idx="0">
+            <a:schemeClr val="accent1"/>
+          </a:fillRef>
+          <a:effectRef idx="0">
+            <a:schemeClr val="accent1"/>
+          </a:effectRef>
+          <a:fontRef idx="minor">
+            <a:schemeClr val="tx1"/>
+          </a:fontRef>
+        </p:style>
+      </p:cxnSp>
+      <p:cxnSp>
+        <p:nvCxnSpPr>
+          <p:cNvPr id="49" name="Elbow Connector 48">
+            <a:extLst>
+              <a:ext uri="{FF2B5EF4-FFF2-40B4-BE49-F238E27FC236}">
+                <a16:creationId xmlns:a16="http://schemas.microsoft.com/office/drawing/2014/main" id="{9546376F-07BF-1347-B194-B3BB98DA4AE6}"/>
+              </a:ext>
+            </a:extLst>
+          </p:cNvPr>
+          <p:cNvCxnSpPr>
+            <a:stCxn id="15" idx="2"/>
+            <a:endCxn id="60" idx="0"/>
+          </p:cNvCxnSpPr>
+          <p:nvPr/>
+        </p:nvCxnSpPr>
+        <p:spPr>
+          <a:xfrm rot="16200000" flipH="1">
+            <a:off x="6700712" y="1307217"/>
+            <a:ext cx="278145" cy="102211"/>
+          </a:xfrm>
+          <a:prstGeom prst="bentConnector3">
+            <a:avLst/>
+          </a:prstGeom>
+          <a:ln>
+            <a:tailEnd type="triangle"/>
+          </a:ln>
+        </p:spPr>
+        <p:style>
+          <a:lnRef idx="1">
+            <a:schemeClr val="accent1"/>
+          </a:lnRef>
+          <a:fillRef idx="0">
+            <a:schemeClr val="accent1"/>
+          </a:fillRef>
+          <a:effectRef idx="0">
+            <a:schemeClr val="accent1"/>
+          </a:effectRef>
+          <a:fontRef idx="minor">
+            <a:schemeClr val="tx1"/>
+          </a:fontRef>
+        </p:style>
+      </p:cxnSp>
+      <p:sp>
+        <p:nvSpPr>
+          <p:cNvPr id="51" name="Rectangle 50">
+            <a:extLst>
+              <a:ext uri="{FF2B5EF4-FFF2-40B4-BE49-F238E27FC236}">
+                <a16:creationId xmlns:a16="http://schemas.microsoft.com/office/drawing/2014/main" id="{FD9E4922-B048-9A4D-B421-8D9809F5EC1D}"/>
+              </a:ext>
+            </a:extLst>
+          </p:cNvPr>
+          <p:cNvSpPr/>
+          <p:nvPr/>
+        </p:nvSpPr>
+        <p:spPr>
+          <a:xfrm>
+            <a:off x="8907694" y="2135651"/>
+            <a:ext cx="3284306" cy="359595"/>
           </a:xfrm>
           <a:prstGeom prst="rect">
             <a:avLst/>
@@ -7810,22 +8006,175 @@
           <a:p>
             <a:pPr algn="ctr"/>
             <a:r>
+              <a:rPr lang="en-US" sz="1100" dirty="0" err="1">
+                <a:solidFill>
+                  <a:schemeClr val="tx1"/>
+                </a:solidFill>
+              </a:rPr>
+              <a:t>fig_responses_screenings_validation_line_graph.jpeg</a:t>
+            </a:r>
+            <a:endParaRPr lang="en-US" sz="1100" dirty="0">
+              <a:solidFill>
+                <a:schemeClr val="tx1"/>
+              </a:solidFill>
+            </a:endParaRPr>
+          </a:p>
+        </p:txBody>
+      </p:sp>
+      <p:cxnSp>
+        <p:nvCxnSpPr>
+          <p:cNvPr id="52" name="Straight Arrow Connector 51">
+            <a:extLst>
+              <a:ext uri="{FF2B5EF4-FFF2-40B4-BE49-F238E27FC236}">
+                <a16:creationId xmlns:a16="http://schemas.microsoft.com/office/drawing/2014/main" id="{83D714BC-5F3B-CA49-BDA0-A6D6D80F8628}"/>
+              </a:ext>
+            </a:extLst>
+          </p:cNvPr>
+          <p:cNvCxnSpPr>
+            <a:stCxn id="36" idx="2"/>
+            <a:endCxn id="51" idx="0"/>
+          </p:cNvCxnSpPr>
+          <p:nvPr/>
+        </p:nvCxnSpPr>
+        <p:spPr>
+          <a:xfrm>
+            <a:off x="10549847" y="1865892"/>
+            <a:ext cx="0" cy="269759"/>
+          </a:xfrm>
+          <a:prstGeom prst="straightConnector1">
+            <a:avLst/>
+          </a:prstGeom>
+          <a:ln>
+            <a:tailEnd type="triangle"/>
+          </a:ln>
+        </p:spPr>
+        <p:style>
+          <a:lnRef idx="1">
+            <a:schemeClr val="accent1"/>
+          </a:lnRef>
+          <a:fillRef idx="0">
+            <a:schemeClr val="accent1"/>
+          </a:fillRef>
+          <a:effectRef idx="0">
+            <a:schemeClr val="accent1"/>
+          </a:effectRef>
+          <a:fontRef idx="minor">
+            <a:schemeClr val="tx1"/>
+          </a:fontRef>
+        </p:style>
+      </p:cxnSp>
+      <p:sp>
+        <p:nvSpPr>
+          <p:cNvPr id="56" name="Rectangle 55">
+            <a:extLst>
+              <a:ext uri="{FF2B5EF4-FFF2-40B4-BE49-F238E27FC236}">
+                <a16:creationId xmlns:a16="http://schemas.microsoft.com/office/drawing/2014/main" id="{1AF02504-A0B1-1144-92D1-651CDBED0A39}"/>
+              </a:ext>
+            </a:extLst>
+          </p:cNvPr>
+          <p:cNvSpPr/>
+          <p:nvPr/>
+        </p:nvSpPr>
+        <p:spPr>
+          <a:xfrm>
+            <a:off x="5257800" y="2135652"/>
+            <a:ext cx="1676400" cy="359595"/>
+          </a:xfrm>
+          <a:prstGeom prst="rect">
+            <a:avLst/>
+          </a:prstGeom>
+          <a:solidFill>
+            <a:schemeClr val="accent2">
+              <a:lumMod val="20000"/>
+              <a:lumOff val="80000"/>
+            </a:schemeClr>
+          </a:solidFill>
+          <a:ln>
+            <a:solidFill>
+              <a:schemeClr val="tx1"/>
+            </a:solidFill>
+          </a:ln>
+        </p:spPr>
+        <p:style>
+          <a:lnRef idx="2">
+            <a:schemeClr val="accent1">
+              <a:shade val="50000"/>
+            </a:schemeClr>
+          </a:lnRef>
+          <a:fillRef idx="1">
+            <a:schemeClr val="accent1"/>
+          </a:fillRef>
+          <a:effectRef idx="0">
+            <a:schemeClr val="accent1"/>
+          </a:effectRef>
+          <a:fontRef idx="minor">
+            <a:schemeClr val="lt1"/>
+          </a:fontRef>
+        </p:style>
+        <p:txBody>
+          <a:bodyPr rtlCol="0" anchor="ctr"/>
+          <a:lstStyle/>
+          <a:p>
+            <a:pPr algn="ctr"/>
+            <a:r>
               <a:rPr lang="en-US" sz="1100" dirty="0">
                 <a:solidFill>
                   <a:schemeClr val="tx1"/>
                 </a:solidFill>
               </a:rPr>
-              <a:t>fig_detect_5wk_screening_and_reporting_flow_diagram.jpg</a:t>
-            </a:r>
-          </a:p>
-        </p:txBody>
-      </p:sp>
-      <p:sp>
-        <p:nvSpPr>
-          <p:cNvPr id="36" name="Rectangle 35">
-            <a:extLst>
-              <a:ext uri="{FF2B5EF4-FFF2-40B4-BE49-F238E27FC236}">
-                <a16:creationId xmlns:a16="http://schemas.microsoft.com/office/drawing/2014/main" id="{5F16A66C-2F0D-BA4E-B941-DC699B089F7D}"/>
+              <a:t>detect_5wk.feather</a:t>
+            </a:r>
+          </a:p>
+        </p:txBody>
+      </p:sp>
+      <p:cxnSp>
+        <p:nvCxnSpPr>
+          <p:cNvPr id="59" name="Elbow Connector 58">
+            <a:extLst>
+              <a:ext uri="{FF2B5EF4-FFF2-40B4-BE49-F238E27FC236}">
+                <a16:creationId xmlns:a16="http://schemas.microsoft.com/office/drawing/2014/main" id="{294455CC-5983-BE4E-8A53-5AF219BF7FB4}"/>
+              </a:ext>
+            </a:extLst>
+          </p:cNvPr>
+          <p:cNvCxnSpPr>
+            <a:stCxn id="60" idx="2"/>
+            <a:endCxn id="56" idx="0"/>
+          </p:cNvCxnSpPr>
+          <p:nvPr/>
+        </p:nvCxnSpPr>
+        <p:spPr>
+          <a:xfrm rot="5400000">
+            <a:off x="6354115" y="1598876"/>
+            <a:ext cx="278661" cy="794890"/>
+          </a:xfrm>
+          <a:prstGeom prst="bentConnector3">
+            <a:avLst/>
+          </a:prstGeom>
+          <a:ln>
+            <a:tailEnd type="triangle"/>
+          </a:ln>
+        </p:spPr>
+        <p:style>
+          <a:lnRef idx="1">
+            <a:schemeClr val="accent1"/>
+          </a:lnRef>
+          <a:fillRef idx="0">
+            <a:schemeClr val="accent1"/>
+          </a:fillRef>
+          <a:effectRef idx="0">
+            <a:schemeClr val="accent1"/>
+          </a:effectRef>
+          <a:fontRef idx="minor">
+            <a:schemeClr val="tx1"/>
+          </a:fontRef>
+        </p:style>
+      </p:cxnSp>
+      <p:sp>
+        <p:nvSpPr>
+          <p:cNvPr id="63" name="Rectangle 62">
+            <a:extLst>
+              <a:ext uri="{FF2B5EF4-FFF2-40B4-BE49-F238E27FC236}">
+                <a16:creationId xmlns:a16="http://schemas.microsoft.com/office/drawing/2014/main" id="{EDD27890-3D0F-164A-8800-09C5C850899B}"/>
               </a:ext>
             </a:extLst>
           </p:cNvPr>
@@ -7834,8 +8183,8 @@
         </p:nvSpPr>
         <p:spPr>
           <a:xfrm>
-            <a:off x="8907694" y="1506297"/>
-            <a:ext cx="3284306" cy="359595"/>
+            <a:off x="4689008" y="2778360"/>
+            <a:ext cx="2613606" cy="359595"/>
           </a:xfrm>
           <a:prstGeom prst="rect">
             <a:avLst/>
@@ -7874,12 +8223,140 @@
           <a:p>
             <a:pPr algn="ctr"/>
             <a:r>
+              <a:rPr lang="en-US" sz="1100" dirty="0">
+                <a:solidFill>
+                  <a:schemeClr val="tx1"/>
+                </a:solidFill>
+              </a:rPr>
+              <a:t>fig_detect_5wk_screening_and_reporting_flow_diagram.Rmd</a:t>
+            </a:r>
+          </a:p>
+        </p:txBody>
+      </p:sp>
+      <p:sp>
+        <p:nvSpPr>
+          <p:cNvPr id="69" name="Rectangle 68">
+            <a:extLst>
+              <a:ext uri="{FF2B5EF4-FFF2-40B4-BE49-F238E27FC236}">
+                <a16:creationId xmlns:a16="http://schemas.microsoft.com/office/drawing/2014/main" id="{6C70DA3E-D16E-9D45-ACF6-50BCC7DE31B1}"/>
+              </a:ext>
+            </a:extLst>
+          </p:cNvPr>
+          <p:cNvSpPr/>
+          <p:nvPr/>
+        </p:nvSpPr>
+        <p:spPr>
+          <a:xfrm>
+            <a:off x="79996" y="2778360"/>
+            <a:ext cx="2550187" cy="359595"/>
+          </a:xfrm>
+          <a:prstGeom prst="rect">
+            <a:avLst/>
+          </a:prstGeom>
+          <a:solidFill>
+            <a:schemeClr val="accent1">
+              <a:lumMod val="20000"/>
+              <a:lumOff val="80000"/>
+            </a:schemeClr>
+          </a:solidFill>
+          <a:ln>
+            <a:solidFill>
+              <a:schemeClr val="tx1"/>
+            </a:solidFill>
+          </a:ln>
+        </p:spPr>
+        <p:style>
+          <a:lnRef idx="2">
+            <a:schemeClr val="accent1">
+              <a:shade val="50000"/>
+            </a:schemeClr>
+          </a:lnRef>
+          <a:fillRef idx="1">
+            <a:schemeClr val="accent1"/>
+          </a:fillRef>
+          <a:effectRef idx="0">
+            <a:schemeClr val="accent1"/>
+          </a:effectRef>
+          <a:fontRef idx="minor">
+            <a:schemeClr val="lt1"/>
+          </a:fontRef>
+        </p:style>
+        <p:txBody>
+          <a:bodyPr rtlCol="0" anchor="ctr"/>
+          <a:lstStyle/>
+          <a:p>
+            <a:pPr algn="ctr"/>
+            <a:r>
+              <a:rPr lang="en-US" sz="1100" dirty="0">
+                <a:solidFill>
+                  <a:schemeClr val="tx1"/>
+                </a:solidFill>
+              </a:rPr>
+              <a:t>analysis_detect_5wk_01_feasibility.Rmd  </a:t>
+            </a:r>
+          </a:p>
+        </p:txBody>
+      </p:sp>
+      <p:sp>
+        <p:nvSpPr>
+          <p:cNvPr id="32" name="Rectangle 31">
+            <a:extLst>
+              <a:ext uri="{FF2B5EF4-FFF2-40B4-BE49-F238E27FC236}">
+                <a16:creationId xmlns:a16="http://schemas.microsoft.com/office/drawing/2014/main" id="{20FE9A9C-FA42-9C46-8FDE-7EBCA2C4E8FA}"/>
+              </a:ext>
+            </a:extLst>
+          </p:cNvPr>
+          <p:cNvSpPr/>
+          <p:nvPr/>
+        </p:nvSpPr>
+        <p:spPr>
+          <a:xfrm>
+            <a:off x="9794652" y="2778360"/>
+            <a:ext cx="2313432" cy="359595"/>
+          </a:xfrm>
+          <a:prstGeom prst="rect">
+            <a:avLst/>
+          </a:prstGeom>
+          <a:solidFill>
+            <a:schemeClr val="accent1">
+              <a:lumMod val="20000"/>
+              <a:lumOff val="80000"/>
+            </a:schemeClr>
+          </a:solidFill>
+          <a:ln>
+            <a:solidFill>
+              <a:schemeClr val="tx1"/>
+            </a:solidFill>
+          </a:ln>
+        </p:spPr>
+        <p:style>
+          <a:lnRef idx="2">
+            <a:schemeClr val="accent1">
+              <a:shade val="50000"/>
+            </a:schemeClr>
+          </a:lnRef>
+          <a:fillRef idx="1">
+            <a:schemeClr val="accent1"/>
+          </a:fillRef>
+          <a:effectRef idx="0">
+            <a:schemeClr val="accent1"/>
+          </a:effectRef>
+          <a:fontRef idx="minor">
+            <a:schemeClr val="lt1"/>
+          </a:fontRef>
+        </p:style>
+        <p:txBody>
+          <a:bodyPr rtlCol="0" anchor="ctr"/>
+          <a:lstStyle/>
+          <a:p>
+            <a:pPr algn="ctr"/>
+            <a:r>
               <a:rPr lang="en-US" sz="1100" dirty="0" err="1">
                 <a:solidFill>
                   <a:schemeClr val="tx1"/>
                 </a:solidFill>
               </a:rPr>
-              <a:t>fig_responses_screenings_validation_line_graph.Rmd</a:t>
+              <a:t>table_item_response_patterns.Rmd</a:t>
             </a:r>
             <a:endParaRPr lang="en-US" sz="1100" dirty="0">
               <a:solidFill>
@@ -7889,139 +8366,12 @@
           </a:p>
         </p:txBody>
       </p:sp>
-      <p:cxnSp>
-        <p:nvCxnSpPr>
-          <p:cNvPr id="31" name="Straight Arrow Connector 30">
-            <a:extLst>
-              <a:ext uri="{FF2B5EF4-FFF2-40B4-BE49-F238E27FC236}">
-                <a16:creationId xmlns:a16="http://schemas.microsoft.com/office/drawing/2014/main" id="{2FE661E6-5302-FF46-B024-C46B97E56C9C}"/>
-              </a:ext>
-            </a:extLst>
-          </p:cNvPr>
-          <p:cNvCxnSpPr>
-            <a:cxnSpLocks/>
-            <a:stCxn id="14" idx="2"/>
-            <a:endCxn id="36" idx="0"/>
-          </p:cNvCxnSpPr>
-          <p:nvPr/>
-        </p:nvCxnSpPr>
-        <p:spPr>
-          <a:xfrm>
-            <a:off x="10549847" y="1218735"/>
-            <a:ext cx="0" cy="287562"/>
-          </a:xfrm>
-          <a:prstGeom prst="straightConnector1">
-            <a:avLst/>
-          </a:prstGeom>
-          <a:ln>
-            <a:tailEnd type="triangle"/>
-          </a:ln>
-        </p:spPr>
-        <p:style>
-          <a:lnRef idx="1">
-            <a:schemeClr val="accent1"/>
-          </a:lnRef>
-          <a:fillRef idx="0">
-            <a:schemeClr val="accent1"/>
-          </a:fillRef>
-          <a:effectRef idx="0">
-            <a:schemeClr val="accent1"/>
-          </a:effectRef>
-          <a:fontRef idx="minor">
-            <a:schemeClr val="tx1"/>
-          </a:fontRef>
-        </p:style>
-      </p:cxnSp>
-      <p:cxnSp>
-        <p:nvCxnSpPr>
-          <p:cNvPr id="47" name="Elbow Connector 46">
-            <a:extLst>
-              <a:ext uri="{FF2B5EF4-FFF2-40B4-BE49-F238E27FC236}">
-                <a16:creationId xmlns:a16="http://schemas.microsoft.com/office/drawing/2014/main" id="{E6E89683-4CFB-3A4C-8D3D-6E85DC3DCCD9}"/>
-              </a:ext>
-            </a:extLst>
-          </p:cNvPr>
-          <p:cNvCxnSpPr>
-            <a:stCxn id="9" idx="2"/>
-            <a:endCxn id="15" idx="0"/>
-          </p:cNvCxnSpPr>
-          <p:nvPr/>
-        </p:nvCxnSpPr>
-        <p:spPr>
-          <a:xfrm rot="5400000">
-            <a:off x="6921268" y="447888"/>
-            <a:ext cx="279179" cy="544356"/>
-          </a:xfrm>
-          <a:prstGeom prst="bentConnector3">
-            <a:avLst/>
-          </a:prstGeom>
-          <a:ln>
-            <a:tailEnd type="triangle"/>
-          </a:ln>
-        </p:spPr>
-        <p:style>
-          <a:lnRef idx="1">
-            <a:schemeClr val="accent1"/>
-          </a:lnRef>
-          <a:fillRef idx="0">
-            <a:schemeClr val="accent1"/>
-          </a:fillRef>
-          <a:effectRef idx="0">
-            <a:schemeClr val="accent1"/>
-          </a:effectRef>
-          <a:fontRef idx="minor">
-            <a:schemeClr val="tx1"/>
-          </a:fontRef>
-        </p:style>
-      </p:cxnSp>
-      <p:cxnSp>
-        <p:nvCxnSpPr>
-          <p:cNvPr id="49" name="Elbow Connector 48">
-            <a:extLst>
-              <a:ext uri="{FF2B5EF4-FFF2-40B4-BE49-F238E27FC236}">
-                <a16:creationId xmlns:a16="http://schemas.microsoft.com/office/drawing/2014/main" id="{9546376F-07BF-1347-B194-B3BB98DA4AE6}"/>
-              </a:ext>
-            </a:extLst>
-          </p:cNvPr>
-          <p:cNvCxnSpPr>
-            <a:stCxn id="15" idx="2"/>
-            <a:endCxn id="60" idx="0"/>
-          </p:cNvCxnSpPr>
-          <p:nvPr/>
-        </p:nvCxnSpPr>
-        <p:spPr>
-          <a:xfrm rot="16200000" flipH="1">
-            <a:off x="6700712" y="1307217"/>
-            <a:ext cx="278145" cy="102211"/>
-          </a:xfrm>
-          <a:prstGeom prst="bentConnector3">
-            <a:avLst/>
-          </a:prstGeom>
-          <a:ln>
-            <a:tailEnd type="triangle"/>
-          </a:ln>
-        </p:spPr>
-        <p:style>
-          <a:lnRef idx="1">
-            <a:schemeClr val="accent1"/>
-          </a:lnRef>
-          <a:fillRef idx="0">
-            <a:schemeClr val="accent1"/>
-          </a:fillRef>
-          <a:effectRef idx="0">
-            <a:schemeClr val="accent1"/>
-          </a:effectRef>
-          <a:fontRef idx="minor">
-            <a:schemeClr val="tx1"/>
-          </a:fontRef>
-        </p:style>
-      </p:cxnSp>
-      <p:sp>
-        <p:nvSpPr>
-          <p:cNvPr id="51" name="Rectangle 50">
-            <a:extLst>
-              <a:ext uri="{FF2B5EF4-FFF2-40B4-BE49-F238E27FC236}">
-                <a16:creationId xmlns:a16="http://schemas.microsoft.com/office/drawing/2014/main" id="{FD9E4922-B048-9A4D-B421-8D9809F5EC1D}"/>
+      <p:sp>
+        <p:nvSpPr>
+          <p:cNvPr id="35" name="Rectangle 34">
+            <a:extLst>
+              <a:ext uri="{FF2B5EF4-FFF2-40B4-BE49-F238E27FC236}">
+                <a16:creationId xmlns:a16="http://schemas.microsoft.com/office/drawing/2014/main" id="{E4471AE2-81CA-5D46-9293-78F35C44291C}"/>
               </a:ext>
             </a:extLst>
           </p:cNvPr>
@@ -8030,8 +8380,8 @@
         </p:nvSpPr>
         <p:spPr>
           <a:xfrm>
-            <a:off x="8907694" y="2135651"/>
-            <a:ext cx="3284306" cy="359595"/>
+            <a:off x="9832008" y="3410219"/>
+            <a:ext cx="2238721" cy="359595"/>
           </a:xfrm>
           <a:prstGeom prst="rect">
             <a:avLst/>
@@ -8075,7 +8425,7 @@
                   <a:schemeClr val="tx1"/>
                 </a:solidFill>
               </a:rPr>
-              <a:t>fig_responses_screenings_validation_line_graph.jpeg</a:t>
+              <a:t>table_item_response_patterns.docx</a:t>
             </a:r>
             <a:endParaRPr lang="en-US" sz="1100" dirty="0">
               <a:solidFill>
@@ -8085,54 +8435,12 @@
           </a:p>
         </p:txBody>
       </p:sp>
-      <p:cxnSp>
-        <p:nvCxnSpPr>
-          <p:cNvPr id="52" name="Straight Arrow Connector 51">
-            <a:extLst>
-              <a:ext uri="{FF2B5EF4-FFF2-40B4-BE49-F238E27FC236}">
-                <a16:creationId xmlns:a16="http://schemas.microsoft.com/office/drawing/2014/main" id="{83D714BC-5F3B-CA49-BDA0-A6D6D80F8628}"/>
-              </a:ext>
-            </a:extLst>
-          </p:cNvPr>
-          <p:cNvCxnSpPr>
-            <a:stCxn id="36" idx="2"/>
-            <a:endCxn id="51" idx="0"/>
-          </p:cNvCxnSpPr>
-          <p:nvPr/>
-        </p:nvCxnSpPr>
-        <p:spPr>
-          <a:xfrm>
-            <a:off x="10549847" y="1865892"/>
-            <a:ext cx="0" cy="269759"/>
-          </a:xfrm>
-          <a:prstGeom prst="straightConnector1">
-            <a:avLst/>
-          </a:prstGeom>
-          <a:ln>
-            <a:tailEnd type="triangle"/>
-          </a:ln>
-        </p:spPr>
-        <p:style>
-          <a:lnRef idx="1">
-            <a:schemeClr val="accent1"/>
-          </a:lnRef>
-          <a:fillRef idx="0">
-            <a:schemeClr val="accent1"/>
-          </a:fillRef>
-          <a:effectRef idx="0">
-            <a:schemeClr val="accent1"/>
-          </a:effectRef>
-          <a:fontRef idx="minor">
-            <a:schemeClr val="tx1"/>
-          </a:fontRef>
-        </p:style>
-      </p:cxnSp>
-      <p:sp>
-        <p:nvSpPr>
-          <p:cNvPr id="56" name="Rectangle 55">
-            <a:extLst>
-              <a:ext uri="{FF2B5EF4-FFF2-40B4-BE49-F238E27FC236}">
-                <a16:creationId xmlns:a16="http://schemas.microsoft.com/office/drawing/2014/main" id="{1AF02504-A0B1-1144-92D1-651CDBED0A39}"/>
+      <p:sp>
+        <p:nvSpPr>
+          <p:cNvPr id="38" name="Rectangle 37">
+            <a:extLst>
+              <a:ext uri="{FF2B5EF4-FFF2-40B4-BE49-F238E27FC236}">
+                <a16:creationId xmlns:a16="http://schemas.microsoft.com/office/drawing/2014/main" id="{BBE9DDF5-8D0B-FD48-8BDD-9AB4C7C97839}"/>
               </a:ext>
             </a:extLst>
           </p:cNvPr>
@@ -8141,114 +8449,8 @@
         </p:nvSpPr>
         <p:spPr>
           <a:xfrm>
-            <a:off x="5257800" y="2135652"/>
-            <a:ext cx="1676400" cy="359595"/>
-          </a:xfrm>
-          <a:prstGeom prst="rect">
-            <a:avLst/>
-          </a:prstGeom>
-          <a:solidFill>
-            <a:schemeClr val="accent2">
-              <a:lumMod val="20000"/>
-              <a:lumOff val="80000"/>
-            </a:schemeClr>
-          </a:solidFill>
-          <a:ln>
-            <a:solidFill>
-              <a:schemeClr val="tx1"/>
-            </a:solidFill>
-          </a:ln>
-        </p:spPr>
-        <p:style>
-          <a:lnRef idx="2">
-            <a:schemeClr val="accent1">
-              <a:shade val="50000"/>
-            </a:schemeClr>
-          </a:lnRef>
-          <a:fillRef idx="1">
-            <a:schemeClr val="accent1"/>
-          </a:fillRef>
-          <a:effectRef idx="0">
-            <a:schemeClr val="accent1"/>
-          </a:effectRef>
-          <a:fontRef idx="minor">
-            <a:schemeClr val="lt1"/>
-          </a:fontRef>
-        </p:style>
-        <p:txBody>
-          <a:bodyPr rtlCol="0" anchor="ctr"/>
-          <a:lstStyle/>
-          <a:p>
-            <a:pPr algn="ctr"/>
-            <a:r>
-              <a:rPr lang="en-US" sz="1100" dirty="0">
-                <a:solidFill>
-                  <a:schemeClr val="tx1"/>
-                </a:solidFill>
-              </a:rPr>
-              <a:t>detect_5wk.feather</a:t>
-            </a:r>
-          </a:p>
-        </p:txBody>
-      </p:sp>
-      <p:cxnSp>
-        <p:nvCxnSpPr>
-          <p:cNvPr id="59" name="Elbow Connector 58">
-            <a:extLst>
-              <a:ext uri="{FF2B5EF4-FFF2-40B4-BE49-F238E27FC236}">
-                <a16:creationId xmlns:a16="http://schemas.microsoft.com/office/drawing/2014/main" id="{294455CC-5983-BE4E-8A53-5AF219BF7FB4}"/>
-              </a:ext>
-            </a:extLst>
-          </p:cNvPr>
-          <p:cNvCxnSpPr>
-            <a:stCxn id="60" idx="2"/>
-            <a:endCxn id="56" idx="0"/>
-          </p:cNvCxnSpPr>
-          <p:nvPr/>
-        </p:nvCxnSpPr>
-        <p:spPr>
-          <a:xfrm rot="5400000">
-            <a:off x="6354115" y="1598876"/>
-            <a:ext cx="278661" cy="794890"/>
-          </a:xfrm>
-          <a:prstGeom prst="bentConnector3">
-            <a:avLst/>
-          </a:prstGeom>
-          <a:ln>
-            <a:tailEnd type="triangle"/>
-          </a:ln>
-        </p:spPr>
-        <p:style>
-          <a:lnRef idx="1">
-            <a:schemeClr val="accent1"/>
-          </a:lnRef>
-          <a:fillRef idx="0">
-            <a:schemeClr val="accent1"/>
-          </a:fillRef>
-          <a:effectRef idx="0">
-            <a:schemeClr val="accent1"/>
-          </a:effectRef>
-          <a:fontRef idx="minor">
-            <a:schemeClr val="tx1"/>
-          </a:fontRef>
-        </p:style>
-      </p:cxnSp>
-      <p:sp>
-        <p:nvSpPr>
-          <p:cNvPr id="63" name="Rectangle 62">
-            <a:extLst>
-              <a:ext uri="{FF2B5EF4-FFF2-40B4-BE49-F238E27FC236}">
-                <a16:creationId xmlns:a16="http://schemas.microsoft.com/office/drawing/2014/main" id="{EDD27890-3D0F-164A-8800-09C5C850899B}"/>
-              </a:ext>
-            </a:extLst>
-          </p:cNvPr>
-          <p:cNvSpPr/>
-          <p:nvPr/>
-        </p:nvSpPr>
-        <p:spPr>
-          <a:xfrm>
-            <a:off x="1995" y="2773908"/>
-            <a:ext cx="3742646" cy="359595"/>
+            <a:off x="2718832" y="2778360"/>
+            <a:ext cx="1881527" cy="359595"/>
           </a:xfrm>
           <a:prstGeom prst="rect">
             <a:avLst/>
@@ -8292,101 +8494,17 @@
                   <a:schemeClr val="tx1"/>
                 </a:solidFill>
               </a:rPr>
-              <a:t>fig_detect_5wk_screening_and_reporting_flow_diagram.Rmd</a:t>
-            </a:r>
-          </a:p>
-        </p:txBody>
-      </p:sp>
-      <p:cxnSp>
-        <p:nvCxnSpPr>
-          <p:cNvPr id="65" name="Straight Arrow Connector 64">
-            <a:extLst>
-              <a:ext uri="{FF2B5EF4-FFF2-40B4-BE49-F238E27FC236}">
-                <a16:creationId xmlns:a16="http://schemas.microsoft.com/office/drawing/2014/main" id="{E992FCB4-D8E0-DB41-9CF4-6AC63F43399A}"/>
-              </a:ext>
-            </a:extLst>
-          </p:cNvPr>
-          <p:cNvCxnSpPr>
-            <a:stCxn id="63" idx="2"/>
-            <a:endCxn id="29" idx="0"/>
-          </p:cNvCxnSpPr>
-          <p:nvPr/>
-        </p:nvCxnSpPr>
-        <p:spPr>
-          <a:xfrm>
-            <a:off x="1873318" y="3133503"/>
-            <a:ext cx="0" cy="271858"/>
-          </a:xfrm>
-          <a:prstGeom prst="straightConnector1">
-            <a:avLst/>
-          </a:prstGeom>
-          <a:ln>
-            <a:tailEnd type="triangle"/>
-          </a:ln>
-        </p:spPr>
-        <p:style>
-          <a:lnRef idx="1">
-            <a:schemeClr val="accent1"/>
-          </a:lnRef>
-          <a:fillRef idx="0">
-            <a:schemeClr val="accent1"/>
-          </a:fillRef>
-          <a:effectRef idx="0">
-            <a:schemeClr val="accent1"/>
-          </a:effectRef>
-          <a:fontRef idx="minor">
-            <a:schemeClr val="tx1"/>
-          </a:fontRef>
-        </p:style>
-      </p:cxnSp>
-      <p:cxnSp>
-        <p:nvCxnSpPr>
-          <p:cNvPr id="68" name="Elbow Connector 67">
-            <a:extLst>
-              <a:ext uri="{FF2B5EF4-FFF2-40B4-BE49-F238E27FC236}">
-                <a16:creationId xmlns:a16="http://schemas.microsoft.com/office/drawing/2014/main" id="{ECDD09C3-FD22-6949-B55A-5A5E19149450}"/>
-              </a:ext>
-            </a:extLst>
-          </p:cNvPr>
-          <p:cNvCxnSpPr>
-            <a:stCxn id="56" idx="2"/>
-            <a:endCxn id="63" idx="0"/>
-          </p:cNvCxnSpPr>
-          <p:nvPr/>
-        </p:nvCxnSpPr>
-        <p:spPr>
-          <a:xfrm rot="5400000">
-            <a:off x="3845329" y="523236"/>
-            <a:ext cx="278661" cy="4222682"/>
-          </a:xfrm>
-          <a:prstGeom prst="bentConnector3">
-            <a:avLst/>
-          </a:prstGeom>
-          <a:ln>
-            <a:tailEnd type="triangle"/>
-          </a:ln>
-        </p:spPr>
-        <p:style>
-          <a:lnRef idx="1">
-            <a:schemeClr val="accent1"/>
-          </a:lnRef>
-          <a:fillRef idx="0">
-            <a:schemeClr val="accent1"/>
-          </a:fillRef>
-          <a:effectRef idx="0">
-            <a:schemeClr val="accent1"/>
-          </a:effectRef>
-          <a:fontRef idx="minor">
-            <a:schemeClr val="tx1"/>
-          </a:fontRef>
-        </p:style>
-      </p:cxnSp>
-      <p:sp>
-        <p:nvSpPr>
-          <p:cNvPr id="69" name="Rectangle 68">
-            <a:extLst>
-              <a:ext uri="{FF2B5EF4-FFF2-40B4-BE49-F238E27FC236}">
-                <a16:creationId xmlns:a16="http://schemas.microsoft.com/office/drawing/2014/main" id="{6C70DA3E-D16E-9D45-ACF6-50BCC7DE31B1}"/>
+              <a:t>fig_2015_medic_reports_to_compliance.Rmd      </a:t>
+            </a:r>
+          </a:p>
+        </p:txBody>
+      </p:sp>
+      <p:sp>
+        <p:nvSpPr>
+          <p:cNvPr id="41" name="Rectangle 40">
+            <a:extLst>
+              <a:ext uri="{FF2B5EF4-FFF2-40B4-BE49-F238E27FC236}">
+                <a16:creationId xmlns:a16="http://schemas.microsoft.com/office/drawing/2014/main" id="{455A5C7C-7B29-E744-878B-AD76F541CA81}"/>
               </a:ext>
             </a:extLst>
           </p:cNvPr>
@@ -8395,8 +8513,8 @@
         </p:nvSpPr>
         <p:spPr>
           <a:xfrm>
-            <a:off x="3839367" y="2773907"/>
-            <a:ext cx="2530611" cy="359595"/>
+            <a:off x="7391263" y="2778360"/>
+            <a:ext cx="2314741" cy="359595"/>
           </a:xfrm>
           <a:prstGeom prst="rect">
             <a:avLst/>
@@ -8440,32 +8558,31 @@
                   <a:schemeClr val="tx1"/>
                 </a:solidFill>
               </a:rPr>
-              <a:t>analysis_detect_5wk_01_feasibility.Rmd</a:t>
+              <a:t>fig_responses_screenings_validation_line_graph.Rmd</a:t>
             </a:r>
           </a:p>
         </p:txBody>
       </p:sp>
       <p:cxnSp>
         <p:nvCxnSpPr>
-          <p:cNvPr id="71" name="Elbow Connector 70">
-            <a:extLst>
-              <a:ext uri="{FF2B5EF4-FFF2-40B4-BE49-F238E27FC236}">
-                <a16:creationId xmlns:a16="http://schemas.microsoft.com/office/drawing/2014/main" id="{8E6412AC-F6D3-674D-A017-BEE4A15FDC05}"/>
+          <p:cNvPr id="13" name="Straight Arrow Connector 12">
+            <a:extLst>
+              <a:ext uri="{FF2B5EF4-FFF2-40B4-BE49-F238E27FC236}">
+                <a16:creationId xmlns:a16="http://schemas.microsoft.com/office/drawing/2014/main" id="{41C4E77F-06C7-7E41-8B7A-943633BA9E29}"/>
               </a:ext>
             </a:extLst>
           </p:cNvPr>
           <p:cNvCxnSpPr>
-            <a:stCxn id="56" idx="2"/>
-            <a:endCxn id="69" idx="0"/>
+            <a:endCxn id="35" idx="0"/>
           </p:cNvCxnSpPr>
           <p:nvPr/>
         </p:nvCxnSpPr>
         <p:spPr>
-          <a:xfrm rot="5400000">
-            <a:off x="5461007" y="2138914"/>
-            <a:ext cx="278660" cy="991327"/>
-          </a:xfrm>
-          <a:prstGeom prst="bentConnector3">
+          <a:xfrm>
+            <a:off x="10951368" y="3137955"/>
+            <a:ext cx="1" cy="272264"/>
+          </a:xfrm>
+          <a:prstGeom prst="straightConnector1">
             <a:avLst/>
           </a:prstGeom>
           <a:ln>
@@ -8489,10 +8606,10 @@
       </p:cxnSp>
       <p:sp>
         <p:nvSpPr>
-          <p:cNvPr id="32" name="Rectangle 31">
-            <a:extLst>
-              <a:ext uri="{FF2B5EF4-FFF2-40B4-BE49-F238E27FC236}">
-                <a16:creationId xmlns:a16="http://schemas.microsoft.com/office/drawing/2014/main" id="{20FE9A9C-FA42-9C46-8FDE-7EBCA2C4E8FA}"/>
+          <p:cNvPr id="48" name="Rectangle 47">
+            <a:extLst>
+              <a:ext uri="{FF2B5EF4-FFF2-40B4-BE49-F238E27FC236}">
+                <a16:creationId xmlns:a16="http://schemas.microsoft.com/office/drawing/2014/main" id="{220C3A60-BF72-764F-B01F-AC7311DD2787}"/>
               </a:ext>
             </a:extLst>
           </p:cNvPr>
@@ -8501,230 +8618,8 @@
         </p:nvSpPr>
         <p:spPr>
           <a:xfrm>
-            <a:off x="6464704" y="2773907"/>
-            <a:ext cx="2238721" cy="359595"/>
-          </a:xfrm>
-          <a:prstGeom prst="rect">
-            <a:avLst/>
-          </a:prstGeom>
-          <a:solidFill>
-            <a:schemeClr val="accent1">
-              <a:lumMod val="20000"/>
-              <a:lumOff val="80000"/>
-            </a:schemeClr>
-          </a:solidFill>
-          <a:ln>
-            <a:solidFill>
-              <a:schemeClr val="tx1"/>
-            </a:solidFill>
-          </a:ln>
-        </p:spPr>
-        <p:style>
-          <a:lnRef idx="2">
-            <a:schemeClr val="accent1">
-              <a:shade val="50000"/>
-            </a:schemeClr>
-          </a:lnRef>
-          <a:fillRef idx="1">
-            <a:schemeClr val="accent1"/>
-          </a:fillRef>
-          <a:effectRef idx="0">
-            <a:schemeClr val="accent1"/>
-          </a:effectRef>
-          <a:fontRef idx="minor">
-            <a:schemeClr val="lt1"/>
-          </a:fontRef>
-        </p:style>
-        <p:txBody>
-          <a:bodyPr rtlCol="0" anchor="ctr"/>
-          <a:lstStyle/>
-          <a:p>
-            <a:pPr algn="ctr"/>
-            <a:r>
-              <a:rPr lang="en-US" sz="1100" dirty="0" err="1">
-                <a:solidFill>
-                  <a:schemeClr val="tx1"/>
-                </a:solidFill>
-              </a:rPr>
-              <a:t>table_item_response_patterns.Rmd</a:t>
-            </a:r>
-            <a:endParaRPr lang="en-US" sz="1100" dirty="0">
-              <a:solidFill>
-                <a:schemeClr val="tx1"/>
-              </a:solidFill>
-            </a:endParaRPr>
-          </a:p>
-        </p:txBody>
-      </p:sp>
-      <p:sp>
-        <p:nvSpPr>
-          <p:cNvPr id="33" name="Rectangle 32">
-            <a:extLst>
-              <a:ext uri="{FF2B5EF4-FFF2-40B4-BE49-F238E27FC236}">
-                <a16:creationId xmlns:a16="http://schemas.microsoft.com/office/drawing/2014/main" id="{634E61C0-4C61-9F42-A9A7-ED9F4CCFFFF0}"/>
-              </a:ext>
-            </a:extLst>
-          </p:cNvPr>
-          <p:cNvSpPr/>
-          <p:nvPr/>
-        </p:nvSpPr>
-        <p:spPr>
-          <a:xfrm>
-            <a:off x="8798152" y="2765005"/>
-            <a:ext cx="1933580" cy="359595"/>
-          </a:xfrm>
-          <a:prstGeom prst="rect">
-            <a:avLst/>
-          </a:prstGeom>
-          <a:solidFill>
-            <a:schemeClr val="accent1">
-              <a:lumMod val="20000"/>
-              <a:lumOff val="80000"/>
-            </a:schemeClr>
-          </a:solidFill>
-          <a:ln>
-            <a:solidFill>
-              <a:schemeClr val="tx1"/>
-            </a:solidFill>
-          </a:ln>
-        </p:spPr>
-        <p:style>
-          <a:lnRef idx="2">
-            <a:schemeClr val="accent1">
-              <a:shade val="50000"/>
-            </a:schemeClr>
-          </a:lnRef>
-          <a:fillRef idx="1">
-            <a:schemeClr val="accent1"/>
-          </a:fillRef>
-          <a:effectRef idx="0">
-            <a:schemeClr val="accent1"/>
-          </a:effectRef>
-          <a:fontRef idx="minor">
-            <a:schemeClr val="lt1"/>
-          </a:fontRef>
-        </p:style>
-        <p:txBody>
-          <a:bodyPr rtlCol="0" anchor="ctr"/>
-          <a:lstStyle/>
-          <a:p>
-            <a:pPr algn="ctr"/>
-            <a:r>
-              <a:rPr lang="en-US" sz="1100" dirty="0" err="1">
-                <a:solidFill>
-                  <a:schemeClr val="tx1"/>
-                </a:solidFill>
-              </a:rPr>
-              <a:t>table_reporting_patterns.Rmd</a:t>
-            </a:r>
-            <a:endParaRPr lang="en-US" sz="1100" dirty="0">
-              <a:solidFill>
-                <a:schemeClr val="tx1"/>
-              </a:solidFill>
-            </a:endParaRPr>
-          </a:p>
-        </p:txBody>
-      </p:sp>
-      <p:cxnSp>
-        <p:nvCxnSpPr>
-          <p:cNvPr id="4" name="Elbow Connector 3">
-            <a:extLst>
-              <a:ext uri="{FF2B5EF4-FFF2-40B4-BE49-F238E27FC236}">
-                <a16:creationId xmlns:a16="http://schemas.microsoft.com/office/drawing/2014/main" id="{0239B887-24D2-7C47-AFA2-BD913F0CCEF0}"/>
-              </a:ext>
-            </a:extLst>
-          </p:cNvPr>
-          <p:cNvCxnSpPr>
-            <a:stCxn id="56" idx="2"/>
-            <a:endCxn id="32" idx="0"/>
-          </p:cNvCxnSpPr>
-          <p:nvPr/>
-        </p:nvCxnSpPr>
-        <p:spPr>
-          <a:xfrm rot="16200000" flipH="1">
-            <a:off x="6700702" y="1890544"/>
-            <a:ext cx="278660" cy="1488065"/>
-          </a:xfrm>
-          <a:prstGeom prst="bentConnector3">
-            <a:avLst/>
-          </a:prstGeom>
-          <a:ln>
-            <a:tailEnd type="triangle"/>
-          </a:ln>
-        </p:spPr>
-        <p:style>
-          <a:lnRef idx="1">
-            <a:schemeClr val="accent1"/>
-          </a:lnRef>
-          <a:fillRef idx="0">
-            <a:schemeClr val="accent1"/>
-          </a:fillRef>
-          <a:effectRef idx="0">
-            <a:schemeClr val="accent1"/>
-          </a:effectRef>
-          <a:fontRef idx="minor">
-            <a:schemeClr val="tx1"/>
-          </a:fontRef>
-        </p:style>
-      </p:cxnSp>
-      <p:cxnSp>
-        <p:nvCxnSpPr>
-          <p:cNvPr id="7" name="Elbow Connector 6">
-            <a:extLst>
-              <a:ext uri="{FF2B5EF4-FFF2-40B4-BE49-F238E27FC236}">
-                <a16:creationId xmlns:a16="http://schemas.microsoft.com/office/drawing/2014/main" id="{BECC7DEF-8BDC-E845-95CE-6625D7CA7573}"/>
-              </a:ext>
-            </a:extLst>
-          </p:cNvPr>
-          <p:cNvCxnSpPr>
-            <a:stCxn id="56" idx="2"/>
-            <a:endCxn id="33" idx="0"/>
-          </p:cNvCxnSpPr>
-          <p:nvPr/>
-        </p:nvCxnSpPr>
-        <p:spPr>
-          <a:xfrm rot="16200000" flipH="1">
-            <a:off x="7795592" y="795655"/>
-            <a:ext cx="269758" cy="3668942"/>
-          </a:xfrm>
-          <a:prstGeom prst="bentConnector3">
-            <a:avLst/>
-          </a:prstGeom>
-          <a:ln>
-            <a:tailEnd type="triangle"/>
-          </a:ln>
-        </p:spPr>
-        <p:style>
-          <a:lnRef idx="1">
-            <a:schemeClr val="accent1"/>
-          </a:lnRef>
-          <a:fillRef idx="0">
-            <a:schemeClr val="accent1"/>
-          </a:fillRef>
-          <a:effectRef idx="0">
-            <a:schemeClr val="accent1"/>
-          </a:effectRef>
-          <a:fontRef idx="minor">
-            <a:schemeClr val="tx1"/>
-          </a:fontRef>
-        </p:style>
-      </p:cxnSp>
-      <p:sp>
-        <p:nvSpPr>
-          <p:cNvPr id="35" name="Rectangle 34">
-            <a:extLst>
-              <a:ext uri="{FF2B5EF4-FFF2-40B4-BE49-F238E27FC236}">
-                <a16:creationId xmlns:a16="http://schemas.microsoft.com/office/drawing/2014/main" id="{E4471AE2-81CA-5D46-9293-78F35C44291C}"/>
-              </a:ext>
-            </a:extLst>
-          </p:cNvPr>
-          <p:cNvSpPr/>
-          <p:nvPr/>
-        </p:nvSpPr>
-        <p:spPr>
-          <a:xfrm>
-            <a:off x="6464703" y="3403260"/>
-            <a:ext cx="2238721" cy="359595"/>
+            <a:off x="79996" y="3410218"/>
+            <a:ext cx="2550187" cy="359595"/>
           </a:xfrm>
           <a:prstGeom prst="rect">
             <a:avLst/>
@@ -8763,27 +8658,33 @@
           <a:p>
             <a:pPr algn="ctr"/>
             <a:r>
-              <a:rPr lang="en-US" sz="1100" dirty="0" err="1">
+              <a:rPr lang="en-US" sz="1100" dirty="0">
                 <a:solidFill>
                   <a:schemeClr val="tx1"/>
                 </a:solidFill>
               </a:rPr>
-              <a:t>table_item_response_patterns.docx</a:t>
-            </a:r>
-            <a:endParaRPr lang="en-US" sz="1100" dirty="0">
-              <a:solidFill>
-                <a:schemeClr val="tx1"/>
-              </a:solidFill>
-            </a:endParaRPr>
-          </a:p>
-        </p:txBody>
-      </p:sp>
-      <p:sp>
-        <p:nvSpPr>
-          <p:cNvPr id="37" name="Rectangle 36">
-            <a:extLst>
-              <a:ext uri="{FF2B5EF4-FFF2-40B4-BE49-F238E27FC236}">
-                <a16:creationId xmlns:a16="http://schemas.microsoft.com/office/drawing/2014/main" id="{18E15EAC-2BF2-7144-BED3-DB34EDCC4EAF}"/>
+              <a:t>analysis_detect_5wk_01_feasibility.nb.</a:t>
+            </a:r>
+          </a:p>
+          <a:p>
+            <a:pPr algn="ctr"/>
+            <a:r>
+              <a:rPr lang="en-US" sz="1100" dirty="0">
+                <a:solidFill>
+                  <a:schemeClr val="tx1"/>
+                </a:solidFill>
+              </a:rPr>
+              <a:t>html</a:t>
+            </a:r>
+          </a:p>
+        </p:txBody>
+      </p:sp>
+      <p:sp>
+        <p:nvSpPr>
+          <p:cNvPr id="50" name="Rectangle 49">
+            <a:extLst>
+              <a:ext uri="{FF2B5EF4-FFF2-40B4-BE49-F238E27FC236}">
+                <a16:creationId xmlns:a16="http://schemas.microsoft.com/office/drawing/2014/main" id="{C6899DAF-AB10-EC4C-BCEE-2CFAD5902879}"/>
               </a:ext>
             </a:extLst>
           </p:cNvPr>
@@ -8792,8 +8693,8 @@
         </p:nvSpPr>
         <p:spPr>
           <a:xfrm>
-            <a:off x="8798152" y="3410498"/>
-            <a:ext cx="1933580" cy="359595"/>
+            <a:off x="2723832" y="3410218"/>
+            <a:ext cx="1881527" cy="359595"/>
           </a:xfrm>
           <a:prstGeom prst="rect">
             <a:avLst/>
@@ -8832,12 +8733,140 @@
           <a:p>
             <a:pPr algn="ctr"/>
             <a:r>
+              <a:rPr lang="en-US" sz="1100" dirty="0">
+                <a:solidFill>
+                  <a:schemeClr val="tx1"/>
+                </a:solidFill>
+              </a:rPr>
+              <a:t>fig_2015_medic_reports_to_compliance.png      </a:t>
+            </a:r>
+          </a:p>
+        </p:txBody>
+      </p:sp>
+      <p:sp>
+        <p:nvSpPr>
+          <p:cNvPr id="53" name="Rectangle 52">
+            <a:extLst>
+              <a:ext uri="{FF2B5EF4-FFF2-40B4-BE49-F238E27FC236}">
+                <a16:creationId xmlns:a16="http://schemas.microsoft.com/office/drawing/2014/main" id="{5D3C8E0C-97FF-D84A-9801-566ADB694C5B}"/>
+              </a:ext>
+            </a:extLst>
+          </p:cNvPr>
+          <p:cNvSpPr/>
+          <p:nvPr/>
+        </p:nvSpPr>
+        <p:spPr>
+          <a:xfrm>
+            <a:off x="4687442" y="3406849"/>
+            <a:ext cx="2613606" cy="359595"/>
+          </a:xfrm>
+          <a:prstGeom prst="rect">
+            <a:avLst/>
+          </a:prstGeom>
+          <a:solidFill>
+            <a:schemeClr val="accent6">
+              <a:lumMod val="20000"/>
+              <a:lumOff val="80000"/>
+            </a:schemeClr>
+          </a:solidFill>
+          <a:ln>
+            <a:solidFill>
+              <a:schemeClr val="tx1"/>
+            </a:solidFill>
+          </a:ln>
+        </p:spPr>
+        <p:style>
+          <a:lnRef idx="2">
+            <a:schemeClr val="accent1">
+              <a:shade val="50000"/>
+            </a:schemeClr>
+          </a:lnRef>
+          <a:fillRef idx="1">
+            <a:schemeClr val="accent1"/>
+          </a:fillRef>
+          <a:effectRef idx="0">
+            <a:schemeClr val="accent1"/>
+          </a:effectRef>
+          <a:fontRef idx="minor">
+            <a:schemeClr val="lt1"/>
+          </a:fontRef>
+        </p:style>
+        <p:txBody>
+          <a:bodyPr rtlCol="0" anchor="ctr"/>
+          <a:lstStyle/>
+          <a:p>
+            <a:pPr algn="ctr"/>
+            <a:r>
+              <a:rPr lang="en-US" sz="1100" dirty="0">
+                <a:solidFill>
+                  <a:schemeClr val="tx1"/>
+                </a:solidFill>
+              </a:rPr>
+              <a:t>fig_detect_5wk_screening_and_reporting_flow_diagram.jpg</a:t>
+            </a:r>
+          </a:p>
+        </p:txBody>
+      </p:sp>
+      <p:sp>
+        <p:nvSpPr>
+          <p:cNvPr id="54" name="Rectangle 53">
+            <a:extLst>
+              <a:ext uri="{FF2B5EF4-FFF2-40B4-BE49-F238E27FC236}">
+                <a16:creationId xmlns:a16="http://schemas.microsoft.com/office/drawing/2014/main" id="{F5E26A8C-C69F-4446-8E80-E8AEB80BA4C9}"/>
+              </a:ext>
+            </a:extLst>
+          </p:cNvPr>
+          <p:cNvSpPr/>
+          <p:nvPr/>
+        </p:nvSpPr>
+        <p:spPr>
+          <a:xfrm>
+            <a:off x="7389041" y="3403480"/>
+            <a:ext cx="2314741" cy="359595"/>
+          </a:xfrm>
+          <a:prstGeom prst="rect">
+            <a:avLst/>
+          </a:prstGeom>
+          <a:solidFill>
+            <a:schemeClr val="accent6">
+              <a:lumMod val="20000"/>
+              <a:lumOff val="80000"/>
+            </a:schemeClr>
+          </a:solidFill>
+          <a:ln>
+            <a:solidFill>
+              <a:schemeClr val="tx1"/>
+            </a:solidFill>
+          </a:ln>
+        </p:spPr>
+        <p:style>
+          <a:lnRef idx="2">
+            <a:schemeClr val="accent1">
+              <a:shade val="50000"/>
+            </a:schemeClr>
+          </a:lnRef>
+          <a:fillRef idx="1">
+            <a:schemeClr val="accent1"/>
+          </a:fillRef>
+          <a:effectRef idx="0">
+            <a:schemeClr val="accent1"/>
+          </a:effectRef>
+          <a:fontRef idx="minor">
+            <a:schemeClr val="lt1"/>
+          </a:fontRef>
+        </p:style>
+        <p:txBody>
+          <a:bodyPr rtlCol="0" anchor="ctr"/>
+          <a:lstStyle/>
+          <a:p>
+            <a:pPr algn="ctr"/>
+            <a:r>
               <a:rPr lang="en-US" sz="1100" dirty="0" err="1">
                 <a:solidFill>
                   <a:schemeClr val="tx1"/>
                 </a:solidFill>
               </a:rPr>
-              <a:t>table_reporting_patterns.docx</a:t>
+              <a:t>fig_responses_screenings_validation_line_graph.jpeg</a:t>
             </a:r>
             <a:endParaRPr lang="en-US" sz="1100" dirty="0">
               <a:solidFill>
@@ -8849,24 +8878,25 @@
       </p:sp>
       <p:cxnSp>
         <p:nvCxnSpPr>
-          <p:cNvPr id="5" name="Straight Arrow Connector 4">
-            <a:extLst>
-              <a:ext uri="{FF2B5EF4-FFF2-40B4-BE49-F238E27FC236}">
-                <a16:creationId xmlns:a16="http://schemas.microsoft.com/office/drawing/2014/main" id="{90B3395E-0F02-9148-AF66-D1DEC198A4BE}"/>
+          <p:cNvPr id="21" name="Elbow Connector 20">
+            <a:extLst>
+              <a:ext uri="{FF2B5EF4-FFF2-40B4-BE49-F238E27FC236}">
+                <a16:creationId xmlns:a16="http://schemas.microsoft.com/office/drawing/2014/main" id="{126059CB-91B7-2B42-8322-4BC50945124F}"/>
               </a:ext>
             </a:extLst>
           </p:cNvPr>
           <p:cNvCxnSpPr>
-            <a:stCxn id="32" idx="2"/>
+            <a:stCxn id="56" idx="2"/>
+            <a:endCxn id="38" idx="0"/>
           </p:cNvCxnSpPr>
           <p:nvPr/>
         </p:nvCxnSpPr>
         <p:spPr>
-          <a:xfrm flipH="1">
-            <a:off x="7584063" y="3133502"/>
-            <a:ext cx="2" cy="269758"/>
-          </a:xfrm>
-          <a:prstGeom prst="straightConnector1">
+          <a:xfrm rot="5400000">
+            <a:off x="4736242" y="1418601"/>
+            <a:ext cx="283113" cy="2436404"/>
+          </a:xfrm>
+          <a:prstGeom prst="bentConnector3">
             <a:avLst/>
           </a:prstGeom>
           <a:ln>
@@ -8890,22 +8920,274 @@
       </p:cxnSp>
       <p:cxnSp>
         <p:nvCxnSpPr>
-          <p:cNvPr id="11" name="Straight Arrow Connector 10">
-            <a:extLst>
-              <a:ext uri="{FF2B5EF4-FFF2-40B4-BE49-F238E27FC236}">
-                <a16:creationId xmlns:a16="http://schemas.microsoft.com/office/drawing/2014/main" id="{DA6C22A1-501E-394E-985E-FAD7670F913C}"/>
+          <p:cNvPr id="23" name="Elbow Connector 22">
+            <a:extLst>
+              <a:ext uri="{FF2B5EF4-FFF2-40B4-BE49-F238E27FC236}">
+                <a16:creationId xmlns:a16="http://schemas.microsoft.com/office/drawing/2014/main" id="{E27CAFF2-1528-2140-95AE-1F086DAC6ACF}"/>
               </a:ext>
             </a:extLst>
           </p:cNvPr>
           <p:cNvCxnSpPr>
-            <a:stCxn id="33" idx="2"/>
+            <a:stCxn id="56" idx="2"/>
+            <a:endCxn id="41" idx="0"/>
           </p:cNvCxnSpPr>
           <p:nvPr/>
         </p:nvCxnSpPr>
         <p:spPr>
+          <a:xfrm rot="16200000" flipH="1">
+            <a:off x="7180761" y="1410486"/>
+            <a:ext cx="283113" cy="2452634"/>
+          </a:xfrm>
+          <a:prstGeom prst="bentConnector3">
+            <a:avLst/>
+          </a:prstGeom>
+          <a:ln>
+            <a:tailEnd type="triangle"/>
+          </a:ln>
+        </p:spPr>
+        <p:style>
+          <a:lnRef idx="1">
+            <a:schemeClr val="accent1"/>
+          </a:lnRef>
+          <a:fillRef idx="0">
+            <a:schemeClr val="accent1"/>
+          </a:fillRef>
+          <a:effectRef idx="0">
+            <a:schemeClr val="accent1"/>
+          </a:effectRef>
+          <a:fontRef idx="minor">
+            <a:schemeClr val="tx1"/>
+          </a:fontRef>
+        </p:style>
+      </p:cxnSp>
+      <p:cxnSp>
+        <p:nvCxnSpPr>
+          <p:cNvPr id="25" name="Elbow Connector 24">
+            <a:extLst>
+              <a:ext uri="{FF2B5EF4-FFF2-40B4-BE49-F238E27FC236}">
+                <a16:creationId xmlns:a16="http://schemas.microsoft.com/office/drawing/2014/main" id="{25A36005-2FB4-014A-97CA-DFFF2CD42025}"/>
+              </a:ext>
+            </a:extLst>
+          </p:cNvPr>
+          <p:cNvCxnSpPr>
+            <a:stCxn id="56" idx="2"/>
+            <a:endCxn id="69" idx="0"/>
+          </p:cNvCxnSpPr>
+          <p:nvPr/>
+        </p:nvCxnSpPr>
+        <p:spPr>
+          <a:xfrm rot="5400000">
+            <a:off x="3583989" y="266348"/>
+            <a:ext cx="283113" cy="4740910"/>
+          </a:xfrm>
+          <a:prstGeom prst="bentConnector3">
+            <a:avLst/>
+          </a:prstGeom>
+          <a:ln>
+            <a:tailEnd type="triangle"/>
+          </a:ln>
+        </p:spPr>
+        <p:style>
+          <a:lnRef idx="1">
+            <a:schemeClr val="accent1"/>
+          </a:lnRef>
+          <a:fillRef idx="0">
+            <a:schemeClr val="accent1"/>
+          </a:fillRef>
+          <a:effectRef idx="0">
+            <a:schemeClr val="accent1"/>
+          </a:effectRef>
+          <a:fontRef idx="minor">
+            <a:schemeClr val="tx1"/>
+          </a:fontRef>
+        </p:style>
+      </p:cxnSp>
+      <p:cxnSp>
+        <p:nvCxnSpPr>
+          <p:cNvPr id="27" name="Elbow Connector 26">
+            <a:extLst>
+              <a:ext uri="{FF2B5EF4-FFF2-40B4-BE49-F238E27FC236}">
+                <a16:creationId xmlns:a16="http://schemas.microsoft.com/office/drawing/2014/main" id="{FCE421CD-0424-F441-BD50-0AB44260EF4C}"/>
+              </a:ext>
+            </a:extLst>
+          </p:cNvPr>
+          <p:cNvCxnSpPr>
+            <a:stCxn id="56" idx="2"/>
+            <a:endCxn id="32" idx="0"/>
+          </p:cNvCxnSpPr>
+          <p:nvPr/>
+        </p:nvCxnSpPr>
+        <p:spPr>
+          <a:xfrm rot="16200000" flipH="1">
+            <a:off x="8382128" y="209119"/>
+            <a:ext cx="283113" cy="4855368"/>
+          </a:xfrm>
+          <a:prstGeom prst="bentConnector3">
+            <a:avLst/>
+          </a:prstGeom>
+          <a:ln>
+            <a:tailEnd type="triangle"/>
+          </a:ln>
+        </p:spPr>
+        <p:style>
+          <a:lnRef idx="1">
+            <a:schemeClr val="accent1"/>
+          </a:lnRef>
+          <a:fillRef idx="0">
+            <a:schemeClr val="accent1"/>
+          </a:fillRef>
+          <a:effectRef idx="0">
+            <a:schemeClr val="accent1"/>
+          </a:effectRef>
+          <a:fontRef idx="minor">
+            <a:schemeClr val="tx1"/>
+          </a:fontRef>
+        </p:style>
+      </p:cxnSp>
+      <p:cxnSp>
+        <p:nvCxnSpPr>
+          <p:cNvPr id="30" name="Straight Arrow Connector 29">
+            <a:extLst>
+              <a:ext uri="{FF2B5EF4-FFF2-40B4-BE49-F238E27FC236}">
+                <a16:creationId xmlns:a16="http://schemas.microsoft.com/office/drawing/2014/main" id="{B33A5E8F-FE53-264A-90AB-ED91905E11E6}"/>
+              </a:ext>
+            </a:extLst>
+          </p:cNvPr>
+          <p:cNvCxnSpPr>
+            <a:stCxn id="41" idx="2"/>
+            <a:endCxn id="54" idx="0"/>
+          </p:cNvCxnSpPr>
+          <p:nvPr/>
+        </p:nvCxnSpPr>
+        <p:spPr>
+          <a:xfrm flipH="1">
+            <a:off x="8546412" y="3137955"/>
+            <a:ext cx="2222" cy="265525"/>
+          </a:xfrm>
+          <a:prstGeom prst="straightConnector1">
+            <a:avLst/>
+          </a:prstGeom>
+          <a:ln>
+            <a:tailEnd type="triangle"/>
+          </a:ln>
+        </p:spPr>
+        <p:style>
+          <a:lnRef idx="1">
+            <a:schemeClr val="accent1"/>
+          </a:lnRef>
+          <a:fillRef idx="0">
+            <a:schemeClr val="accent1"/>
+          </a:fillRef>
+          <a:effectRef idx="0">
+            <a:schemeClr val="accent1"/>
+          </a:effectRef>
+          <a:fontRef idx="minor">
+            <a:schemeClr val="tx1"/>
+          </a:fontRef>
+        </p:style>
+      </p:cxnSp>
+      <p:cxnSp>
+        <p:nvCxnSpPr>
+          <p:cNvPr id="34" name="Straight Arrow Connector 33">
+            <a:extLst>
+              <a:ext uri="{FF2B5EF4-FFF2-40B4-BE49-F238E27FC236}">
+                <a16:creationId xmlns:a16="http://schemas.microsoft.com/office/drawing/2014/main" id="{94A71B96-7154-EE41-BAD2-D6F35FA0BE77}"/>
+              </a:ext>
+            </a:extLst>
+          </p:cNvPr>
+          <p:cNvCxnSpPr>
+            <a:stCxn id="63" idx="2"/>
+            <a:endCxn id="53" idx="0"/>
+          </p:cNvCxnSpPr>
+          <p:nvPr/>
+        </p:nvCxnSpPr>
+        <p:spPr>
+          <a:xfrm flipH="1">
+            <a:off x="5994245" y="3137955"/>
+            <a:ext cx="1566" cy="268894"/>
+          </a:xfrm>
+          <a:prstGeom prst="straightConnector1">
+            <a:avLst/>
+          </a:prstGeom>
+          <a:ln>
+            <a:tailEnd type="triangle"/>
+          </a:ln>
+        </p:spPr>
+        <p:style>
+          <a:lnRef idx="1">
+            <a:schemeClr val="accent1"/>
+          </a:lnRef>
+          <a:fillRef idx="0">
+            <a:schemeClr val="accent1"/>
+          </a:fillRef>
+          <a:effectRef idx="0">
+            <a:schemeClr val="accent1"/>
+          </a:effectRef>
+          <a:fontRef idx="minor">
+            <a:schemeClr val="tx1"/>
+          </a:fontRef>
+        </p:style>
+      </p:cxnSp>
+      <p:cxnSp>
+        <p:nvCxnSpPr>
+          <p:cNvPr id="55" name="Straight Arrow Connector 54">
+            <a:extLst>
+              <a:ext uri="{FF2B5EF4-FFF2-40B4-BE49-F238E27FC236}">
+                <a16:creationId xmlns:a16="http://schemas.microsoft.com/office/drawing/2014/main" id="{34A0317E-B4EA-1E4E-B964-52CCBA8B91B0}"/>
+              </a:ext>
+            </a:extLst>
+          </p:cNvPr>
+          <p:cNvCxnSpPr>
+            <a:stCxn id="38" idx="2"/>
+            <a:endCxn id="50" idx="0"/>
+          </p:cNvCxnSpPr>
+          <p:nvPr/>
+        </p:nvCxnSpPr>
+        <p:spPr>
           <a:xfrm>
-            <a:off x="9764942" y="3124600"/>
-            <a:ext cx="0" cy="269759"/>
+            <a:off x="3659596" y="3137955"/>
+            <a:ext cx="5000" cy="272263"/>
+          </a:xfrm>
+          <a:prstGeom prst="straightConnector1">
+            <a:avLst/>
+          </a:prstGeom>
+          <a:ln>
+            <a:tailEnd type="triangle"/>
+          </a:ln>
+        </p:spPr>
+        <p:style>
+          <a:lnRef idx="1">
+            <a:schemeClr val="accent1"/>
+          </a:lnRef>
+          <a:fillRef idx="0">
+            <a:schemeClr val="accent1"/>
+          </a:fillRef>
+          <a:effectRef idx="0">
+            <a:schemeClr val="accent1"/>
+          </a:effectRef>
+          <a:fontRef idx="minor">
+            <a:schemeClr val="tx1"/>
+          </a:fontRef>
+        </p:style>
+      </p:cxnSp>
+      <p:cxnSp>
+        <p:nvCxnSpPr>
+          <p:cNvPr id="58" name="Straight Arrow Connector 57">
+            <a:extLst>
+              <a:ext uri="{FF2B5EF4-FFF2-40B4-BE49-F238E27FC236}">
+                <a16:creationId xmlns:a16="http://schemas.microsoft.com/office/drawing/2014/main" id="{E47BF444-4B05-2642-8625-C6425AFB508D}"/>
+              </a:ext>
+            </a:extLst>
+          </p:cNvPr>
+          <p:cNvCxnSpPr>
+            <a:stCxn id="69" idx="2"/>
+          </p:cNvCxnSpPr>
+          <p:nvPr/>
+        </p:nvCxnSpPr>
+        <p:spPr>
+          <a:xfrm>
+            <a:off x="1355090" y="3137955"/>
+            <a:ext cx="0" cy="265525"/>
           </a:xfrm>
           <a:prstGeom prst="straightConnector1">
             <a:avLst/>

</xml_diff>

<commit_message>
Moved two figure files
I had fig_2015_medic_reports_to_compliance.Rmd and fig_responses_screenings_validation_line_graph.Rmd coming out of detect_5wk, but they don't. They both require datasets with identifiers. Updated the flow chart accordingly.
</commit_message>
<xml_diff>
--- a/images/project_file_flow_diagram.pptx
+++ b/images/project_file_flow_diagram.pptx
@@ -3950,7 +3950,7 @@
         </p:nvSpPr>
         <p:spPr>
           <a:xfrm>
-            <a:off x="3024255" y="139082"/>
+            <a:off x="3640697" y="139082"/>
             <a:ext cx="1669512" cy="359595"/>
           </a:xfrm>
           <a:prstGeom prst="rect">
@@ -4384,8 +4384,8 @@
         </p:nvSpPr>
         <p:spPr>
           <a:xfrm>
-            <a:off x="2818772" y="2601411"/>
-            <a:ext cx="2080478" cy="359595"/>
+            <a:off x="3578886" y="2619748"/>
+            <a:ext cx="1792969" cy="359595"/>
           </a:xfrm>
           <a:prstGeom prst="rect">
             <a:avLst/>
@@ -4424,12 +4424,31 @@
           <a:p>
             <a:pPr algn="ctr"/>
             <a:r>
+              <a:rPr lang="en-US" sz="1100" dirty="0" err="1">
+                <a:solidFill>
+                  <a:schemeClr val="tx1"/>
+                </a:solidFill>
+              </a:rPr>
+              <a:t>data_medstar_detect</a:t>
+            </a:r>
+            <a:r>
               <a:rPr lang="en-US" sz="1100" dirty="0">
                 <a:solidFill>
                   <a:schemeClr val="tx1"/>
                 </a:solidFill>
               </a:rPr>
-              <a:t>data_medstar_detect_screenings_01_import.Rmd</a:t>
+              <a:t>_</a:t>
+            </a:r>
+          </a:p>
+          <a:p>
+            <a:pPr algn="ctr"/>
+            <a:r>
+              <a:rPr lang="en-US" sz="1100" dirty="0">
+                <a:solidFill>
+                  <a:schemeClr val="tx1"/>
+                </a:solidFill>
+              </a:rPr>
+              <a:t>screenings_01_import.Rmd</a:t>
             </a:r>
           </a:p>
         </p:txBody>
@@ -4490,7 +4509,7 @@
         </p:nvSpPr>
         <p:spPr>
           <a:xfrm>
-            <a:off x="4986899" y="131653"/>
+            <a:off x="5397861" y="131653"/>
             <a:ext cx="1863883" cy="359595"/>
           </a:xfrm>
           <a:prstGeom prst="rect">
@@ -4554,7 +4573,7 @@
         </p:nvSpPr>
         <p:spPr>
           <a:xfrm>
-            <a:off x="5087494" y="2605432"/>
+            <a:off x="5498456" y="2619748"/>
             <a:ext cx="1662691" cy="359595"/>
           </a:xfrm>
           <a:prstGeom prst="rect">
@@ -4801,7 +4820,7 @@
         </p:nvSpPr>
         <p:spPr>
           <a:xfrm>
-            <a:off x="1580023" y="1795024"/>
+            <a:off x="2359831" y="1795023"/>
             <a:ext cx="1387011" cy="359595"/>
           </a:xfrm>
           <a:prstGeom prst="rect">
@@ -4927,10 +4946,10 @@
       </p:sp>
       <p:sp>
         <p:nvSpPr>
-          <p:cNvPr id="86" name="Rectangle 85">
-            <a:extLst>
-              <a:ext uri="{FF2B5EF4-FFF2-40B4-BE49-F238E27FC236}">
-                <a16:creationId xmlns:a16="http://schemas.microsoft.com/office/drawing/2014/main" id="{1EF0F79A-0146-7D42-8EE4-67C6E64B2073}"/>
+          <p:cNvPr id="89" name="Rectangle 88">
+            <a:extLst>
+              <a:ext uri="{FF2B5EF4-FFF2-40B4-BE49-F238E27FC236}">
+                <a16:creationId xmlns:a16="http://schemas.microsoft.com/office/drawing/2014/main" id="{2CAC5257-A68E-C946-B322-984D414A1DAF}"/>
               </a:ext>
             </a:extLst>
           </p:cNvPr>
@@ -4939,8 +4958,683 @@
         </p:nvSpPr>
         <p:spPr>
           <a:xfrm>
-            <a:off x="4206" y="2605525"/>
-            <a:ext cx="1764624" cy="359595"/>
+            <a:off x="540105" y="3448586"/>
+            <a:ext cx="1387011" cy="359595"/>
+          </a:xfrm>
+          <a:prstGeom prst="rect">
+            <a:avLst/>
+          </a:prstGeom>
+          <a:solidFill>
+            <a:schemeClr val="accent2">
+              <a:lumMod val="20000"/>
+              <a:lumOff val="80000"/>
+            </a:schemeClr>
+          </a:solidFill>
+          <a:ln>
+            <a:solidFill>
+              <a:schemeClr val="tx1"/>
+            </a:solidFill>
+          </a:ln>
+        </p:spPr>
+        <p:style>
+          <a:lnRef idx="2">
+            <a:schemeClr val="accent1">
+              <a:shade val="50000"/>
+            </a:schemeClr>
+          </a:lnRef>
+          <a:fillRef idx="1">
+            <a:schemeClr val="accent1"/>
+          </a:fillRef>
+          <a:effectRef idx="0">
+            <a:schemeClr val="accent1"/>
+          </a:effectRef>
+          <a:fontRef idx="minor">
+            <a:schemeClr val="lt1"/>
+          </a:fontRef>
+        </p:style>
+        <p:txBody>
+          <a:bodyPr rtlCol="0" anchor="ctr"/>
+          <a:lstStyle/>
+          <a:p>
+            <a:pPr algn="ctr"/>
+            <a:r>
+              <a:rPr lang="en-US" sz="1100" dirty="0" err="1">
+                <a:solidFill>
+                  <a:schemeClr val="tx1"/>
+                </a:solidFill>
+              </a:rPr>
+              <a:t>medstar_compliance_deidentified.csv</a:t>
+            </a:r>
+            <a:endParaRPr lang="en-US" sz="1100" dirty="0">
+              <a:solidFill>
+                <a:schemeClr val="tx1"/>
+              </a:solidFill>
+            </a:endParaRPr>
+          </a:p>
+        </p:txBody>
+      </p:sp>
+      <p:cxnSp>
+        <p:nvCxnSpPr>
+          <p:cNvPr id="91" name="Elbow Connector 90">
+            <a:extLst>
+              <a:ext uri="{FF2B5EF4-FFF2-40B4-BE49-F238E27FC236}">
+                <a16:creationId xmlns:a16="http://schemas.microsoft.com/office/drawing/2014/main" id="{845010CE-2939-7747-B3A3-C7AE388E49B3}"/>
+              </a:ext>
+            </a:extLst>
+          </p:cNvPr>
+          <p:cNvCxnSpPr>
+            <a:cxnSpLocks/>
+            <a:stCxn id="86" idx="2"/>
+            <a:endCxn id="89" idx="0"/>
+          </p:cNvCxnSpPr>
+          <p:nvPr/>
+        </p:nvCxnSpPr>
+        <p:spPr>
+          <a:xfrm rot="5400000">
+            <a:off x="1664444" y="2548511"/>
+            <a:ext cx="469243" cy="1330907"/>
+          </a:xfrm>
+          <a:prstGeom prst="bentConnector3">
+            <a:avLst/>
+          </a:prstGeom>
+          <a:ln>
+            <a:tailEnd type="triangle"/>
+          </a:ln>
+        </p:spPr>
+        <p:style>
+          <a:lnRef idx="1">
+            <a:schemeClr val="accent1"/>
+          </a:lnRef>
+          <a:fillRef idx="0">
+            <a:schemeClr val="accent1"/>
+          </a:fillRef>
+          <a:effectRef idx="0">
+            <a:schemeClr val="accent1"/>
+          </a:effectRef>
+          <a:fontRef idx="minor">
+            <a:schemeClr val="tx1"/>
+          </a:fontRef>
+        </p:style>
+      </p:cxnSp>
+      <p:cxnSp>
+        <p:nvCxnSpPr>
+          <p:cNvPr id="94" name="Elbow Connector 93">
+            <a:extLst>
+              <a:ext uri="{FF2B5EF4-FFF2-40B4-BE49-F238E27FC236}">
+                <a16:creationId xmlns:a16="http://schemas.microsoft.com/office/drawing/2014/main" id="{18CFA234-0B01-A448-B730-3E7545240FE8}"/>
+              </a:ext>
+            </a:extLst>
+          </p:cNvPr>
+          <p:cNvCxnSpPr>
+            <a:cxnSpLocks/>
+            <a:stCxn id="86" idx="2"/>
+            <a:endCxn id="90" idx="0"/>
+          </p:cNvCxnSpPr>
+          <p:nvPr/>
+        </p:nvCxnSpPr>
+        <p:spPr>
+          <a:xfrm rot="16200000" flipH="1">
+            <a:off x="2419046" y="3124814"/>
+            <a:ext cx="469241" cy="178297"/>
+          </a:xfrm>
+          <a:prstGeom prst="bentConnector3">
+            <a:avLst/>
+          </a:prstGeom>
+          <a:ln>
+            <a:tailEnd type="triangle"/>
+          </a:ln>
+        </p:spPr>
+        <p:style>
+          <a:lnRef idx="1">
+            <a:schemeClr val="accent1"/>
+          </a:lnRef>
+          <a:fillRef idx="0">
+            <a:schemeClr val="accent1"/>
+          </a:fillRef>
+          <a:effectRef idx="0">
+            <a:schemeClr val="accent1"/>
+          </a:effectRef>
+          <a:fontRef idx="minor">
+            <a:schemeClr val="tx1"/>
+          </a:fontRef>
+        </p:style>
+      </p:cxnSp>
+      <p:sp>
+        <p:nvSpPr>
+          <p:cNvPr id="108" name="Rectangle 107">
+            <a:extLst>
+              <a:ext uri="{FF2B5EF4-FFF2-40B4-BE49-F238E27FC236}">
+                <a16:creationId xmlns:a16="http://schemas.microsoft.com/office/drawing/2014/main" id="{69C643E7-E7AF-474F-98EE-F06A0DF04FE8}"/>
+              </a:ext>
+            </a:extLst>
+          </p:cNvPr>
+          <p:cNvSpPr/>
+          <p:nvPr/>
+        </p:nvSpPr>
+        <p:spPr>
+          <a:xfrm>
+            <a:off x="3640697" y="3448583"/>
+            <a:ext cx="1669512" cy="359595"/>
+          </a:xfrm>
+          <a:prstGeom prst="rect">
+            <a:avLst/>
+          </a:prstGeom>
+          <a:solidFill>
+            <a:schemeClr val="accent2">
+              <a:lumMod val="20000"/>
+              <a:lumOff val="80000"/>
+            </a:schemeClr>
+          </a:solidFill>
+          <a:ln>
+            <a:solidFill>
+              <a:schemeClr val="tx1"/>
+            </a:solidFill>
+          </a:ln>
+        </p:spPr>
+        <p:style>
+          <a:lnRef idx="2">
+            <a:schemeClr val="accent1">
+              <a:shade val="50000"/>
+            </a:schemeClr>
+          </a:lnRef>
+          <a:fillRef idx="1">
+            <a:schemeClr val="accent1"/>
+          </a:fillRef>
+          <a:effectRef idx="0">
+            <a:schemeClr val="accent1"/>
+          </a:effectRef>
+          <a:fontRef idx="minor">
+            <a:schemeClr val="lt1"/>
+          </a:fontRef>
+        </p:style>
+        <p:txBody>
+          <a:bodyPr rtlCol="0" anchor="ctr"/>
+          <a:lstStyle/>
+          <a:p>
+            <a:pPr algn="ctr"/>
+            <a:r>
+              <a:rPr lang="en-US" sz="1100" dirty="0" err="1">
+                <a:solidFill>
+                  <a:schemeClr val="tx1"/>
+                </a:solidFill>
+              </a:rPr>
+              <a:t>medstar_detect.feather</a:t>
+            </a:r>
+            <a:endParaRPr lang="en-US" sz="1100" dirty="0">
+              <a:solidFill>
+                <a:schemeClr val="tx1"/>
+              </a:solidFill>
+            </a:endParaRPr>
+          </a:p>
+        </p:txBody>
+      </p:sp>
+      <p:cxnSp>
+        <p:nvCxnSpPr>
+          <p:cNvPr id="113" name="Straight Arrow Connector 112">
+            <a:extLst>
+              <a:ext uri="{FF2B5EF4-FFF2-40B4-BE49-F238E27FC236}">
+                <a16:creationId xmlns:a16="http://schemas.microsoft.com/office/drawing/2014/main" id="{B27F98B6-6374-664A-B4F6-0C719AC61FC7}"/>
+              </a:ext>
+            </a:extLst>
+          </p:cNvPr>
+          <p:cNvCxnSpPr>
+            <a:stCxn id="74" idx="2"/>
+            <a:endCxn id="79" idx="0"/>
+          </p:cNvCxnSpPr>
+          <p:nvPr/>
+        </p:nvCxnSpPr>
+        <p:spPr>
+          <a:xfrm flipH="1">
+            <a:off x="6329802" y="491248"/>
+            <a:ext cx="1" cy="2128500"/>
+          </a:xfrm>
+          <a:prstGeom prst="straightConnector1">
+            <a:avLst/>
+          </a:prstGeom>
+          <a:ln>
+            <a:tailEnd type="triangle"/>
+          </a:ln>
+        </p:spPr>
+        <p:style>
+          <a:lnRef idx="1">
+            <a:schemeClr val="accent1"/>
+          </a:lnRef>
+          <a:fillRef idx="0">
+            <a:schemeClr val="accent1"/>
+          </a:fillRef>
+          <a:effectRef idx="0">
+            <a:schemeClr val="accent1"/>
+          </a:effectRef>
+          <a:fontRef idx="minor">
+            <a:schemeClr val="tx1"/>
+          </a:fontRef>
+        </p:style>
+      </p:cxnSp>
+      <p:cxnSp>
+        <p:nvCxnSpPr>
+          <p:cNvPr id="123" name="Elbow Connector 122">
+            <a:extLst>
+              <a:ext uri="{FF2B5EF4-FFF2-40B4-BE49-F238E27FC236}">
+                <a16:creationId xmlns:a16="http://schemas.microsoft.com/office/drawing/2014/main" id="{AC129749-74FF-4F4E-822E-83FC6BD402EA}"/>
+              </a:ext>
+            </a:extLst>
+          </p:cNvPr>
+          <p:cNvCxnSpPr>
+            <a:stCxn id="72" idx="2"/>
+            <a:endCxn id="83" idx="0"/>
+          </p:cNvCxnSpPr>
+          <p:nvPr/>
+        </p:nvCxnSpPr>
+        <p:spPr>
+          <a:xfrm rot="5400000">
+            <a:off x="706526" y="1340570"/>
+            <a:ext cx="465854" cy="443055"/>
+          </a:xfrm>
+          <a:prstGeom prst="bentConnector3">
+            <a:avLst/>
+          </a:prstGeom>
+          <a:ln>
+            <a:tailEnd type="triangle"/>
+          </a:ln>
+        </p:spPr>
+        <p:style>
+          <a:lnRef idx="1">
+            <a:schemeClr val="accent1"/>
+          </a:lnRef>
+          <a:fillRef idx="0">
+            <a:schemeClr val="accent1"/>
+          </a:fillRef>
+          <a:effectRef idx="0">
+            <a:schemeClr val="accent1"/>
+          </a:effectRef>
+          <a:fontRef idx="minor">
+            <a:schemeClr val="tx1"/>
+          </a:fontRef>
+        </p:style>
+      </p:cxnSp>
+      <p:cxnSp>
+        <p:nvCxnSpPr>
+          <p:cNvPr id="129" name="Elbow Connector 128">
+            <a:extLst>
+              <a:ext uri="{FF2B5EF4-FFF2-40B4-BE49-F238E27FC236}">
+                <a16:creationId xmlns:a16="http://schemas.microsoft.com/office/drawing/2014/main" id="{64CA426E-7437-D94E-9E8F-10110C751DCA}"/>
+              </a:ext>
+            </a:extLst>
+          </p:cNvPr>
+          <p:cNvCxnSpPr>
+            <a:cxnSpLocks/>
+            <a:stCxn id="83" idx="2"/>
+            <a:endCxn id="86" idx="0"/>
+          </p:cNvCxnSpPr>
+          <p:nvPr/>
+        </p:nvCxnSpPr>
+        <p:spPr>
+          <a:xfrm rot="16200000" flipH="1">
+            <a:off x="1408657" y="1463886"/>
+            <a:ext cx="465129" cy="1846593"/>
+          </a:xfrm>
+          <a:prstGeom prst="bentConnector3">
+            <a:avLst/>
+          </a:prstGeom>
+          <a:ln>
+            <a:tailEnd type="triangle"/>
+          </a:ln>
+        </p:spPr>
+        <p:style>
+          <a:lnRef idx="1">
+            <a:schemeClr val="accent1"/>
+          </a:lnRef>
+          <a:fillRef idx="0">
+            <a:schemeClr val="accent1"/>
+          </a:fillRef>
+          <a:effectRef idx="0">
+            <a:schemeClr val="accent1"/>
+          </a:effectRef>
+          <a:fontRef idx="minor">
+            <a:schemeClr val="tx1"/>
+          </a:fontRef>
+        </p:style>
+      </p:cxnSp>
+      <p:cxnSp>
+        <p:nvCxnSpPr>
+          <p:cNvPr id="133" name="Elbow Connector 132">
+            <a:extLst>
+              <a:ext uri="{FF2B5EF4-FFF2-40B4-BE49-F238E27FC236}">
+                <a16:creationId xmlns:a16="http://schemas.microsoft.com/office/drawing/2014/main" id="{46CD9EDE-D943-1B4D-AA39-7E9D6674E8C6}"/>
+              </a:ext>
+            </a:extLst>
+          </p:cNvPr>
+          <p:cNvCxnSpPr>
+            <a:stCxn id="72" idx="2"/>
+            <a:endCxn id="82" idx="0"/>
+          </p:cNvCxnSpPr>
+          <p:nvPr/>
+        </p:nvCxnSpPr>
+        <p:spPr>
+          <a:xfrm rot="16200000" flipH="1">
+            <a:off x="1874232" y="615917"/>
+            <a:ext cx="465853" cy="1892357"/>
+          </a:xfrm>
+          <a:prstGeom prst="bentConnector3">
+            <a:avLst/>
+          </a:prstGeom>
+          <a:ln>
+            <a:tailEnd type="triangle"/>
+          </a:ln>
+        </p:spPr>
+        <p:style>
+          <a:lnRef idx="1">
+            <a:schemeClr val="accent1"/>
+          </a:lnRef>
+          <a:fillRef idx="0">
+            <a:schemeClr val="accent1"/>
+          </a:fillRef>
+          <a:effectRef idx="0">
+            <a:schemeClr val="accent1"/>
+          </a:effectRef>
+          <a:fontRef idx="minor">
+            <a:schemeClr val="tx1"/>
+          </a:fontRef>
+        </p:style>
+      </p:cxnSp>
+      <p:cxnSp>
+        <p:nvCxnSpPr>
+          <p:cNvPr id="140" name="Elbow Connector 139">
+            <a:extLst>
+              <a:ext uri="{FF2B5EF4-FFF2-40B4-BE49-F238E27FC236}">
+                <a16:creationId xmlns:a16="http://schemas.microsoft.com/office/drawing/2014/main" id="{3DD49759-4F3F-7842-9805-7BF6A2D4F972}"/>
+              </a:ext>
+            </a:extLst>
+          </p:cNvPr>
+          <p:cNvCxnSpPr>
+            <a:cxnSpLocks/>
+            <a:stCxn id="82" idx="2"/>
+            <a:endCxn id="73" idx="0"/>
+          </p:cNvCxnSpPr>
+          <p:nvPr/>
+        </p:nvCxnSpPr>
+        <p:spPr>
+          <a:xfrm rot="16200000" flipH="1">
+            <a:off x="3531789" y="1676166"/>
+            <a:ext cx="465130" cy="1422034"/>
+          </a:xfrm>
+          <a:prstGeom prst="bentConnector3">
+            <a:avLst/>
+          </a:prstGeom>
+          <a:ln>
+            <a:tailEnd type="triangle"/>
+          </a:ln>
+        </p:spPr>
+        <p:style>
+          <a:lnRef idx="1">
+            <a:schemeClr val="accent1"/>
+          </a:lnRef>
+          <a:fillRef idx="0">
+            <a:schemeClr val="accent1"/>
+          </a:fillRef>
+          <a:effectRef idx="0">
+            <a:schemeClr val="accent1"/>
+          </a:effectRef>
+          <a:fontRef idx="minor">
+            <a:schemeClr val="tx1"/>
+          </a:fontRef>
+        </p:style>
+      </p:cxnSp>
+      <p:cxnSp>
+        <p:nvCxnSpPr>
+          <p:cNvPr id="142" name="Straight Arrow Connector 141">
+            <a:extLst>
+              <a:ext uri="{FF2B5EF4-FFF2-40B4-BE49-F238E27FC236}">
+                <a16:creationId xmlns:a16="http://schemas.microsoft.com/office/drawing/2014/main" id="{14A689C8-E292-4945-81E5-C49660111868}"/>
+              </a:ext>
+            </a:extLst>
+          </p:cNvPr>
+          <p:cNvCxnSpPr>
+            <a:cxnSpLocks/>
+            <a:stCxn id="7" idx="2"/>
+            <a:endCxn id="73" idx="0"/>
+          </p:cNvCxnSpPr>
+          <p:nvPr/>
+        </p:nvCxnSpPr>
+        <p:spPr>
+          <a:xfrm flipH="1">
+            <a:off x="4475371" y="498677"/>
+            <a:ext cx="82" cy="2121071"/>
+          </a:xfrm>
+          <a:prstGeom prst="straightConnector1">
+            <a:avLst/>
+          </a:prstGeom>
+          <a:ln>
+            <a:tailEnd type="triangle"/>
+          </a:ln>
+        </p:spPr>
+        <p:style>
+          <a:lnRef idx="1">
+            <a:schemeClr val="accent1"/>
+          </a:lnRef>
+          <a:fillRef idx="0">
+            <a:schemeClr val="accent1"/>
+          </a:fillRef>
+          <a:effectRef idx="0">
+            <a:schemeClr val="accent1"/>
+          </a:effectRef>
+          <a:fontRef idx="minor">
+            <a:schemeClr val="tx1"/>
+          </a:fontRef>
+        </p:style>
+      </p:cxnSp>
+      <p:cxnSp>
+        <p:nvCxnSpPr>
+          <p:cNvPr id="144" name="Straight Arrow Connector 143">
+            <a:extLst>
+              <a:ext uri="{FF2B5EF4-FFF2-40B4-BE49-F238E27FC236}">
+                <a16:creationId xmlns:a16="http://schemas.microsoft.com/office/drawing/2014/main" id="{BC1A9A62-A138-E64B-B314-AAAC64B07B05}"/>
+              </a:ext>
+            </a:extLst>
+          </p:cNvPr>
+          <p:cNvCxnSpPr>
+            <a:cxnSpLocks/>
+            <a:stCxn id="73" idx="2"/>
+            <a:endCxn id="108" idx="0"/>
+          </p:cNvCxnSpPr>
+          <p:nvPr/>
+        </p:nvCxnSpPr>
+        <p:spPr>
+          <a:xfrm>
+            <a:off x="4475371" y="2979343"/>
+            <a:ext cx="82" cy="469240"/>
+          </a:xfrm>
+          <a:prstGeom prst="straightConnector1">
+            <a:avLst/>
+          </a:prstGeom>
+          <a:ln>
+            <a:tailEnd type="triangle"/>
+          </a:ln>
+        </p:spPr>
+        <p:style>
+          <a:lnRef idx="1">
+            <a:schemeClr val="accent1"/>
+          </a:lnRef>
+          <a:fillRef idx="0">
+            <a:schemeClr val="accent1"/>
+          </a:fillRef>
+          <a:effectRef idx="0">
+            <a:schemeClr val="accent1"/>
+          </a:effectRef>
+          <a:fontRef idx="minor">
+            <a:schemeClr val="tx1"/>
+          </a:fontRef>
+        </p:style>
+      </p:cxnSp>
+      <p:cxnSp>
+        <p:nvCxnSpPr>
+          <p:cNvPr id="146" name="Elbow Connector 145">
+            <a:extLst>
+              <a:ext uri="{FF2B5EF4-FFF2-40B4-BE49-F238E27FC236}">
+                <a16:creationId xmlns:a16="http://schemas.microsoft.com/office/drawing/2014/main" id="{B22A7AB4-026D-614F-8377-04AFB7453BC8}"/>
+              </a:ext>
+            </a:extLst>
+          </p:cNvPr>
+          <p:cNvCxnSpPr>
+            <a:stCxn id="82" idx="2"/>
+            <a:endCxn id="79" idx="0"/>
+          </p:cNvCxnSpPr>
+          <p:nvPr/>
+        </p:nvCxnSpPr>
+        <p:spPr>
+          <a:xfrm rot="16200000" flipH="1">
+            <a:off x="4459004" y="748950"/>
+            <a:ext cx="465130" cy="3276465"/>
+          </a:xfrm>
+          <a:prstGeom prst="bentConnector3">
+            <a:avLst/>
+          </a:prstGeom>
+          <a:ln>
+            <a:tailEnd type="triangle"/>
+          </a:ln>
+        </p:spPr>
+        <p:style>
+          <a:lnRef idx="1">
+            <a:schemeClr val="accent1"/>
+          </a:lnRef>
+          <a:fillRef idx="0">
+            <a:schemeClr val="accent1"/>
+          </a:fillRef>
+          <a:effectRef idx="0">
+            <a:schemeClr val="accent1"/>
+          </a:effectRef>
+          <a:fontRef idx="minor">
+            <a:schemeClr val="tx1"/>
+          </a:fontRef>
+        </p:style>
+      </p:cxnSp>
+      <p:sp>
+        <p:nvSpPr>
+          <p:cNvPr id="147" name="Rectangle 146">
+            <a:extLst>
+              <a:ext uri="{FF2B5EF4-FFF2-40B4-BE49-F238E27FC236}">
+                <a16:creationId xmlns:a16="http://schemas.microsoft.com/office/drawing/2014/main" id="{49E50B93-BA68-3946-ABD3-572EB7F8F2DC}"/>
+              </a:ext>
+            </a:extLst>
+          </p:cNvPr>
+          <p:cNvSpPr/>
+          <p:nvPr/>
+        </p:nvSpPr>
+        <p:spPr>
+          <a:xfrm>
+            <a:off x="5491635" y="3448582"/>
+            <a:ext cx="1669512" cy="359595"/>
+          </a:xfrm>
+          <a:prstGeom prst="rect">
+            <a:avLst/>
+          </a:prstGeom>
+          <a:solidFill>
+            <a:schemeClr val="accent2">
+              <a:lumMod val="20000"/>
+              <a:lumOff val="80000"/>
+            </a:schemeClr>
+          </a:solidFill>
+          <a:ln>
+            <a:solidFill>
+              <a:schemeClr val="tx1"/>
+            </a:solidFill>
+          </a:ln>
+        </p:spPr>
+        <p:style>
+          <a:lnRef idx="2">
+            <a:schemeClr val="accent1">
+              <a:shade val="50000"/>
+            </a:schemeClr>
+          </a:lnRef>
+          <a:fillRef idx="1">
+            <a:schemeClr val="accent1"/>
+          </a:fillRef>
+          <a:effectRef idx="0">
+            <a:schemeClr val="accent1"/>
+          </a:effectRef>
+          <a:fontRef idx="minor">
+            <a:schemeClr val="lt1"/>
+          </a:fontRef>
+        </p:style>
+        <p:txBody>
+          <a:bodyPr rtlCol="0" anchor="ctr"/>
+          <a:lstStyle/>
+          <a:p>
+            <a:pPr algn="ctr"/>
+            <a:r>
+              <a:rPr lang="en-US" sz="1100" dirty="0" err="1">
+                <a:solidFill>
+                  <a:schemeClr val="tx1"/>
+                </a:solidFill>
+              </a:rPr>
+              <a:t>medstar_health.feather</a:t>
+            </a:r>
+            <a:endParaRPr lang="en-US" sz="1100" dirty="0">
+              <a:solidFill>
+                <a:schemeClr val="tx1"/>
+              </a:solidFill>
+            </a:endParaRPr>
+          </a:p>
+        </p:txBody>
+      </p:sp>
+      <p:cxnSp>
+        <p:nvCxnSpPr>
+          <p:cNvPr id="149" name="Straight Arrow Connector 148">
+            <a:extLst>
+              <a:ext uri="{FF2B5EF4-FFF2-40B4-BE49-F238E27FC236}">
+                <a16:creationId xmlns:a16="http://schemas.microsoft.com/office/drawing/2014/main" id="{BD05C671-3F06-784E-AF3A-EBBB65FE1977}"/>
+              </a:ext>
+            </a:extLst>
+          </p:cNvPr>
+          <p:cNvCxnSpPr>
+            <a:stCxn id="79" idx="2"/>
+            <a:endCxn id="147" idx="0"/>
+          </p:cNvCxnSpPr>
+          <p:nvPr/>
+        </p:nvCxnSpPr>
+        <p:spPr>
+          <a:xfrm flipH="1">
+            <a:off x="6326391" y="2979343"/>
+            <a:ext cx="3411" cy="469239"/>
+          </a:xfrm>
+          <a:prstGeom prst="straightConnector1">
+            <a:avLst/>
+          </a:prstGeom>
+          <a:ln>
+            <a:tailEnd type="triangle"/>
+          </a:ln>
+        </p:spPr>
+        <p:style>
+          <a:lnRef idx="1">
+            <a:schemeClr val="accent1"/>
+          </a:lnRef>
+          <a:fillRef idx="0">
+            <a:schemeClr val="accent1"/>
+          </a:fillRef>
+          <a:effectRef idx="0">
+            <a:schemeClr val="accent1"/>
+          </a:effectRef>
+          <a:fontRef idx="minor">
+            <a:schemeClr val="tx1"/>
+          </a:fontRef>
+        </p:style>
+      </p:cxnSp>
+      <p:sp>
+        <p:nvSpPr>
+          <p:cNvPr id="150" name="Rectangle 149">
+            <a:extLst>
+              <a:ext uri="{FF2B5EF4-FFF2-40B4-BE49-F238E27FC236}">
+                <a16:creationId xmlns:a16="http://schemas.microsoft.com/office/drawing/2014/main" id="{F8C39AA5-26AC-5E4E-8931-8AF5E30CDA7A}"/>
+              </a:ext>
+            </a:extLst>
+          </p:cNvPr>
+          <p:cNvSpPr/>
+          <p:nvPr/>
+        </p:nvSpPr>
+        <p:spPr>
+          <a:xfrm>
+            <a:off x="4041391" y="4172160"/>
+            <a:ext cx="2554612" cy="359595"/>
           </a:xfrm>
           <a:prstGeom prst="rect">
             <a:avLst/>
@@ -4984,17 +5678,101 @@
                   <a:schemeClr val="tx1"/>
                 </a:solidFill>
               </a:rPr>
-              <a:t>data_medstar_compliance_02_deidentify.Rmd</a:t>
-            </a:r>
-          </a:p>
-        </p:txBody>
-      </p:sp>
-      <p:sp>
-        <p:nvSpPr>
-          <p:cNvPr id="89" name="Rectangle 88">
-            <a:extLst>
-              <a:ext uri="{FF2B5EF4-FFF2-40B4-BE49-F238E27FC236}">
-                <a16:creationId xmlns:a16="http://schemas.microsoft.com/office/drawing/2014/main" id="{2CAC5257-A68E-C946-B322-984D414A1DAF}"/>
+              <a:t>data_medstar_complete_01_merge.Rmd</a:t>
+            </a:r>
+          </a:p>
+        </p:txBody>
+      </p:sp>
+      <p:cxnSp>
+        <p:nvCxnSpPr>
+          <p:cNvPr id="152" name="Elbow Connector 151">
+            <a:extLst>
+              <a:ext uri="{FF2B5EF4-FFF2-40B4-BE49-F238E27FC236}">
+                <a16:creationId xmlns:a16="http://schemas.microsoft.com/office/drawing/2014/main" id="{40386164-9432-4344-810C-DEA30BCF1095}"/>
+              </a:ext>
+            </a:extLst>
+          </p:cNvPr>
+          <p:cNvCxnSpPr>
+            <a:stCxn id="108" idx="2"/>
+            <a:endCxn id="150" idx="0"/>
+          </p:cNvCxnSpPr>
+          <p:nvPr/>
+        </p:nvCxnSpPr>
+        <p:spPr>
+          <a:xfrm rot="16200000" flipH="1">
+            <a:off x="4715084" y="3568547"/>
+            <a:ext cx="363982" cy="843244"/>
+          </a:xfrm>
+          <a:prstGeom prst="bentConnector3">
+            <a:avLst/>
+          </a:prstGeom>
+          <a:ln>
+            <a:tailEnd type="triangle"/>
+          </a:ln>
+        </p:spPr>
+        <p:style>
+          <a:lnRef idx="1">
+            <a:schemeClr val="accent1"/>
+          </a:lnRef>
+          <a:fillRef idx="0">
+            <a:schemeClr val="accent1"/>
+          </a:fillRef>
+          <a:effectRef idx="0">
+            <a:schemeClr val="accent1"/>
+          </a:effectRef>
+          <a:fontRef idx="minor">
+            <a:schemeClr val="tx1"/>
+          </a:fontRef>
+        </p:style>
+      </p:cxnSp>
+      <p:cxnSp>
+        <p:nvCxnSpPr>
+          <p:cNvPr id="154" name="Elbow Connector 153">
+            <a:extLst>
+              <a:ext uri="{FF2B5EF4-FFF2-40B4-BE49-F238E27FC236}">
+                <a16:creationId xmlns:a16="http://schemas.microsoft.com/office/drawing/2014/main" id="{9B98925A-F6CE-9E40-8104-81B31938E344}"/>
+              </a:ext>
+            </a:extLst>
+          </p:cNvPr>
+          <p:cNvCxnSpPr>
+            <a:stCxn id="147" idx="2"/>
+            <a:endCxn id="150" idx="0"/>
+          </p:cNvCxnSpPr>
+          <p:nvPr/>
+        </p:nvCxnSpPr>
+        <p:spPr>
+          <a:xfrm rot="5400000">
+            <a:off x="5640553" y="3486321"/>
+            <a:ext cx="363983" cy="1007694"/>
+          </a:xfrm>
+          <a:prstGeom prst="bentConnector3">
+            <a:avLst/>
+          </a:prstGeom>
+          <a:ln>
+            <a:tailEnd type="triangle"/>
+          </a:ln>
+        </p:spPr>
+        <p:style>
+          <a:lnRef idx="1">
+            <a:schemeClr val="accent1"/>
+          </a:lnRef>
+          <a:fillRef idx="0">
+            <a:schemeClr val="accent1"/>
+          </a:fillRef>
+          <a:effectRef idx="0">
+            <a:schemeClr val="accent1"/>
+          </a:effectRef>
+          <a:fontRef idx="minor">
+            <a:schemeClr val="tx1"/>
+          </a:fontRef>
+        </p:style>
+      </p:cxnSp>
+      <p:sp>
+        <p:nvSpPr>
+          <p:cNvPr id="155" name="Rectangle 154">
+            <a:extLst>
+              <a:ext uri="{FF2B5EF4-FFF2-40B4-BE49-F238E27FC236}">
+                <a16:creationId xmlns:a16="http://schemas.microsoft.com/office/drawing/2014/main" id="{7F03C1E2-5164-9347-AE1F-F2A4BB75D0AF}"/>
               </a:ext>
             </a:extLst>
           </p:cNvPr>
@@ -5003,8 +5781,8 @@
         </p:nvSpPr>
         <p:spPr>
           <a:xfrm>
-            <a:off x="5846" y="3448586"/>
-            <a:ext cx="1387011" cy="359595"/>
+            <a:off x="4423190" y="4895392"/>
+            <a:ext cx="1791014" cy="359595"/>
           </a:xfrm>
           <a:prstGeom prst="rect">
             <a:avLst/>
@@ -5048,7 +5826,7 @@
                   <a:schemeClr val="tx1"/>
                 </a:solidFill>
               </a:rPr>
-              <a:t>medstar_compliance_deidentified.csv</a:t>
+              <a:t>medstar_complete.feather</a:t>
             </a:r>
             <a:endParaRPr lang="en-US" sz="1100" dirty="0">
               <a:solidFill>
@@ -5060,25 +5838,25 @@
       </p:sp>
       <p:cxnSp>
         <p:nvCxnSpPr>
-          <p:cNvPr id="91" name="Elbow Connector 90">
-            <a:extLst>
-              <a:ext uri="{FF2B5EF4-FFF2-40B4-BE49-F238E27FC236}">
-                <a16:creationId xmlns:a16="http://schemas.microsoft.com/office/drawing/2014/main" id="{845010CE-2939-7747-B3A3-C7AE388E49B3}"/>
+          <p:cNvPr id="157" name="Straight Arrow Connector 156">
+            <a:extLst>
+              <a:ext uri="{FF2B5EF4-FFF2-40B4-BE49-F238E27FC236}">
+                <a16:creationId xmlns:a16="http://schemas.microsoft.com/office/drawing/2014/main" id="{01A67BC9-F0E1-9A4B-82C8-14AF25EFF7B3}"/>
               </a:ext>
             </a:extLst>
           </p:cNvPr>
           <p:cNvCxnSpPr>
-            <a:stCxn id="86" idx="2"/>
-            <a:endCxn id="89" idx="0"/>
+            <a:stCxn id="150" idx="2"/>
+            <a:endCxn id="155" idx="0"/>
           </p:cNvCxnSpPr>
           <p:nvPr/>
         </p:nvCxnSpPr>
         <p:spPr>
-          <a:xfrm rot="5400000">
-            <a:off x="551202" y="3113270"/>
-            <a:ext cx="483466" cy="187166"/>
-          </a:xfrm>
-          <a:prstGeom prst="bentConnector3">
+          <a:xfrm>
+            <a:off x="5318697" y="4531755"/>
+            <a:ext cx="0" cy="363637"/>
+          </a:xfrm>
+          <a:prstGeom prst="straightConnector1">
             <a:avLst/>
           </a:prstGeom>
           <a:ln>
@@ -5100,54 +5878,12 @@
           </a:fontRef>
         </p:style>
       </p:cxnSp>
-      <p:cxnSp>
-        <p:nvCxnSpPr>
-          <p:cNvPr id="94" name="Elbow Connector 93">
-            <a:extLst>
-              <a:ext uri="{FF2B5EF4-FFF2-40B4-BE49-F238E27FC236}">
-                <a16:creationId xmlns:a16="http://schemas.microsoft.com/office/drawing/2014/main" id="{18CFA234-0B01-A448-B730-3E7545240FE8}"/>
-              </a:ext>
-            </a:extLst>
-          </p:cNvPr>
-          <p:cNvCxnSpPr>
-            <a:stCxn id="86" idx="2"/>
-            <a:endCxn id="90" idx="0"/>
-          </p:cNvCxnSpPr>
-          <p:nvPr/>
-        </p:nvCxnSpPr>
-        <p:spPr>
-          <a:xfrm rot="16200000" flipH="1">
-            <a:off x="1305805" y="2545833"/>
-            <a:ext cx="483464" cy="1322038"/>
-          </a:xfrm>
-          <a:prstGeom prst="bentConnector3">
-            <a:avLst/>
-          </a:prstGeom>
-          <a:ln>
-            <a:tailEnd type="triangle"/>
-          </a:ln>
-        </p:spPr>
-        <p:style>
-          <a:lnRef idx="1">
-            <a:schemeClr val="accent1"/>
-          </a:lnRef>
-          <a:fillRef idx="0">
-            <a:schemeClr val="accent1"/>
-          </a:fillRef>
-          <a:effectRef idx="0">
-            <a:schemeClr val="accent1"/>
-          </a:effectRef>
-          <a:fontRef idx="minor">
-            <a:schemeClr val="tx1"/>
-          </a:fontRef>
-        </p:style>
-      </p:cxnSp>
-      <p:sp>
-        <p:nvSpPr>
-          <p:cNvPr id="108" name="Rectangle 107">
-            <a:extLst>
-              <a:ext uri="{FF2B5EF4-FFF2-40B4-BE49-F238E27FC236}">
-                <a16:creationId xmlns:a16="http://schemas.microsoft.com/office/drawing/2014/main" id="{69C643E7-E7AF-474F-98EE-F06A0DF04FE8}"/>
+      <p:sp>
+        <p:nvSpPr>
+          <p:cNvPr id="158" name="Rectangle 157">
+            <a:extLst>
+              <a:ext uri="{FF2B5EF4-FFF2-40B4-BE49-F238E27FC236}">
+                <a16:creationId xmlns:a16="http://schemas.microsoft.com/office/drawing/2014/main" id="{44F03AFF-082E-DF41-A880-9384C50077F3}"/>
               </a:ext>
             </a:extLst>
           </p:cNvPr>
@@ -5156,8 +5892,8 @@
         </p:nvSpPr>
         <p:spPr>
           <a:xfrm>
-            <a:off x="3024255" y="3448583"/>
-            <a:ext cx="1669512" cy="359595"/>
+            <a:off x="6687404" y="1795022"/>
+            <a:ext cx="1291264" cy="359595"/>
           </a:xfrm>
           <a:prstGeom prst="rect">
             <a:avLst/>
@@ -5201,7 +5937,7 @@
                   <a:schemeClr val="tx1"/>
                 </a:solidFill>
               </a:rPr>
-              <a:t>medstar_detect.feather</a:t>
+              <a:t>client_data.feather</a:t>
             </a:r>
             <a:endParaRPr lang="en-US" sz="1100" dirty="0">
               <a:solidFill>
@@ -5211,348 +5947,12 @@
           </a:p>
         </p:txBody>
       </p:sp>
-      <p:cxnSp>
-        <p:nvCxnSpPr>
-          <p:cNvPr id="113" name="Straight Arrow Connector 112">
-            <a:extLst>
-              <a:ext uri="{FF2B5EF4-FFF2-40B4-BE49-F238E27FC236}">
-                <a16:creationId xmlns:a16="http://schemas.microsoft.com/office/drawing/2014/main" id="{B27F98B6-6374-664A-B4F6-0C719AC61FC7}"/>
-              </a:ext>
-            </a:extLst>
-          </p:cNvPr>
-          <p:cNvCxnSpPr>
-            <a:stCxn id="74" idx="2"/>
-            <a:endCxn id="79" idx="0"/>
-          </p:cNvCxnSpPr>
-          <p:nvPr/>
-        </p:nvCxnSpPr>
-        <p:spPr>
-          <a:xfrm flipH="1">
-            <a:off x="5918840" y="491248"/>
-            <a:ext cx="1" cy="2114184"/>
-          </a:xfrm>
-          <a:prstGeom prst="straightConnector1">
-            <a:avLst/>
-          </a:prstGeom>
-          <a:ln>
-            <a:tailEnd type="triangle"/>
-          </a:ln>
-        </p:spPr>
-        <p:style>
-          <a:lnRef idx="1">
-            <a:schemeClr val="accent1"/>
-          </a:lnRef>
-          <a:fillRef idx="0">
-            <a:schemeClr val="accent1"/>
-          </a:fillRef>
-          <a:effectRef idx="0">
-            <a:schemeClr val="accent1"/>
-          </a:effectRef>
-          <a:fontRef idx="minor">
-            <a:schemeClr val="tx1"/>
-          </a:fontRef>
-        </p:style>
-      </p:cxnSp>
-      <p:cxnSp>
-        <p:nvCxnSpPr>
-          <p:cNvPr id="123" name="Elbow Connector 122">
-            <a:extLst>
-              <a:ext uri="{FF2B5EF4-FFF2-40B4-BE49-F238E27FC236}">
-                <a16:creationId xmlns:a16="http://schemas.microsoft.com/office/drawing/2014/main" id="{AC129749-74FF-4F4E-822E-83FC6BD402EA}"/>
-              </a:ext>
-            </a:extLst>
-          </p:cNvPr>
-          <p:cNvCxnSpPr>
-            <a:stCxn id="72" idx="2"/>
-            <a:endCxn id="83" idx="0"/>
-          </p:cNvCxnSpPr>
-          <p:nvPr/>
-        </p:nvCxnSpPr>
-        <p:spPr>
-          <a:xfrm rot="5400000">
-            <a:off x="706526" y="1340570"/>
-            <a:ext cx="465854" cy="443055"/>
-          </a:xfrm>
-          <a:prstGeom prst="bentConnector3">
-            <a:avLst/>
-          </a:prstGeom>
-          <a:ln>
-            <a:tailEnd type="triangle"/>
-          </a:ln>
-        </p:spPr>
-        <p:style>
-          <a:lnRef idx="1">
-            <a:schemeClr val="accent1"/>
-          </a:lnRef>
-          <a:fillRef idx="0">
-            <a:schemeClr val="accent1"/>
-          </a:fillRef>
-          <a:effectRef idx="0">
-            <a:schemeClr val="accent1"/>
-          </a:effectRef>
-          <a:fontRef idx="minor">
-            <a:schemeClr val="tx1"/>
-          </a:fontRef>
-        </p:style>
-      </p:cxnSp>
-      <p:cxnSp>
-        <p:nvCxnSpPr>
-          <p:cNvPr id="129" name="Elbow Connector 128">
-            <a:extLst>
-              <a:ext uri="{FF2B5EF4-FFF2-40B4-BE49-F238E27FC236}">
-                <a16:creationId xmlns:a16="http://schemas.microsoft.com/office/drawing/2014/main" id="{64CA426E-7437-D94E-9E8F-10110C751DCA}"/>
-              </a:ext>
-            </a:extLst>
-          </p:cNvPr>
-          <p:cNvCxnSpPr>
-            <a:stCxn id="83" idx="2"/>
-            <a:endCxn id="86" idx="0"/>
-          </p:cNvCxnSpPr>
-          <p:nvPr/>
-        </p:nvCxnSpPr>
-        <p:spPr>
-          <a:xfrm rot="16200000" flipH="1">
-            <a:off x="576768" y="2295775"/>
-            <a:ext cx="450906" cy="168593"/>
-          </a:xfrm>
-          <a:prstGeom prst="bentConnector3">
-            <a:avLst/>
-          </a:prstGeom>
-          <a:ln>
-            <a:tailEnd type="triangle"/>
-          </a:ln>
-        </p:spPr>
-        <p:style>
-          <a:lnRef idx="1">
-            <a:schemeClr val="accent1"/>
-          </a:lnRef>
-          <a:fillRef idx="0">
-            <a:schemeClr val="accent1"/>
-          </a:fillRef>
-          <a:effectRef idx="0">
-            <a:schemeClr val="accent1"/>
-          </a:effectRef>
-          <a:fontRef idx="minor">
-            <a:schemeClr val="tx1"/>
-          </a:fontRef>
-        </p:style>
-      </p:cxnSp>
-      <p:cxnSp>
-        <p:nvCxnSpPr>
-          <p:cNvPr id="133" name="Elbow Connector 132">
-            <a:extLst>
-              <a:ext uri="{FF2B5EF4-FFF2-40B4-BE49-F238E27FC236}">
-                <a16:creationId xmlns:a16="http://schemas.microsoft.com/office/drawing/2014/main" id="{46CD9EDE-D943-1B4D-AA39-7E9D6674E8C6}"/>
-              </a:ext>
-            </a:extLst>
-          </p:cNvPr>
-          <p:cNvCxnSpPr>
-            <a:stCxn id="72" idx="2"/>
-            <a:endCxn id="82" idx="0"/>
-          </p:cNvCxnSpPr>
-          <p:nvPr/>
-        </p:nvCxnSpPr>
-        <p:spPr>
-          <a:xfrm rot="16200000" flipH="1">
-            <a:off x="1484327" y="1005822"/>
-            <a:ext cx="465854" cy="1112549"/>
-          </a:xfrm>
-          <a:prstGeom prst="bentConnector3">
-            <a:avLst/>
-          </a:prstGeom>
-          <a:ln>
-            <a:tailEnd type="triangle"/>
-          </a:ln>
-        </p:spPr>
-        <p:style>
-          <a:lnRef idx="1">
-            <a:schemeClr val="accent1"/>
-          </a:lnRef>
-          <a:fillRef idx="0">
-            <a:schemeClr val="accent1"/>
-          </a:fillRef>
-          <a:effectRef idx="0">
-            <a:schemeClr val="accent1"/>
-          </a:effectRef>
-          <a:fontRef idx="minor">
-            <a:schemeClr val="tx1"/>
-          </a:fontRef>
-        </p:style>
-      </p:cxnSp>
-      <p:cxnSp>
-        <p:nvCxnSpPr>
-          <p:cNvPr id="140" name="Elbow Connector 139">
-            <a:extLst>
-              <a:ext uri="{FF2B5EF4-FFF2-40B4-BE49-F238E27FC236}">
-                <a16:creationId xmlns:a16="http://schemas.microsoft.com/office/drawing/2014/main" id="{3DD49759-4F3F-7842-9805-7BF6A2D4F972}"/>
-              </a:ext>
-            </a:extLst>
-          </p:cNvPr>
-          <p:cNvCxnSpPr>
-            <a:stCxn id="82" idx="2"/>
-            <a:endCxn id="73" idx="0"/>
-          </p:cNvCxnSpPr>
-          <p:nvPr/>
-        </p:nvCxnSpPr>
-        <p:spPr>
-          <a:xfrm rot="16200000" flipH="1">
-            <a:off x="2842874" y="1585274"/>
-            <a:ext cx="446792" cy="1585482"/>
-          </a:xfrm>
-          <a:prstGeom prst="bentConnector3">
-            <a:avLst/>
-          </a:prstGeom>
-          <a:ln>
-            <a:tailEnd type="triangle"/>
-          </a:ln>
-        </p:spPr>
-        <p:style>
-          <a:lnRef idx="1">
-            <a:schemeClr val="accent1"/>
-          </a:lnRef>
-          <a:fillRef idx="0">
-            <a:schemeClr val="accent1"/>
-          </a:fillRef>
-          <a:effectRef idx="0">
-            <a:schemeClr val="accent1"/>
-          </a:effectRef>
-          <a:fontRef idx="minor">
-            <a:schemeClr val="tx1"/>
-          </a:fontRef>
-        </p:style>
-      </p:cxnSp>
-      <p:cxnSp>
-        <p:nvCxnSpPr>
-          <p:cNvPr id="142" name="Straight Arrow Connector 141">
-            <a:extLst>
-              <a:ext uri="{FF2B5EF4-FFF2-40B4-BE49-F238E27FC236}">
-                <a16:creationId xmlns:a16="http://schemas.microsoft.com/office/drawing/2014/main" id="{14A689C8-E292-4945-81E5-C49660111868}"/>
-              </a:ext>
-            </a:extLst>
-          </p:cNvPr>
-          <p:cNvCxnSpPr>
-            <a:stCxn id="7" idx="2"/>
-            <a:endCxn id="73" idx="0"/>
-          </p:cNvCxnSpPr>
-          <p:nvPr/>
-        </p:nvCxnSpPr>
-        <p:spPr>
-          <a:xfrm>
-            <a:off x="3859011" y="498677"/>
-            <a:ext cx="0" cy="2102734"/>
-          </a:xfrm>
-          <a:prstGeom prst="straightConnector1">
-            <a:avLst/>
-          </a:prstGeom>
-          <a:ln>
-            <a:tailEnd type="triangle"/>
-          </a:ln>
-        </p:spPr>
-        <p:style>
-          <a:lnRef idx="1">
-            <a:schemeClr val="accent1"/>
-          </a:lnRef>
-          <a:fillRef idx="0">
-            <a:schemeClr val="accent1"/>
-          </a:fillRef>
-          <a:effectRef idx="0">
-            <a:schemeClr val="accent1"/>
-          </a:effectRef>
-          <a:fontRef idx="minor">
-            <a:schemeClr val="tx1"/>
-          </a:fontRef>
-        </p:style>
-      </p:cxnSp>
-      <p:cxnSp>
-        <p:nvCxnSpPr>
-          <p:cNvPr id="144" name="Straight Arrow Connector 143">
-            <a:extLst>
-              <a:ext uri="{FF2B5EF4-FFF2-40B4-BE49-F238E27FC236}">
-                <a16:creationId xmlns:a16="http://schemas.microsoft.com/office/drawing/2014/main" id="{BC1A9A62-A138-E64B-B314-AAAC64B07B05}"/>
-              </a:ext>
-            </a:extLst>
-          </p:cNvPr>
-          <p:cNvCxnSpPr>
-            <a:stCxn id="73" idx="2"/>
-            <a:endCxn id="108" idx="0"/>
-          </p:cNvCxnSpPr>
-          <p:nvPr/>
-        </p:nvCxnSpPr>
-        <p:spPr>
-          <a:xfrm>
-            <a:off x="3859011" y="2961006"/>
-            <a:ext cx="0" cy="487577"/>
-          </a:xfrm>
-          <a:prstGeom prst="straightConnector1">
-            <a:avLst/>
-          </a:prstGeom>
-          <a:ln>
-            <a:tailEnd type="triangle"/>
-          </a:ln>
-        </p:spPr>
-        <p:style>
-          <a:lnRef idx="1">
-            <a:schemeClr val="accent1"/>
-          </a:lnRef>
-          <a:fillRef idx="0">
-            <a:schemeClr val="accent1"/>
-          </a:fillRef>
-          <a:effectRef idx="0">
-            <a:schemeClr val="accent1"/>
-          </a:effectRef>
-          <a:fontRef idx="minor">
-            <a:schemeClr val="tx1"/>
-          </a:fontRef>
-        </p:style>
-      </p:cxnSp>
-      <p:cxnSp>
-        <p:nvCxnSpPr>
-          <p:cNvPr id="146" name="Elbow Connector 145">
-            <a:extLst>
-              <a:ext uri="{FF2B5EF4-FFF2-40B4-BE49-F238E27FC236}">
-                <a16:creationId xmlns:a16="http://schemas.microsoft.com/office/drawing/2014/main" id="{B22A7AB4-026D-614F-8377-04AFB7453BC8}"/>
-              </a:ext>
-            </a:extLst>
-          </p:cNvPr>
-          <p:cNvCxnSpPr>
-            <a:stCxn id="82" idx="2"/>
-            <a:endCxn id="79" idx="0"/>
-          </p:cNvCxnSpPr>
-          <p:nvPr/>
-        </p:nvCxnSpPr>
-        <p:spPr>
-          <a:xfrm rot="16200000" flipH="1">
-            <a:off x="3870778" y="557369"/>
-            <a:ext cx="450813" cy="3645311"/>
-          </a:xfrm>
-          <a:prstGeom prst="bentConnector3">
-            <a:avLst/>
-          </a:prstGeom>
-          <a:ln>
-            <a:tailEnd type="triangle"/>
-          </a:ln>
-        </p:spPr>
-        <p:style>
-          <a:lnRef idx="1">
-            <a:schemeClr val="accent1"/>
-          </a:lnRef>
-          <a:fillRef idx="0">
-            <a:schemeClr val="accent1"/>
-          </a:fillRef>
-          <a:effectRef idx="0">
-            <a:schemeClr val="accent1"/>
-          </a:effectRef>
-          <a:fontRef idx="minor">
-            <a:schemeClr val="tx1"/>
-          </a:fontRef>
-        </p:style>
-      </p:cxnSp>
-      <p:sp>
-        <p:nvSpPr>
-          <p:cNvPr id="147" name="Rectangle 146">
-            <a:extLst>
-              <a:ext uri="{FF2B5EF4-FFF2-40B4-BE49-F238E27FC236}">
-                <a16:creationId xmlns:a16="http://schemas.microsoft.com/office/drawing/2014/main" id="{49E50B93-BA68-3946-ABD3-572EB7F8F2DC}"/>
+      <p:sp>
+        <p:nvSpPr>
+          <p:cNvPr id="159" name="Rectangle 158">
+            <a:extLst>
+              <a:ext uri="{FF2B5EF4-FFF2-40B4-BE49-F238E27FC236}">
+                <a16:creationId xmlns:a16="http://schemas.microsoft.com/office/drawing/2014/main" id="{522FC733-1B49-4643-88C9-9FEB5D8A368F}"/>
               </a:ext>
             </a:extLst>
           </p:cNvPr>
@@ -5561,8 +5961,8 @@
         </p:nvSpPr>
         <p:spPr>
           <a:xfrm>
-            <a:off x="5080673" y="3448582"/>
-            <a:ext cx="1669512" cy="359595"/>
+            <a:off x="8101599" y="1795021"/>
+            <a:ext cx="1291264" cy="359595"/>
           </a:xfrm>
           <a:prstGeom prst="rect">
             <a:avLst/>
@@ -5606,7 +6006,7 @@
                   <a:schemeClr val="tx1"/>
                 </a:solidFill>
               </a:rPr>
-              <a:t>medstar_health.feather</a:t>
+              <a:t>allegations.feather</a:t>
             </a:r>
             <a:endParaRPr lang="en-US" sz="1100" dirty="0">
               <a:solidFill>
@@ -5616,27 +6016,165 @@
           </a:p>
         </p:txBody>
       </p:sp>
+      <p:sp>
+        <p:nvSpPr>
+          <p:cNvPr id="160" name="Rectangle 159">
+            <a:extLst>
+              <a:ext uri="{FF2B5EF4-FFF2-40B4-BE49-F238E27FC236}">
+                <a16:creationId xmlns:a16="http://schemas.microsoft.com/office/drawing/2014/main" id="{303D8A20-9E57-4F4D-81FA-1BF3EBB1A23B}"/>
+              </a:ext>
+            </a:extLst>
+          </p:cNvPr>
+          <p:cNvSpPr/>
+          <p:nvPr/>
+        </p:nvSpPr>
+        <p:spPr>
+          <a:xfrm>
+            <a:off x="9515794" y="1792927"/>
+            <a:ext cx="1098652" cy="359595"/>
+          </a:xfrm>
+          <a:prstGeom prst="rect">
+            <a:avLst/>
+          </a:prstGeom>
+          <a:solidFill>
+            <a:schemeClr val="accent2">
+              <a:lumMod val="20000"/>
+              <a:lumOff val="80000"/>
+            </a:schemeClr>
+          </a:solidFill>
+          <a:ln>
+            <a:solidFill>
+              <a:schemeClr val="tx1"/>
+            </a:solidFill>
+          </a:ln>
+        </p:spPr>
+        <p:style>
+          <a:lnRef idx="2">
+            <a:schemeClr val="accent1">
+              <a:shade val="50000"/>
+            </a:schemeClr>
+          </a:lnRef>
+          <a:fillRef idx="1">
+            <a:schemeClr val="accent1"/>
+          </a:fillRef>
+          <a:effectRef idx="0">
+            <a:schemeClr val="accent1"/>
+          </a:effectRef>
+          <a:fontRef idx="minor">
+            <a:schemeClr val="lt1"/>
+          </a:fontRef>
+        </p:style>
+        <p:txBody>
+          <a:bodyPr rtlCol="0" anchor="ctr"/>
+          <a:lstStyle/>
+          <a:p>
+            <a:pPr algn="ctr"/>
+            <a:r>
+              <a:rPr lang="en-US" sz="1100" dirty="0" err="1">
+                <a:solidFill>
+                  <a:schemeClr val="tx1"/>
+                </a:solidFill>
+              </a:rPr>
+              <a:t>closure.feather</a:t>
+            </a:r>
+            <a:endParaRPr lang="en-US" sz="1100" dirty="0">
+              <a:solidFill>
+                <a:schemeClr val="tx1"/>
+              </a:solidFill>
+            </a:endParaRPr>
+          </a:p>
+        </p:txBody>
+      </p:sp>
+      <p:sp>
+        <p:nvSpPr>
+          <p:cNvPr id="161" name="Rectangle 160">
+            <a:extLst>
+              <a:ext uri="{FF2B5EF4-FFF2-40B4-BE49-F238E27FC236}">
+                <a16:creationId xmlns:a16="http://schemas.microsoft.com/office/drawing/2014/main" id="{673D0193-BE63-6E41-AA5B-D266097DF22D}"/>
+              </a:ext>
+            </a:extLst>
+          </p:cNvPr>
+          <p:cNvSpPr/>
+          <p:nvPr/>
+        </p:nvSpPr>
+        <p:spPr>
+          <a:xfrm>
+            <a:off x="10737376" y="1792926"/>
+            <a:ext cx="1262839" cy="359595"/>
+          </a:xfrm>
+          <a:prstGeom prst="rect">
+            <a:avLst/>
+          </a:prstGeom>
+          <a:solidFill>
+            <a:schemeClr val="accent2">
+              <a:lumMod val="20000"/>
+              <a:lumOff val="80000"/>
+            </a:schemeClr>
+          </a:solidFill>
+          <a:ln>
+            <a:solidFill>
+              <a:schemeClr val="tx1"/>
+            </a:solidFill>
+          </a:ln>
+        </p:spPr>
+        <p:style>
+          <a:lnRef idx="2">
+            <a:schemeClr val="accent1">
+              <a:shade val="50000"/>
+            </a:schemeClr>
+          </a:lnRef>
+          <a:fillRef idx="1">
+            <a:schemeClr val="accent1"/>
+          </a:fillRef>
+          <a:effectRef idx="0">
+            <a:schemeClr val="accent1"/>
+          </a:effectRef>
+          <a:fontRef idx="minor">
+            <a:schemeClr val="lt1"/>
+          </a:fontRef>
+        </p:style>
+        <p:txBody>
+          <a:bodyPr rtlCol="0" anchor="ctr"/>
+          <a:lstStyle/>
+          <a:p>
+            <a:pPr algn="ctr"/>
+            <a:r>
+              <a:rPr lang="en-US" sz="1100" dirty="0" err="1">
+                <a:solidFill>
+                  <a:schemeClr val="tx1"/>
+                </a:solidFill>
+              </a:rPr>
+              <a:t>disposition.feather</a:t>
+            </a:r>
+            <a:endParaRPr lang="en-US" sz="1100" dirty="0">
+              <a:solidFill>
+                <a:schemeClr val="tx1"/>
+              </a:solidFill>
+            </a:endParaRPr>
+          </a:p>
+        </p:txBody>
+      </p:sp>
       <p:cxnSp>
         <p:nvCxnSpPr>
-          <p:cNvPr id="149" name="Straight Arrow Connector 148">
-            <a:extLst>
-              <a:ext uri="{FF2B5EF4-FFF2-40B4-BE49-F238E27FC236}">
-                <a16:creationId xmlns:a16="http://schemas.microsoft.com/office/drawing/2014/main" id="{BD05C671-3F06-784E-AF3A-EBBB65FE1977}"/>
+          <p:cNvPr id="163" name="Elbow Connector 162">
+            <a:extLst>
+              <a:ext uri="{FF2B5EF4-FFF2-40B4-BE49-F238E27FC236}">
+                <a16:creationId xmlns:a16="http://schemas.microsoft.com/office/drawing/2014/main" id="{EA2BB82C-59E4-FD4A-BB5B-04A8D117585A}"/>
               </a:ext>
             </a:extLst>
           </p:cNvPr>
           <p:cNvCxnSpPr>
-            <a:stCxn id="79" idx="2"/>
-            <a:endCxn id="147" idx="0"/>
+            <a:stCxn id="81" idx="2"/>
+            <a:endCxn id="158" idx="0"/>
           </p:cNvCxnSpPr>
           <p:nvPr/>
         </p:nvCxnSpPr>
         <p:spPr>
-          <a:xfrm flipH="1">
-            <a:off x="5915429" y="2965027"/>
-            <a:ext cx="3411" cy="483555"/>
-          </a:xfrm>
-          <a:prstGeom prst="straightConnector1">
+          <a:xfrm rot="5400000">
+            <a:off x="8033571" y="640330"/>
+            <a:ext cx="454157" cy="1855226"/>
+          </a:xfrm>
+          <a:prstGeom prst="bentConnector3">
             <a:avLst/>
           </a:prstGeom>
           <a:ln>
@@ -5658,12 +6196,138 @@
           </a:fontRef>
         </p:style>
       </p:cxnSp>
-      <p:sp>
-        <p:nvSpPr>
-          <p:cNvPr id="150" name="Rectangle 149">
-            <a:extLst>
-              <a:ext uri="{FF2B5EF4-FFF2-40B4-BE49-F238E27FC236}">
-                <a16:creationId xmlns:a16="http://schemas.microsoft.com/office/drawing/2014/main" id="{F8C39AA5-26AC-5E4E-8931-8AF5E30CDA7A}"/>
+      <p:cxnSp>
+        <p:nvCxnSpPr>
+          <p:cNvPr id="165" name="Elbow Connector 164">
+            <a:extLst>
+              <a:ext uri="{FF2B5EF4-FFF2-40B4-BE49-F238E27FC236}">
+                <a16:creationId xmlns:a16="http://schemas.microsoft.com/office/drawing/2014/main" id="{908549B4-1C54-714A-A5A7-11CA7C0407CE}"/>
+              </a:ext>
+            </a:extLst>
+          </p:cNvPr>
+          <p:cNvCxnSpPr>
+            <a:stCxn id="81" idx="2"/>
+            <a:endCxn id="159" idx="0"/>
+          </p:cNvCxnSpPr>
+          <p:nvPr/>
+        </p:nvCxnSpPr>
+        <p:spPr>
+          <a:xfrm rot="5400000">
+            <a:off x="8740669" y="1347428"/>
+            <a:ext cx="454156" cy="441031"/>
+          </a:xfrm>
+          <a:prstGeom prst="bentConnector3">
+            <a:avLst/>
+          </a:prstGeom>
+          <a:ln>
+            <a:tailEnd type="triangle"/>
+          </a:ln>
+        </p:spPr>
+        <p:style>
+          <a:lnRef idx="1">
+            <a:schemeClr val="accent1"/>
+          </a:lnRef>
+          <a:fillRef idx="0">
+            <a:schemeClr val="accent1"/>
+          </a:fillRef>
+          <a:effectRef idx="0">
+            <a:schemeClr val="accent1"/>
+          </a:effectRef>
+          <a:fontRef idx="minor">
+            <a:schemeClr val="tx1"/>
+          </a:fontRef>
+        </p:style>
+      </p:cxnSp>
+      <p:cxnSp>
+        <p:nvCxnSpPr>
+          <p:cNvPr id="167" name="Elbow Connector 166">
+            <a:extLst>
+              <a:ext uri="{FF2B5EF4-FFF2-40B4-BE49-F238E27FC236}">
+                <a16:creationId xmlns:a16="http://schemas.microsoft.com/office/drawing/2014/main" id="{B7842AC4-D5DA-1248-9A84-226E67CD1DFE}"/>
+              </a:ext>
+            </a:extLst>
+          </p:cNvPr>
+          <p:cNvCxnSpPr>
+            <a:stCxn id="81" idx="2"/>
+            <a:endCxn id="160" idx="0"/>
+          </p:cNvCxnSpPr>
+          <p:nvPr/>
+        </p:nvCxnSpPr>
+        <p:spPr>
+          <a:xfrm rot="16200000" flipH="1">
+            <a:off x="9400660" y="1128467"/>
+            <a:ext cx="452062" cy="876858"/>
+          </a:xfrm>
+          <a:prstGeom prst="bentConnector3">
+            <a:avLst/>
+          </a:prstGeom>
+          <a:ln>
+            <a:tailEnd type="triangle"/>
+          </a:ln>
+        </p:spPr>
+        <p:style>
+          <a:lnRef idx="1">
+            <a:schemeClr val="accent1"/>
+          </a:lnRef>
+          <a:fillRef idx="0">
+            <a:schemeClr val="accent1"/>
+          </a:fillRef>
+          <a:effectRef idx="0">
+            <a:schemeClr val="accent1"/>
+          </a:effectRef>
+          <a:fontRef idx="minor">
+            <a:schemeClr val="tx1"/>
+          </a:fontRef>
+        </p:style>
+      </p:cxnSp>
+      <p:cxnSp>
+        <p:nvCxnSpPr>
+          <p:cNvPr id="169" name="Elbow Connector 168">
+            <a:extLst>
+              <a:ext uri="{FF2B5EF4-FFF2-40B4-BE49-F238E27FC236}">
+                <a16:creationId xmlns:a16="http://schemas.microsoft.com/office/drawing/2014/main" id="{D0C10965-986C-824A-A434-4503EBF45968}"/>
+              </a:ext>
+            </a:extLst>
+          </p:cNvPr>
+          <p:cNvCxnSpPr>
+            <a:stCxn id="81" idx="2"/>
+            <a:endCxn id="161" idx="0"/>
+          </p:cNvCxnSpPr>
+          <p:nvPr/>
+        </p:nvCxnSpPr>
+        <p:spPr>
+          <a:xfrm rot="16200000" flipH="1">
+            <a:off x="10052499" y="476628"/>
+            <a:ext cx="452061" cy="2180534"/>
+          </a:xfrm>
+          <a:prstGeom prst="bentConnector3">
+            <a:avLst/>
+          </a:prstGeom>
+          <a:ln>
+            <a:tailEnd type="triangle"/>
+          </a:ln>
+        </p:spPr>
+        <p:style>
+          <a:lnRef idx="1">
+            <a:schemeClr val="accent1"/>
+          </a:lnRef>
+          <a:fillRef idx="0">
+            <a:schemeClr val="accent1"/>
+          </a:fillRef>
+          <a:effectRef idx="0">
+            <a:schemeClr val="accent1"/>
+          </a:effectRef>
+          <a:fontRef idx="minor">
+            <a:schemeClr val="tx1"/>
+          </a:fontRef>
+        </p:style>
+      </p:cxnSp>
+      <p:sp>
+        <p:nvSpPr>
+          <p:cNvPr id="170" name="Rectangle 169">
+            <a:extLst>
+              <a:ext uri="{FF2B5EF4-FFF2-40B4-BE49-F238E27FC236}">
+                <a16:creationId xmlns:a16="http://schemas.microsoft.com/office/drawing/2014/main" id="{8824FD08-8F57-5244-8D81-31D180365A6C}"/>
               </a:ext>
             </a:extLst>
           </p:cNvPr>
@@ -5672,8 +6336,8 @@
         </p:nvSpPr>
         <p:spPr>
           <a:xfrm>
-            <a:off x="3537963" y="4172160"/>
-            <a:ext cx="2554612" cy="359595"/>
+            <a:off x="5986984" y="5607010"/>
+            <a:ext cx="2692103" cy="359595"/>
           </a:xfrm>
           <a:prstGeom prst="rect">
             <a:avLst/>
@@ -5717,33 +6381,36 @@
                   <a:schemeClr val="tx1"/>
                 </a:solidFill>
               </a:rPr>
-              <a:t>data_medstar_complete_01_merge.Rmd</a:t>
+              <a:t>data_medstar_aps_merged_01_merge.Rmd</a:t>
             </a:r>
           </a:p>
         </p:txBody>
       </p:sp>
       <p:cxnSp>
         <p:nvCxnSpPr>
-          <p:cNvPr id="152" name="Elbow Connector 151">
-            <a:extLst>
-              <a:ext uri="{FF2B5EF4-FFF2-40B4-BE49-F238E27FC236}">
-                <a16:creationId xmlns:a16="http://schemas.microsoft.com/office/drawing/2014/main" id="{40386164-9432-4344-810C-DEA30BCF1095}"/>
+          <p:cNvPr id="172" name="Elbow Connector 171">
+            <a:extLst>
+              <a:ext uri="{FF2B5EF4-FFF2-40B4-BE49-F238E27FC236}">
+                <a16:creationId xmlns:a16="http://schemas.microsoft.com/office/drawing/2014/main" id="{359C8F58-CB38-3246-80F1-BB8554718DFE}"/>
               </a:ext>
             </a:extLst>
           </p:cNvPr>
           <p:cNvCxnSpPr>
-            <a:stCxn id="108" idx="2"/>
-            <a:endCxn id="150" idx="0"/>
+            <a:cxnSpLocks/>
+            <a:stCxn id="155" idx="2"/>
+            <a:endCxn id="170" idx="0"/>
           </p:cNvCxnSpPr>
           <p:nvPr/>
         </p:nvCxnSpPr>
         <p:spPr>
           <a:xfrm rot="16200000" flipH="1">
-            <a:off x="4155149" y="3512040"/>
-            <a:ext cx="363982" cy="956258"/>
+            <a:off x="6149855" y="4423828"/>
+            <a:ext cx="352023" cy="2014339"/>
           </a:xfrm>
           <a:prstGeom prst="bentConnector3">
-            <a:avLst/>
+            <a:avLst>
+              <a:gd name="adj1" fmla="val 50000"/>
+            </a:avLst>
           </a:prstGeom>
           <a:ln>
             <a:tailEnd type="triangle"/>
@@ -5766,23 +6433,67 @@
       </p:cxnSp>
       <p:cxnSp>
         <p:nvCxnSpPr>
-          <p:cNvPr id="154" name="Elbow Connector 153">
-            <a:extLst>
-              <a:ext uri="{FF2B5EF4-FFF2-40B4-BE49-F238E27FC236}">
-                <a16:creationId xmlns:a16="http://schemas.microsoft.com/office/drawing/2014/main" id="{9B98925A-F6CE-9E40-8104-81B31938E344}"/>
+          <p:cNvPr id="183" name="Elbow Connector 182">
+            <a:extLst>
+              <a:ext uri="{FF2B5EF4-FFF2-40B4-BE49-F238E27FC236}">
+                <a16:creationId xmlns:a16="http://schemas.microsoft.com/office/drawing/2014/main" id="{15DAB329-12E9-054D-AFA1-F703C9FD877A}"/>
               </a:ext>
             </a:extLst>
           </p:cNvPr>
           <p:cNvCxnSpPr>
-            <a:stCxn id="147" idx="2"/>
-            <a:endCxn id="150" idx="0"/>
+            <a:cxnSpLocks/>
+            <a:stCxn id="159" idx="2"/>
+            <a:endCxn id="170" idx="0"/>
           </p:cNvCxnSpPr>
           <p:nvPr/>
         </p:nvCxnSpPr>
         <p:spPr>
           <a:xfrm rot="5400000">
-            <a:off x="5183358" y="3440088"/>
-            <a:ext cx="363983" cy="1100160"/>
+            <a:off x="6313937" y="3173716"/>
+            <a:ext cx="3452394" cy="1414195"/>
+          </a:xfrm>
+          <a:prstGeom prst="bentConnector3">
+            <a:avLst>
+              <a:gd name="adj1" fmla="val 50000"/>
+            </a:avLst>
+          </a:prstGeom>
+          <a:ln>
+            <a:tailEnd type="triangle"/>
+          </a:ln>
+        </p:spPr>
+        <p:style>
+          <a:lnRef idx="1">
+            <a:schemeClr val="accent1"/>
+          </a:lnRef>
+          <a:fillRef idx="0">
+            <a:schemeClr val="accent1"/>
+          </a:fillRef>
+          <a:effectRef idx="0">
+            <a:schemeClr val="accent1"/>
+          </a:effectRef>
+          <a:fontRef idx="minor">
+            <a:schemeClr val="tx1"/>
+          </a:fontRef>
+        </p:style>
+      </p:cxnSp>
+      <p:cxnSp>
+        <p:nvCxnSpPr>
+          <p:cNvPr id="186" name="Elbow Connector 185">
+            <a:extLst>
+              <a:ext uri="{FF2B5EF4-FFF2-40B4-BE49-F238E27FC236}">
+                <a16:creationId xmlns:a16="http://schemas.microsoft.com/office/drawing/2014/main" id="{175207CF-576F-0F4A-A22B-3AAC95CACEB1}"/>
+              </a:ext>
+            </a:extLst>
+          </p:cNvPr>
+          <p:cNvCxnSpPr>
+            <a:stCxn id="160" idx="2"/>
+          </p:cNvCxnSpPr>
+          <p:nvPr/>
+        </p:nvCxnSpPr>
+        <p:spPr>
+          <a:xfrm rot="5400000">
+            <a:off x="6967431" y="2520935"/>
+            <a:ext cx="3466102" cy="2729276"/>
           </a:xfrm>
           <a:prstGeom prst="bentConnector3">
             <a:avLst/>
@@ -5806,12 +6517,182 @@
           </a:fontRef>
         </p:style>
       </p:cxnSp>
-      <p:sp>
-        <p:nvSpPr>
-          <p:cNvPr id="155" name="Rectangle 154">
-            <a:extLst>
-              <a:ext uri="{FF2B5EF4-FFF2-40B4-BE49-F238E27FC236}">
-                <a16:creationId xmlns:a16="http://schemas.microsoft.com/office/drawing/2014/main" id="{7F03C1E2-5164-9347-AE1F-F2A4BB75D0AF}"/>
+      <p:cxnSp>
+        <p:nvCxnSpPr>
+          <p:cNvPr id="188" name="Elbow Connector 187">
+            <a:extLst>
+              <a:ext uri="{FF2B5EF4-FFF2-40B4-BE49-F238E27FC236}">
+                <a16:creationId xmlns:a16="http://schemas.microsoft.com/office/drawing/2014/main" id="{80F79231-989F-F74E-B30E-321B1A7FF9C2}"/>
+              </a:ext>
+            </a:extLst>
+          </p:cNvPr>
+          <p:cNvCxnSpPr>
+            <a:cxnSpLocks/>
+            <a:stCxn id="161" idx="2"/>
+            <a:endCxn id="170" idx="0"/>
+          </p:cNvCxnSpPr>
+          <p:nvPr/>
+        </p:nvCxnSpPr>
+        <p:spPr>
+          <a:xfrm rot="5400000">
+            <a:off x="7623672" y="1861885"/>
+            <a:ext cx="3454489" cy="4035760"/>
+          </a:xfrm>
+          <a:prstGeom prst="bentConnector3">
+            <a:avLst/>
+          </a:prstGeom>
+          <a:ln>
+            <a:tailEnd type="triangle"/>
+          </a:ln>
+        </p:spPr>
+        <p:style>
+          <a:lnRef idx="1">
+            <a:schemeClr val="accent1"/>
+          </a:lnRef>
+          <a:fillRef idx="0">
+            <a:schemeClr val="accent1"/>
+          </a:fillRef>
+          <a:effectRef idx="0">
+            <a:schemeClr val="accent1"/>
+          </a:effectRef>
+          <a:fontRef idx="minor">
+            <a:schemeClr val="tx1"/>
+          </a:fontRef>
+        </p:style>
+      </p:cxnSp>
+      <p:cxnSp>
+        <p:nvCxnSpPr>
+          <p:cNvPr id="15" name="Straight Arrow Connector 14">
+            <a:extLst>
+              <a:ext uri="{FF2B5EF4-FFF2-40B4-BE49-F238E27FC236}">
+                <a16:creationId xmlns:a16="http://schemas.microsoft.com/office/drawing/2014/main" id="{047C6E70-AEBC-444F-88EC-10D13CB87EF2}"/>
+              </a:ext>
+            </a:extLst>
+          </p:cNvPr>
+          <p:cNvCxnSpPr>
+            <a:stCxn id="158" idx="2"/>
+            <a:endCxn id="170" idx="0"/>
+          </p:cNvCxnSpPr>
+          <p:nvPr/>
+        </p:nvCxnSpPr>
+        <p:spPr>
+          <a:xfrm>
+            <a:off x="7333036" y="2154617"/>
+            <a:ext cx="0" cy="3452393"/>
+          </a:xfrm>
+          <a:prstGeom prst="straightConnector1">
+            <a:avLst/>
+          </a:prstGeom>
+          <a:ln>
+            <a:tailEnd type="triangle"/>
+          </a:ln>
+        </p:spPr>
+        <p:style>
+          <a:lnRef idx="1">
+            <a:schemeClr val="accent1"/>
+          </a:lnRef>
+          <a:fillRef idx="0">
+            <a:schemeClr val="accent1"/>
+          </a:fillRef>
+          <a:effectRef idx="0">
+            <a:schemeClr val="accent1"/>
+          </a:effectRef>
+          <a:fontRef idx="minor">
+            <a:schemeClr val="tx1"/>
+          </a:fontRef>
+        </p:style>
+      </p:cxnSp>
+      <p:cxnSp>
+        <p:nvCxnSpPr>
+          <p:cNvPr id="5" name="Straight Arrow Connector 4">
+            <a:extLst>
+              <a:ext uri="{FF2B5EF4-FFF2-40B4-BE49-F238E27FC236}">
+                <a16:creationId xmlns:a16="http://schemas.microsoft.com/office/drawing/2014/main" id="{A70E8735-9092-6D41-AA4B-8B04C2864CFC}"/>
+              </a:ext>
+            </a:extLst>
+          </p:cNvPr>
+          <p:cNvCxnSpPr>
+            <a:cxnSpLocks/>
+            <a:stCxn id="170" idx="2"/>
+          </p:cNvCxnSpPr>
+          <p:nvPr/>
+        </p:nvCxnSpPr>
+        <p:spPr>
+          <a:xfrm flipH="1">
+            <a:off x="7333035" y="5966605"/>
+            <a:ext cx="1" cy="317738"/>
+          </a:xfrm>
+          <a:prstGeom prst="straightConnector1">
+            <a:avLst/>
+          </a:prstGeom>
+          <a:ln>
+            <a:tailEnd type="triangle"/>
+          </a:ln>
+        </p:spPr>
+        <p:style>
+          <a:lnRef idx="1">
+            <a:schemeClr val="accent1"/>
+          </a:lnRef>
+          <a:fillRef idx="0">
+            <a:schemeClr val="accent1"/>
+          </a:fillRef>
+          <a:effectRef idx="0">
+            <a:schemeClr val="accent1"/>
+          </a:effectRef>
+          <a:fontRef idx="minor">
+            <a:schemeClr val="tx1"/>
+          </a:fontRef>
+        </p:style>
+      </p:cxnSp>
+      <p:cxnSp>
+        <p:nvCxnSpPr>
+          <p:cNvPr id="6" name="Elbow Connector 5">
+            <a:extLst>
+              <a:ext uri="{FF2B5EF4-FFF2-40B4-BE49-F238E27FC236}">
+                <a16:creationId xmlns:a16="http://schemas.microsoft.com/office/drawing/2014/main" id="{A130D16A-B8EF-0A45-84B0-377801D87115}"/>
+              </a:ext>
+            </a:extLst>
+          </p:cNvPr>
+          <p:cNvCxnSpPr>
+            <a:cxnSpLocks/>
+            <a:stCxn id="82" idx="2"/>
+            <a:endCxn id="170" idx="1"/>
+          </p:cNvCxnSpPr>
+          <p:nvPr/>
+        </p:nvCxnSpPr>
+        <p:spPr>
+          <a:xfrm rot="16200000" flipH="1">
+            <a:off x="2704065" y="2503889"/>
+            <a:ext cx="3632190" cy="2933647"/>
+          </a:xfrm>
+          <a:prstGeom prst="bentConnector2">
+            <a:avLst/>
+          </a:prstGeom>
+          <a:ln>
+            <a:tailEnd type="triangle"/>
+          </a:ln>
+        </p:spPr>
+        <p:style>
+          <a:lnRef idx="1">
+            <a:schemeClr val="accent1"/>
+          </a:lnRef>
+          <a:fillRef idx="0">
+            <a:schemeClr val="accent1"/>
+          </a:fillRef>
+          <a:effectRef idx="0">
+            <a:schemeClr val="accent1"/>
+          </a:effectRef>
+          <a:fontRef idx="minor">
+            <a:schemeClr val="tx1"/>
+          </a:fontRef>
+        </p:style>
+      </p:cxnSp>
+      <p:sp>
+        <p:nvSpPr>
+          <p:cNvPr id="90" name="Rectangle 89">
+            <a:extLst>
+              <a:ext uri="{FF2B5EF4-FFF2-40B4-BE49-F238E27FC236}">
+                <a16:creationId xmlns:a16="http://schemas.microsoft.com/office/drawing/2014/main" id="{22DB5B27-C281-AC43-B56B-D20BB9612022}"/>
               </a:ext>
             </a:extLst>
           </p:cNvPr>
@@ -5820,8 +6701,8 @@
         </p:nvSpPr>
         <p:spPr>
           <a:xfrm>
-            <a:off x="3919762" y="4895392"/>
-            <a:ext cx="1791014" cy="359595"/>
+            <a:off x="2029431" y="3448584"/>
+            <a:ext cx="1426768" cy="359595"/>
           </a:xfrm>
           <a:prstGeom prst="rect">
             <a:avLst/>
@@ -5865,7 +6746,7 @@
                   <a:schemeClr val="tx1"/>
                 </a:solidFill>
               </a:rPr>
-              <a:t>medstar_complete.feather</a:t>
+              <a:t>medstar_compliance_deidentified.feather</a:t>
             </a:r>
             <a:endParaRPr lang="en-US" sz="1100" dirty="0">
               <a:solidFill>
@@ -5875,54 +6756,12 @@
           </a:p>
         </p:txBody>
       </p:sp>
-      <p:cxnSp>
-        <p:nvCxnSpPr>
-          <p:cNvPr id="157" name="Straight Arrow Connector 156">
-            <a:extLst>
-              <a:ext uri="{FF2B5EF4-FFF2-40B4-BE49-F238E27FC236}">
-                <a16:creationId xmlns:a16="http://schemas.microsoft.com/office/drawing/2014/main" id="{01A67BC9-F0E1-9A4B-82C8-14AF25EFF7B3}"/>
-              </a:ext>
-            </a:extLst>
-          </p:cNvPr>
-          <p:cNvCxnSpPr>
-            <a:stCxn id="150" idx="2"/>
-            <a:endCxn id="155" idx="0"/>
-          </p:cNvCxnSpPr>
-          <p:nvPr/>
-        </p:nvCxnSpPr>
-        <p:spPr>
-          <a:xfrm>
-            <a:off x="4815269" y="4531755"/>
-            <a:ext cx="0" cy="363637"/>
-          </a:xfrm>
-          <a:prstGeom prst="straightConnector1">
-            <a:avLst/>
-          </a:prstGeom>
-          <a:ln>
-            <a:tailEnd type="triangle"/>
-          </a:ln>
-        </p:spPr>
-        <p:style>
-          <a:lnRef idx="1">
-            <a:schemeClr val="accent1"/>
-          </a:lnRef>
-          <a:fillRef idx="0">
-            <a:schemeClr val="accent1"/>
-          </a:fillRef>
-          <a:effectRef idx="0">
-            <a:schemeClr val="accent1"/>
-          </a:effectRef>
-          <a:fontRef idx="minor">
-            <a:schemeClr val="tx1"/>
-          </a:fontRef>
-        </p:style>
-      </p:cxnSp>
-      <p:sp>
-        <p:nvSpPr>
-          <p:cNvPr id="158" name="Rectangle 157">
-            <a:extLst>
-              <a:ext uri="{FF2B5EF4-FFF2-40B4-BE49-F238E27FC236}">
-                <a16:creationId xmlns:a16="http://schemas.microsoft.com/office/drawing/2014/main" id="{44F03AFF-082E-DF41-A880-9384C50077F3}"/>
+      <p:sp>
+        <p:nvSpPr>
+          <p:cNvPr id="61" name="Rectangle 60">
+            <a:extLst>
+              <a:ext uri="{FF2B5EF4-FFF2-40B4-BE49-F238E27FC236}">
+                <a16:creationId xmlns:a16="http://schemas.microsoft.com/office/drawing/2014/main" id="{EFFE9886-351D-ED42-83F3-809847FB1A1D}"/>
               </a:ext>
             </a:extLst>
           </p:cNvPr>
@@ -5931,8 +6770,8 @@
         </p:nvSpPr>
         <p:spPr>
           <a:xfrm>
-            <a:off x="6687404" y="1795022"/>
-            <a:ext cx="1291264" cy="359595"/>
+            <a:off x="6372930" y="6284343"/>
+            <a:ext cx="1920209" cy="359595"/>
           </a:xfrm>
           <a:prstGeom prst="rect">
             <a:avLst/>
@@ -5976,7 +6815,7 @@
                   <a:schemeClr val="tx1"/>
                 </a:solidFill>
               </a:rPr>
-              <a:t>client_data.feather</a:t>
+              <a:t>medstar_aps_merged.feather</a:t>
             </a:r>
             <a:endParaRPr lang="en-US" sz="1100" dirty="0">
               <a:solidFill>
@@ -5986,234 +6825,26 @@
           </a:p>
         </p:txBody>
       </p:sp>
-      <p:sp>
-        <p:nvSpPr>
-          <p:cNvPr id="159" name="Rectangle 158">
-            <a:extLst>
-              <a:ext uri="{FF2B5EF4-FFF2-40B4-BE49-F238E27FC236}">
-                <a16:creationId xmlns:a16="http://schemas.microsoft.com/office/drawing/2014/main" id="{522FC733-1B49-4643-88C9-9FEB5D8A368F}"/>
-              </a:ext>
-            </a:extLst>
-          </p:cNvPr>
-          <p:cNvSpPr/>
-          <p:nvPr/>
-        </p:nvSpPr>
-        <p:spPr>
-          <a:xfrm>
-            <a:off x="8101599" y="1795021"/>
-            <a:ext cx="1291264" cy="359595"/>
-          </a:xfrm>
-          <a:prstGeom prst="rect">
-            <a:avLst/>
-          </a:prstGeom>
-          <a:solidFill>
-            <a:schemeClr val="accent2">
-              <a:lumMod val="20000"/>
-              <a:lumOff val="80000"/>
-            </a:schemeClr>
-          </a:solidFill>
-          <a:ln>
-            <a:solidFill>
-              <a:schemeClr val="tx1"/>
-            </a:solidFill>
-          </a:ln>
-        </p:spPr>
-        <p:style>
-          <a:lnRef idx="2">
-            <a:schemeClr val="accent1">
-              <a:shade val="50000"/>
-            </a:schemeClr>
-          </a:lnRef>
-          <a:fillRef idx="1">
-            <a:schemeClr val="accent1"/>
-          </a:fillRef>
-          <a:effectRef idx="0">
-            <a:schemeClr val="accent1"/>
-          </a:effectRef>
-          <a:fontRef idx="minor">
-            <a:schemeClr val="lt1"/>
-          </a:fontRef>
-        </p:style>
-        <p:txBody>
-          <a:bodyPr rtlCol="0" anchor="ctr"/>
-          <a:lstStyle/>
-          <a:p>
-            <a:pPr algn="ctr"/>
-            <a:r>
-              <a:rPr lang="en-US" sz="1100" dirty="0" err="1">
-                <a:solidFill>
-                  <a:schemeClr val="tx1"/>
-                </a:solidFill>
-              </a:rPr>
-              <a:t>allegations.feather</a:t>
-            </a:r>
-            <a:endParaRPr lang="en-US" sz="1100" dirty="0">
-              <a:solidFill>
-                <a:schemeClr val="tx1"/>
-              </a:solidFill>
-            </a:endParaRPr>
-          </a:p>
-        </p:txBody>
-      </p:sp>
-      <p:sp>
-        <p:nvSpPr>
-          <p:cNvPr id="160" name="Rectangle 159">
-            <a:extLst>
-              <a:ext uri="{FF2B5EF4-FFF2-40B4-BE49-F238E27FC236}">
-                <a16:creationId xmlns:a16="http://schemas.microsoft.com/office/drawing/2014/main" id="{303D8A20-9E57-4F4D-81FA-1BF3EBB1A23B}"/>
-              </a:ext>
-            </a:extLst>
-          </p:cNvPr>
-          <p:cNvSpPr/>
-          <p:nvPr/>
-        </p:nvSpPr>
-        <p:spPr>
-          <a:xfrm>
-            <a:off x="9515794" y="1792927"/>
-            <a:ext cx="1098652" cy="359595"/>
-          </a:xfrm>
-          <a:prstGeom prst="rect">
-            <a:avLst/>
-          </a:prstGeom>
-          <a:solidFill>
-            <a:schemeClr val="accent2">
-              <a:lumMod val="20000"/>
-              <a:lumOff val="80000"/>
-            </a:schemeClr>
-          </a:solidFill>
-          <a:ln>
-            <a:solidFill>
-              <a:schemeClr val="tx1"/>
-            </a:solidFill>
-          </a:ln>
-        </p:spPr>
-        <p:style>
-          <a:lnRef idx="2">
-            <a:schemeClr val="accent1">
-              <a:shade val="50000"/>
-            </a:schemeClr>
-          </a:lnRef>
-          <a:fillRef idx="1">
-            <a:schemeClr val="accent1"/>
-          </a:fillRef>
-          <a:effectRef idx="0">
-            <a:schemeClr val="accent1"/>
-          </a:effectRef>
-          <a:fontRef idx="minor">
-            <a:schemeClr val="lt1"/>
-          </a:fontRef>
-        </p:style>
-        <p:txBody>
-          <a:bodyPr rtlCol="0" anchor="ctr"/>
-          <a:lstStyle/>
-          <a:p>
-            <a:pPr algn="ctr"/>
-            <a:r>
-              <a:rPr lang="en-US" sz="1100" dirty="0" err="1">
-                <a:solidFill>
-                  <a:schemeClr val="tx1"/>
-                </a:solidFill>
-              </a:rPr>
-              <a:t>closure.feather</a:t>
-            </a:r>
-            <a:endParaRPr lang="en-US" sz="1100" dirty="0">
-              <a:solidFill>
-                <a:schemeClr val="tx1"/>
-              </a:solidFill>
-            </a:endParaRPr>
-          </a:p>
-        </p:txBody>
-      </p:sp>
-      <p:sp>
-        <p:nvSpPr>
-          <p:cNvPr id="161" name="Rectangle 160">
-            <a:extLst>
-              <a:ext uri="{FF2B5EF4-FFF2-40B4-BE49-F238E27FC236}">
-                <a16:creationId xmlns:a16="http://schemas.microsoft.com/office/drawing/2014/main" id="{673D0193-BE63-6E41-AA5B-D266097DF22D}"/>
-              </a:ext>
-            </a:extLst>
-          </p:cNvPr>
-          <p:cNvSpPr/>
-          <p:nvPr/>
-        </p:nvSpPr>
-        <p:spPr>
-          <a:xfrm>
-            <a:off x="10737376" y="1792926"/>
-            <a:ext cx="1262839" cy="359595"/>
-          </a:xfrm>
-          <a:prstGeom prst="rect">
-            <a:avLst/>
-          </a:prstGeom>
-          <a:solidFill>
-            <a:schemeClr val="accent2">
-              <a:lumMod val="20000"/>
-              <a:lumOff val="80000"/>
-            </a:schemeClr>
-          </a:solidFill>
-          <a:ln>
-            <a:solidFill>
-              <a:schemeClr val="tx1"/>
-            </a:solidFill>
-          </a:ln>
-        </p:spPr>
-        <p:style>
-          <a:lnRef idx="2">
-            <a:schemeClr val="accent1">
-              <a:shade val="50000"/>
-            </a:schemeClr>
-          </a:lnRef>
-          <a:fillRef idx="1">
-            <a:schemeClr val="accent1"/>
-          </a:fillRef>
-          <a:effectRef idx="0">
-            <a:schemeClr val="accent1"/>
-          </a:effectRef>
-          <a:fontRef idx="minor">
-            <a:schemeClr val="lt1"/>
-          </a:fontRef>
-        </p:style>
-        <p:txBody>
-          <a:bodyPr rtlCol="0" anchor="ctr"/>
-          <a:lstStyle/>
-          <a:p>
-            <a:pPr algn="ctr"/>
-            <a:r>
-              <a:rPr lang="en-US" sz="1100" dirty="0" err="1">
-                <a:solidFill>
-                  <a:schemeClr val="tx1"/>
-                </a:solidFill>
-              </a:rPr>
-              <a:t>disposition.feather</a:t>
-            </a:r>
-            <a:endParaRPr lang="en-US" sz="1100" dirty="0">
-              <a:solidFill>
-                <a:schemeClr val="tx1"/>
-              </a:solidFill>
-            </a:endParaRPr>
-          </a:p>
-        </p:txBody>
-      </p:sp>
       <p:cxnSp>
         <p:nvCxnSpPr>
-          <p:cNvPr id="163" name="Elbow Connector 162">
-            <a:extLst>
-              <a:ext uri="{FF2B5EF4-FFF2-40B4-BE49-F238E27FC236}">
-                <a16:creationId xmlns:a16="http://schemas.microsoft.com/office/drawing/2014/main" id="{EA2BB82C-59E4-FD4A-BB5B-04A8D117585A}"/>
+          <p:cNvPr id="9" name="Straight Arrow Connector 8">
+            <a:extLst>
+              <a:ext uri="{FF2B5EF4-FFF2-40B4-BE49-F238E27FC236}">
+                <a16:creationId xmlns:a16="http://schemas.microsoft.com/office/drawing/2014/main" id="{A24351A2-1DEF-B24B-90A4-F868BC049037}"/>
               </a:ext>
             </a:extLst>
           </p:cNvPr>
           <p:cNvCxnSpPr>
-            <a:stCxn id="81" idx="2"/>
-            <a:endCxn id="158" idx="0"/>
+            <a:stCxn id="61" idx="2"/>
           </p:cNvCxnSpPr>
           <p:nvPr/>
         </p:nvCxnSpPr>
         <p:spPr>
-          <a:xfrm rot="5400000">
-            <a:off x="8033571" y="640330"/>
-            <a:ext cx="454157" cy="1855226"/>
-          </a:xfrm>
-          <a:prstGeom prst="bentConnector3">
+          <a:xfrm flipH="1">
+            <a:off x="7333034" y="6643938"/>
+            <a:ext cx="1" cy="214062"/>
+          </a:xfrm>
+          <a:prstGeom prst="straightConnector1">
             <a:avLst/>
           </a:prstGeom>
           <a:ln>
@@ -6235,138 +6866,12 @@
           </a:fontRef>
         </p:style>
       </p:cxnSp>
-      <p:cxnSp>
-        <p:nvCxnSpPr>
-          <p:cNvPr id="165" name="Elbow Connector 164">
-            <a:extLst>
-              <a:ext uri="{FF2B5EF4-FFF2-40B4-BE49-F238E27FC236}">
-                <a16:creationId xmlns:a16="http://schemas.microsoft.com/office/drawing/2014/main" id="{908549B4-1C54-714A-A5A7-11CA7C0407CE}"/>
-              </a:ext>
-            </a:extLst>
-          </p:cNvPr>
-          <p:cNvCxnSpPr>
-            <a:stCxn id="81" idx="2"/>
-            <a:endCxn id="159" idx="0"/>
-          </p:cNvCxnSpPr>
-          <p:nvPr/>
-        </p:nvCxnSpPr>
-        <p:spPr>
-          <a:xfrm rot="5400000">
-            <a:off x="8740669" y="1347428"/>
-            <a:ext cx="454156" cy="441031"/>
-          </a:xfrm>
-          <a:prstGeom prst="bentConnector3">
-            <a:avLst/>
-          </a:prstGeom>
-          <a:ln>
-            <a:tailEnd type="triangle"/>
-          </a:ln>
-        </p:spPr>
-        <p:style>
-          <a:lnRef idx="1">
-            <a:schemeClr val="accent1"/>
-          </a:lnRef>
-          <a:fillRef idx="0">
-            <a:schemeClr val="accent1"/>
-          </a:fillRef>
-          <a:effectRef idx="0">
-            <a:schemeClr val="accent1"/>
-          </a:effectRef>
-          <a:fontRef idx="minor">
-            <a:schemeClr val="tx1"/>
-          </a:fontRef>
-        </p:style>
-      </p:cxnSp>
-      <p:cxnSp>
-        <p:nvCxnSpPr>
-          <p:cNvPr id="167" name="Elbow Connector 166">
-            <a:extLst>
-              <a:ext uri="{FF2B5EF4-FFF2-40B4-BE49-F238E27FC236}">
-                <a16:creationId xmlns:a16="http://schemas.microsoft.com/office/drawing/2014/main" id="{B7842AC4-D5DA-1248-9A84-226E67CD1DFE}"/>
-              </a:ext>
-            </a:extLst>
-          </p:cNvPr>
-          <p:cNvCxnSpPr>
-            <a:stCxn id="81" idx="2"/>
-            <a:endCxn id="160" idx="0"/>
-          </p:cNvCxnSpPr>
-          <p:nvPr/>
-        </p:nvCxnSpPr>
-        <p:spPr>
-          <a:xfrm rot="16200000" flipH="1">
-            <a:off x="9400660" y="1128467"/>
-            <a:ext cx="452062" cy="876858"/>
-          </a:xfrm>
-          <a:prstGeom prst="bentConnector3">
-            <a:avLst/>
-          </a:prstGeom>
-          <a:ln>
-            <a:tailEnd type="triangle"/>
-          </a:ln>
-        </p:spPr>
-        <p:style>
-          <a:lnRef idx="1">
-            <a:schemeClr val="accent1"/>
-          </a:lnRef>
-          <a:fillRef idx="0">
-            <a:schemeClr val="accent1"/>
-          </a:fillRef>
-          <a:effectRef idx="0">
-            <a:schemeClr val="accent1"/>
-          </a:effectRef>
-          <a:fontRef idx="minor">
-            <a:schemeClr val="tx1"/>
-          </a:fontRef>
-        </p:style>
-      </p:cxnSp>
-      <p:cxnSp>
-        <p:nvCxnSpPr>
-          <p:cNvPr id="169" name="Elbow Connector 168">
-            <a:extLst>
-              <a:ext uri="{FF2B5EF4-FFF2-40B4-BE49-F238E27FC236}">
-                <a16:creationId xmlns:a16="http://schemas.microsoft.com/office/drawing/2014/main" id="{D0C10965-986C-824A-A434-4503EBF45968}"/>
-              </a:ext>
-            </a:extLst>
-          </p:cNvPr>
-          <p:cNvCxnSpPr>
-            <a:stCxn id="81" idx="2"/>
-            <a:endCxn id="161" idx="0"/>
-          </p:cNvCxnSpPr>
-          <p:nvPr/>
-        </p:nvCxnSpPr>
-        <p:spPr>
-          <a:xfrm rot="16200000" flipH="1">
-            <a:off x="10052499" y="476628"/>
-            <a:ext cx="452061" cy="2180534"/>
-          </a:xfrm>
-          <a:prstGeom prst="bentConnector3">
-            <a:avLst/>
-          </a:prstGeom>
-          <a:ln>
-            <a:tailEnd type="triangle"/>
-          </a:ln>
-        </p:spPr>
-        <p:style>
-          <a:lnRef idx="1">
-            <a:schemeClr val="accent1"/>
-          </a:lnRef>
-          <a:fillRef idx="0">
-            <a:schemeClr val="accent1"/>
-          </a:fillRef>
-          <a:effectRef idx="0">
-            <a:schemeClr val="accent1"/>
-          </a:effectRef>
-          <a:fontRef idx="minor">
-            <a:schemeClr val="tx1"/>
-          </a:fontRef>
-        </p:style>
-      </p:cxnSp>
-      <p:sp>
-        <p:nvSpPr>
-          <p:cNvPr id="170" name="Rectangle 169">
-            <a:extLst>
-              <a:ext uri="{FF2B5EF4-FFF2-40B4-BE49-F238E27FC236}">
-                <a16:creationId xmlns:a16="http://schemas.microsoft.com/office/drawing/2014/main" id="{8824FD08-8F57-5244-8D81-31D180365A6C}"/>
+      <p:sp>
+        <p:nvSpPr>
+          <p:cNvPr id="86" name="Rectangle 85">
+            <a:extLst>
+              <a:ext uri="{FF2B5EF4-FFF2-40B4-BE49-F238E27FC236}">
+                <a16:creationId xmlns:a16="http://schemas.microsoft.com/office/drawing/2014/main" id="{1EF0F79A-0146-7D42-8EE4-67C6E64B2073}"/>
               </a:ext>
             </a:extLst>
           </p:cNvPr>
@@ -6375,8 +6880,8 @@
         </p:nvSpPr>
         <p:spPr>
           <a:xfrm>
-            <a:off x="5986984" y="5607010"/>
-            <a:ext cx="2692103" cy="359595"/>
+            <a:off x="1698620" y="2619748"/>
+            <a:ext cx="1731795" cy="359595"/>
           </a:xfrm>
           <a:prstGeom prst="rect">
             <a:avLst/>
@@ -6420,317 +6925,17 @@
                   <a:schemeClr val="tx1"/>
                 </a:solidFill>
               </a:rPr>
-              <a:t>data_medstar_aps_merged_01_merge.Rmd</a:t>
-            </a:r>
-          </a:p>
-        </p:txBody>
-      </p:sp>
-      <p:cxnSp>
-        <p:nvCxnSpPr>
-          <p:cNvPr id="172" name="Elbow Connector 171">
-            <a:extLst>
-              <a:ext uri="{FF2B5EF4-FFF2-40B4-BE49-F238E27FC236}">
-                <a16:creationId xmlns:a16="http://schemas.microsoft.com/office/drawing/2014/main" id="{359C8F58-CB38-3246-80F1-BB8554718DFE}"/>
-              </a:ext>
-            </a:extLst>
-          </p:cNvPr>
-          <p:cNvCxnSpPr>
-            <a:cxnSpLocks/>
-            <a:stCxn id="155" idx="2"/>
-            <a:endCxn id="170" idx="0"/>
-          </p:cNvCxnSpPr>
-          <p:nvPr/>
-        </p:nvCxnSpPr>
-        <p:spPr>
-          <a:xfrm rot="16200000" flipH="1">
-            <a:off x="5898141" y="4172114"/>
-            <a:ext cx="352023" cy="2517767"/>
-          </a:xfrm>
-          <a:prstGeom prst="bentConnector3">
-            <a:avLst>
-              <a:gd name="adj1" fmla="val 50000"/>
-            </a:avLst>
-          </a:prstGeom>
-          <a:ln>
-            <a:tailEnd type="triangle"/>
-          </a:ln>
-        </p:spPr>
-        <p:style>
-          <a:lnRef idx="1">
-            <a:schemeClr val="accent1"/>
-          </a:lnRef>
-          <a:fillRef idx="0">
-            <a:schemeClr val="accent1"/>
-          </a:fillRef>
-          <a:effectRef idx="0">
-            <a:schemeClr val="accent1"/>
-          </a:effectRef>
-          <a:fontRef idx="minor">
-            <a:schemeClr val="tx1"/>
-          </a:fontRef>
-        </p:style>
-      </p:cxnSp>
-      <p:cxnSp>
-        <p:nvCxnSpPr>
-          <p:cNvPr id="183" name="Elbow Connector 182">
-            <a:extLst>
-              <a:ext uri="{FF2B5EF4-FFF2-40B4-BE49-F238E27FC236}">
-                <a16:creationId xmlns:a16="http://schemas.microsoft.com/office/drawing/2014/main" id="{15DAB329-12E9-054D-AFA1-F703C9FD877A}"/>
-              </a:ext>
-            </a:extLst>
-          </p:cNvPr>
-          <p:cNvCxnSpPr>
-            <a:cxnSpLocks/>
-            <a:stCxn id="159" idx="2"/>
-            <a:endCxn id="170" idx="0"/>
-          </p:cNvCxnSpPr>
-          <p:nvPr/>
-        </p:nvCxnSpPr>
-        <p:spPr>
-          <a:xfrm rot="5400000">
-            <a:off x="6313937" y="3173716"/>
-            <a:ext cx="3452394" cy="1414195"/>
-          </a:xfrm>
-          <a:prstGeom prst="bentConnector3">
-            <a:avLst>
-              <a:gd name="adj1" fmla="val 50000"/>
-            </a:avLst>
-          </a:prstGeom>
-          <a:ln>
-            <a:tailEnd type="triangle"/>
-          </a:ln>
-        </p:spPr>
-        <p:style>
-          <a:lnRef idx="1">
-            <a:schemeClr val="accent1"/>
-          </a:lnRef>
-          <a:fillRef idx="0">
-            <a:schemeClr val="accent1"/>
-          </a:fillRef>
-          <a:effectRef idx="0">
-            <a:schemeClr val="accent1"/>
-          </a:effectRef>
-          <a:fontRef idx="minor">
-            <a:schemeClr val="tx1"/>
-          </a:fontRef>
-        </p:style>
-      </p:cxnSp>
-      <p:cxnSp>
-        <p:nvCxnSpPr>
-          <p:cNvPr id="186" name="Elbow Connector 185">
-            <a:extLst>
-              <a:ext uri="{FF2B5EF4-FFF2-40B4-BE49-F238E27FC236}">
-                <a16:creationId xmlns:a16="http://schemas.microsoft.com/office/drawing/2014/main" id="{175207CF-576F-0F4A-A22B-3AAC95CACEB1}"/>
-              </a:ext>
-            </a:extLst>
-          </p:cNvPr>
-          <p:cNvCxnSpPr>
-            <a:stCxn id="160" idx="2"/>
-          </p:cNvCxnSpPr>
-          <p:nvPr/>
-        </p:nvCxnSpPr>
-        <p:spPr>
-          <a:xfrm rot="5400000">
-            <a:off x="6967431" y="2520935"/>
-            <a:ext cx="3466102" cy="2729276"/>
-          </a:xfrm>
-          <a:prstGeom prst="bentConnector3">
-            <a:avLst/>
-          </a:prstGeom>
-          <a:ln>
-            <a:tailEnd type="triangle"/>
-          </a:ln>
-        </p:spPr>
-        <p:style>
-          <a:lnRef idx="1">
-            <a:schemeClr val="accent1"/>
-          </a:lnRef>
-          <a:fillRef idx="0">
-            <a:schemeClr val="accent1"/>
-          </a:fillRef>
-          <a:effectRef idx="0">
-            <a:schemeClr val="accent1"/>
-          </a:effectRef>
-          <a:fontRef idx="minor">
-            <a:schemeClr val="tx1"/>
-          </a:fontRef>
-        </p:style>
-      </p:cxnSp>
-      <p:cxnSp>
-        <p:nvCxnSpPr>
-          <p:cNvPr id="188" name="Elbow Connector 187">
-            <a:extLst>
-              <a:ext uri="{FF2B5EF4-FFF2-40B4-BE49-F238E27FC236}">
-                <a16:creationId xmlns:a16="http://schemas.microsoft.com/office/drawing/2014/main" id="{80F79231-989F-F74E-B30E-321B1A7FF9C2}"/>
-              </a:ext>
-            </a:extLst>
-          </p:cNvPr>
-          <p:cNvCxnSpPr>
-            <a:cxnSpLocks/>
-            <a:stCxn id="161" idx="2"/>
-            <a:endCxn id="170" idx="0"/>
-          </p:cNvCxnSpPr>
-          <p:nvPr/>
-        </p:nvCxnSpPr>
-        <p:spPr>
-          <a:xfrm rot="5400000">
-            <a:off x="7623672" y="1861885"/>
-            <a:ext cx="3454489" cy="4035760"/>
-          </a:xfrm>
-          <a:prstGeom prst="bentConnector3">
-            <a:avLst/>
-          </a:prstGeom>
-          <a:ln>
-            <a:tailEnd type="triangle"/>
-          </a:ln>
-        </p:spPr>
-        <p:style>
-          <a:lnRef idx="1">
-            <a:schemeClr val="accent1"/>
-          </a:lnRef>
-          <a:fillRef idx="0">
-            <a:schemeClr val="accent1"/>
-          </a:fillRef>
-          <a:effectRef idx="0">
-            <a:schemeClr val="accent1"/>
-          </a:effectRef>
-          <a:fontRef idx="minor">
-            <a:schemeClr val="tx1"/>
-          </a:fontRef>
-        </p:style>
-      </p:cxnSp>
-      <p:cxnSp>
-        <p:nvCxnSpPr>
-          <p:cNvPr id="15" name="Straight Arrow Connector 14">
-            <a:extLst>
-              <a:ext uri="{FF2B5EF4-FFF2-40B4-BE49-F238E27FC236}">
-                <a16:creationId xmlns:a16="http://schemas.microsoft.com/office/drawing/2014/main" id="{047C6E70-AEBC-444F-88EC-10D13CB87EF2}"/>
-              </a:ext>
-            </a:extLst>
-          </p:cNvPr>
-          <p:cNvCxnSpPr>
-            <a:stCxn id="158" idx="2"/>
-            <a:endCxn id="170" idx="0"/>
-          </p:cNvCxnSpPr>
-          <p:nvPr/>
-        </p:nvCxnSpPr>
-        <p:spPr>
-          <a:xfrm>
-            <a:off x="7333036" y="2154617"/>
-            <a:ext cx="0" cy="3452393"/>
-          </a:xfrm>
-          <a:prstGeom prst="straightConnector1">
-            <a:avLst/>
-          </a:prstGeom>
-          <a:ln>
-            <a:tailEnd type="triangle"/>
-          </a:ln>
-        </p:spPr>
-        <p:style>
-          <a:lnRef idx="1">
-            <a:schemeClr val="accent1"/>
-          </a:lnRef>
-          <a:fillRef idx="0">
-            <a:schemeClr val="accent1"/>
-          </a:fillRef>
-          <a:effectRef idx="0">
-            <a:schemeClr val="accent1"/>
-          </a:effectRef>
-          <a:fontRef idx="minor">
-            <a:schemeClr val="tx1"/>
-          </a:fontRef>
-        </p:style>
-      </p:cxnSp>
-      <p:cxnSp>
-        <p:nvCxnSpPr>
-          <p:cNvPr id="5" name="Straight Arrow Connector 4">
-            <a:extLst>
-              <a:ext uri="{FF2B5EF4-FFF2-40B4-BE49-F238E27FC236}">
-                <a16:creationId xmlns:a16="http://schemas.microsoft.com/office/drawing/2014/main" id="{A70E8735-9092-6D41-AA4B-8B04C2864CFC}"/>
-              </a:ext>
-            </a:extLst>
-          </p:cNvPr>
-          <p:cNvCxnSpPr>
-            <a:cxnSpLocks/>
-            <a:stCxn id="170" idx="2"/>
-          </p:cNvCxnSpPr>
-          <p:nvPr/>
-        </p:nvCxnSpPr>
-        <p:spPr>
-          <a:xfrm flipH="1">
-            <a:off x="7333035" y="5966605"/>
-            <a:ext cx="1" cy="317738"/>
-          </a:xfrm>
-          <a:prstGeom prst="straightConnector1">
-            <a:avLst/>
-          </a:prstGeom>
-          <a:ln>
-            <a:tailEnd type="triangle"/>
-          </a:ln>
-        </p:spPr>
-        <p:style>
-          <a:lnRef idx="1">
-            <a:schemeClr val="accent1"/>
-          </a:lnRef>
-          <a:fillRef idx="0">
-            <a:schemeClr val="accent1"/>
-          </a:fillRef>
-          <a:effectRef idx="0">
-            <a:schemeClr val="accent1"/>
-          </a:effectRef>
-          <a:fontRef idx="minor">
-            <a:schemeClr val="tx1"/>
-          </a:fontRef>
-        </p:style>
-      </p:cxnSp>
-      <p:cxnSp>
-        <p:nvCxnSpPr>
-          <p:cNvPr id="6" name="Elbow Connector 5">
-            <a:extLst>
-              <a:ext uri="{FF2B5EF4-FFF2-40B4-BE49-F238E27FC236}">
-                <a16:creationId xmlns:a16="http://schemas.microsoft.com/office/drawing/2014/main" id="{A130D16A-B8EF-0A45-84B0-377801D87115}"/>
-              </a:ext>
-            </a:extLst>
-          </p:cNvPr>
-          <p:cNvCxnSpPr>
-            <a:stCxn id="82" idx="2"/>
-            <a:endCxn id="170" idx="1"/>
-          </p:cNvCxnSpPr>
-          <p:nvPr/>
-        </p:nvCxnSpPr>
-        <p:spPr>
-          <a:xfrm rot="16200000" flipH="1">
-            <a:off x="2314162" y="2113985"/>
-            <a:ext cx="3632189" cy="3713455"/>
-          </a:xfrm>
-          <a:prstGeom prst="bentConnector2">
-            <a:avLst/>
-          </a:prstGeom>
-          <a:ln>
-            <a:tailEnd type="triangle"/>
-          </a:ln>
-        </p:spPr>
-        <p:style>
-          <a:lnRef idx="1">
-            <a:schemeClr val="accent1"/>
-          </a:lnRef>
-          <a:fillRef idx="0">
-            <a:schemeClr val="accent1"/>
-          </a:fillRef>
-          <a:effectRef idx="0">
-            <a:schemeClr val="accent1"/>
-          </a:effectRef>
-          <a:fontRef idx="minor">
-            <a:schemeClr val="tx1"/>
-          </a:fontRef>
-        </p:style>
-      </p:cxnSp>
-      <p:sp>
-        <p:nvSpPr>
-          <p:cNvPr id="90" name="Rectangle 89">
-            <a:extLst>
-              <a:ext uri="{FF2B5EF4-FFF2-40B4-BE49-F238E27FC236}">
-                <a16:creationId xmlns:a16="http://schemas.microsoft.com/office/drawing/2014/main" id="{22DB5B27-C281-AC43-B56B-D20BB9612022}"/>
+              <a:t>data_medstar_compliance_02_deidentify.Rmd</a:t>
+            </a:r>
+          </a:p>
+        </p:txBody>
+      </p:sp>
+      <p:sp>
+        <p:nvSpPr>
+          <p:cNvPr id="64" name="Rectangle 63">
+            <a:extLst>
+              <a:ext uri="{FF2B5EF4-FFF2-40B4-BE49-F238E27FC236}">
+                <a16:creationId xmlns:a16="http://schemas.microsoft.com/office/drawing/2014/main" id="{AEFC919B-5255-4B47-88D9-B55D6F167E92}"/>
               </a:ext>
             </a:extLst>
           </p:cNvPr>
@@ -6739,14 +6944,14 @@
         </p:nvSpPr>
         <p:spPr>
           <a:xfrm>
-            <a:off x="1495172" y="3448584"/>
-            <a:ext cx="1426768" cy="359595"/>
+            <a:off x="24418" y="2619748"/>
+            <a:ext cx="1620356" cy="359595"/>
           </a:xfrm>
           <a:prstGeom prst="rect">
             <a:avLst/>
           </a:prstGeom>
           <a:solidFill>
-            <a:schemeClr val="accent2">
+            <a:schemeClr val="accent1">
               <a:lumMod val="20000"/>
               <a:lumOff val="80000"/>
             </a:schemeClr>
@@ -6779,27 +6984,67 @@
           <a:p>
             <a:pPr algn="ctr"/>
             <a:r>
-              <a:rPr lang="en-US" sz="1100" dirty="0" err="1">
+              <a:rPr lang="en-US" sz="1100" dirty="0">
                 <a:solidFill>
                   <a:schemeClr val="tx1"/>
                 </a:solidFill>
               </a:rPr>
-              <a:t>medstar_compliance_deidentified.feather</a:t>
-            </a:r>
-            <a:endParaRPr lang="en-US" sz="1100" dirty="0">
-              <a:solidFill>
-                <a:schemeClr val="tx1"/>
-              </a:solidFill>
-            </a:endParaRPr>
-          </a:p>
-        </p:txBody>
-      </p:sp>
-      <p:sp>
-        <p:nvSpPr>
-          <p:cNvPr id="61" name="Rectangle 60">
-            <a:extLst>
-              <a:ext uri="{FF2B5EF4-FFF2-40B4-BE49-F238E27FC236}">
-                <a16:creationId xmlns:a16="http://schemas.microsoft.com/office/drawing/2014/main" id="{EFFE9886-351D-ED42-83F3-809847FB1A1D}"/>
+              <a:t>fig_2015_medic_reports_to_compliance.Rmd</a:t>
+            </a:r>
+          </a:p>
+        </p:txBody>
+      </p:sp>
+      <p:cxnSp>
+        <p:nvCxnSpPr>
+          <p:cNvPr id="14" name="Elbow Connector 13">
+            <a:extLst>
+              <a:ext uri="{FF2B5EF4-FFF2-40B4-BE49-F238E27FC236}">
+                <a16:creationId xmlns:a16="http://schemas.microsoft.com/office/drawing/2014/main" id="{75601D74-B6B0-CD4E-A185-BAC9376AA23D}"/>
+              </a:ext>
+            </a:extLst>
+          </p:cNvPr>
+          <p:cNvCxnSpPr>
+            <a:cxnSpLocks/>
+            <a:stCxn id="83" idx="2"/>
+            <a:endCxn id="64" idx="0"/>
+          </p:cNvCxnSpPr>
+          <p:nvPr/>
+        </p:nvCxnSpPr>
+        <p:spPr>
+          <a:xfrm rot="16200000" flipH="1">
+            <a:off x="543696" y="2328847"/>
+            <a:ext cx="465129" cy="116671"/>
+          </a:xfrm>
+          <a:prstGeom prst="bentConnector3">
+            <a:avLst>
+              <a:gd name="adj1" fmla="val 50000"/>
+            </a:avLst>
+          </a:prstGeom>
+          <a:ln>
+            <a:tailEnd type="triangle"/>
+          </a:ln>
+        </p:spPr>
+        <p:style>
+          <a:lnRef idx="1">
+            <a:schemeClr val="accent1"/>
+          </a:lnRef>
+          <a:fillRef idx="0">
+            <a:schemeClr val="accent1"/>
+          </a:fillRef>
+          <a:effectRef idx="0">
+            <a:schemeClr val="accent1"/>
+          </a:effectRef>
+          <a:fontRef idx="minor">
+            <a:schemeClr val="tx1"/>
+          </a:fontRef>
+        </p:style>
+      </p:cxnSp>
+      <p:sp>
+        <p:nvSpPr>
+          <p:cNvPr id="92" name="Rectangle 91">
+            <a:extLst>
+              <a:ext uri="{FF2B5EF4-FFF2-40B4-BE49-F238E27FC236}">
+                <a16:creationId xmlns:a16="http://schemas.microsoft.com/office/drawing/2014/main" id="{C0BA3F00-29C1-9341-9F1C-C3D89B68B39D}"/>
               </a:ext>
             </a:extLst>
           </p:cNvPr>
@@ -6808,14 +7053,14 @@
         </p:nvSpPr>
         <p:spPr>
           <a:xfrm>
-            <a:off x="6372930" y="6284343"/>
-            <a:ext cx="1920209" cy="359595"/>
+            <a:off x="-13363" y="4142506"/>
+            <a:ext cx="1881527" cy="359595"/>
           </a:xfrm>
           <a:prstGeom prst="rect">
             <a:avLst/>
           </a:prstGeom>
           <a:solidFill>
-            <a:schemeClr val="accent2">
+            <a:schemeClr val="accent6">
               <a:lumMod val="20000"/>
               <a:lumOff val="80000"/>
             </a:schemeClr>
@@ -6848,41 +7093,77 @@
           <a:p>
             <a:pPr algn="ctr"/>
             <a:r>
-              <a:rPr lang="en-US" sz="1100" dirty="0" err="1">
+              <a:rPr lang="en-US" sz="1100" dirty="0">
                 <a:solidFill>
                   <a:schemeClr val="tx1"/>
                 </a:solidFill>
               </a:rPr>
-              <a:t>medstar_aps_merged.feather</a:t>
-            </a:r>
-            <a:endParaRPr lang="en-US" sz="1100" dirty="0">
-              <a:solidFill>
-                <a:schemeClr val="tx1"/>
-              </a:solidFill>
-            </a:endParaRPr>
+              <a:t>fig_2015_medic_reports_to_compliance.png      </a:t>
+            </a:r>
           </a:p>
         </p:txBody>
       </p:sp>
       <p:cxnSp>
         <p:nvCxnSpPr>
-          <p:cNvPr id="9" name="Straight Arrow Connector 8">
-            <a:extLst>
-              <a:ext uri="{FF2B5EF4-FFF2-40B4-BE49-F238E27FC236}">
-                <a16:creationId xmlns:a16="http://schemas.microsoft.com/office/drawing/2014/main" id="{A24351A2-1DEF-B24B-90A4-F868BC049037}"/>
+          <p:cNvPr id="48" name="Elbow Connector 47">
+            <a:extLst>
+              <a:ext uri="{FF2B5EF4-FFF2-40B4-BE49-F238E27FC236}">
+                <a16:creationId xmlns:a16="http://schemas.microsoft.com/office/drawing/2014/main" id="{DC99F9E4-F59D-1942-99BF-17169144A8BC}"/>
               </a:ext>
             </a:extLst>
           </p:cNvPr>
           <p:cNvCxnSpPr>
-            <a:stCxn id="61" idx="2"/>
+            <a:cxnSpLocks/>
+            <a:stCxn id="64" idx="2"/>
           </p:cNvCxnSpPr>
           <p:nvPr/>
         </p:nvCxnSpPr>
         <p:spPr>
-          <a:xfrm flipH="1">
-            <a:off x="7333034" y="6643938"/>
-            <a:ext cx="1" cy="214062"/>
-          </a:xfrm>
-          <a:prstGeom prst="straightConnector1">
+          <a:xfrm rot="5400000">
+            <a:off x="-15046" y="3140527"/>
+            <a:ext cx="1010827" cy="688459"/>
+          </a:xfrm>
+          <a:prstGeom prst="bentConnector3">
+            <a:avLst>
+              <a:gd name="adj1" fmla="val 23573"/>
+            </a:avLst>
+          </a:prstGeom>
+        </p:spPr>
+        <p:style>
+          <a:lnRef idx="1">
+            <a:schemeClr val="accent1"/>
+          </a:lnRef>
+          <a:fillRef idx="0">
+            <a:schemeClr val="accent1"/>
+          </a:fillRef>
+          <a:effectRef idx="0">
+            <a:schemeClr val="accent1"/>
+          </a:effectRef>
+          <a:fontRef idx="minor">
+            <a:schemeClr val="tx1"/>
+          </a:fontRef>
+        </p:style>
+      </p:cxnSp>
+      <p:cxnSp>
+        <p:nvCxnSpPr>
+          <p:cNvPr id="57" name="Elbow Connector 56">
+            <a:extLst>
+              <a:ext uri="{FF2B5EF4-FFF2-40B4-BE49-F238E27FC236}">
+                <a16:creationId xmlns:a16="http://schemas.microsoft.com/office/drawing/2014/main" id="{22A4AD49-E85A-004B-966F-B5E598F3ACE7}"/>
+              </a:ext>
+            </a:extLst>
+          </p:cNvPr>
+          <p:cNvCxnSpPr>
+            <a:endCxn id="92" idx="0"/>
+          </p:cNvCxnSpPr>
+          <p:nvPr/>
+        </p:nvCxnSpPr>
+        <p:spPr>
+          <a:xfrm>
+            <a:off x="144718" y="3990168"/>
+            <a:ext cx="782683" cy="152338"/>
+          </a:xfrm>
+          <a:prstGeom prst="bentConnector2">
             <a:avLst/>
           </a:prstGeom>
           <a:ln>
@@ -8247,7 +8528,7 @@
         </p:nvSpPr>
         <p:spPr>
           <a:xfrm>
-            <a:off x="79996" y="2778360"/>
+            <a:off x="1068034" y="2774991"/>
             <a:ext cx="2550187" cy="359595"/>
           </a:xfrm>
           <a:prstGeom prst="rect">
@@ -8311,7 +8592,7 @@
         </p:nvSpPr>
         <p:spPr>
           <a:xfrm>
-            <a:off x="9794652" y="2778360"/>
+            <a:off x="8469024" y="2768252"/>
             <a:ext cx="2313432" cy="359595"/>
           </a:xfrm>
           <a:prstGeom prst="rect">
@@ -8380,7 +8661,7 @@
         </p:nvSpPr>
         <p:spPr>
           <a:xfrm>
-            <a:off x="9832008" y="3410219"/>
+            <a:off x="8506380" y="3400111"/>
             <a:ext cx="2238721" cy="359595"/>
           </a:xfrm>
           <a:prstGeom prst="rect">
@@ -8435,134 +8716,6 @@
           </a:p>
         </p:txBody>
       </p:sp>
-      <p:sp>
-        <p:nvSpPr>
-          <p:cNvPr id="38" name="Rectangle 37">
-            <a:extLst>
-              <a:ext uri="{FF2B5EF4-FFF2-40B4-BE49-F238E27FC236}">
-                <a16:creationId xmlns:a16="http://schemas.microsoft.com/office/drawing/2014/main" id="{BBE9DDF5-8D0B-FD48-8BDD-9AB4C7C97839}"/>
-              </a:ext>
-            </a:extLst>
-          </p:cNvPr>
-          <p:cNvSpPr/>
-          <p:nvPr/>
-        </p:nvSpPr>
-        <p:spPr>
-          <a:xfrm>
-            <a:off x="2718832" y="2778360"/>
-            <a:ext cx="1881527" cy="359595"/>
-          </a:xfrm>
-          <a:prstGeom prst="rect">
-            <a:avLst/>
-          </a:prstGeom>
-          <a:solidFill>
-            <a:schemeClr val="accent1">
-              <a:lumMod val="20000"/>
-              <a:lumOff val="80000"/>
-            </a:schemeClr>
-          </a:solidFill>
-          <a:ln>
-            <a:solidFill>
-              <a:schemeClr val="tx1"/>
-            </a:solidFill>
-          </a:ln>
-        </p:spPr>
-        <p:style>
-          <a:lnRef idx="2">
-            <a:schemeClr val="accent1">
-              <a:shade val="50000"/>
-            </a:schemeClr>
-          </a:lnRef>
-          <a:fillRef idx="1">
-            <a:schemeClr val="accent1"/>
-          </a:fillRef>
-          <a:effectRef idx="0">
-            <a:schemeClr val="accent1"/>
-          </a:effectRef>
-          <a:fontRef idx="minor">
-            <a:schemeClr val="lt1"/>
-          </a:fontRef>
-        </p:style>
-        <p:txBody>
-          <a:bodyPr rtlCol="0" anchor="ctr"/>
-          <a:lstStyle/>
-          <a:p>
-            <a:pPr algn="ctr"/>
-            <a:r>
-              <a:rPr lang="en-US" sz="1100" dirty="0">
-                <a:solidFill>
-                  <a:schemeClr val="tx1"/>
-                </a:solidFill>
-              </a:rPr>
-              <a:t>fig_2015_medic_reports_to_compliance.Rmd      </a:t>
-            </a:r>
-          </a:p>
-        </p:txBody>
-      </p:sp>
-      <p:sp>
-        <p:nvSpPr>
-          <p:cNvPr id="41" name="Rectangle 40">
-            <a:extLst>
-              <a:ext uri="{FF2B5EF4-FFF2-40B4-BE49-F238E27FC236}">
-                <a16:creationId xmlns:a16="http://schemas.microsoft.com/office/drawing/2014/main" id="{455A5C7C-7B29-E744-878B-AD76F541CA81}"/>
-              </a:ext>
-            </a:extLst>
-          </p:cNvPr>
-          <p:cNvSpPr/>
-          <p:nvPr/>
-        </p:nvSpPr>
-        <p:spPr>
-          <a:xfrm>
-            <a:off x="7391263" y="2778360"/>
-            <a:ext cx="2314741" cy="359595"/>
-          </a:xfrm>
-          <a:prstGeom prst="rect">
-            <a:avLst/>
-          </a:prstGeom>
-          <a:solidFill>
-            <a:schemeClr val="accent1">
-              <a:lumMod val="20000"/>
-              <a:lumOff val="80000"/>
-            </a:schemeClr>
-          </a:solidFill>
-          <a:ln>
-            <a:solidFill>
-              <a:schemeClr val="tx1"/>
-            </a:solidFill>
-          </a:ln>
-        </p:spPr>
-        <p:style>
-          <a:lnRef idx="2">
-            <a:schemeClr val="accent1">
-              <a:shade val="50000"/>
-            </a:schemeClr>
-          </a:lnRef>
-          <a:fillRef idx="1">
-            <a:schemeClr val="accent1"/>
-          </a:fillRef>
-          <a:effectRef idx="0">
-            <a:schemeClr val="accent1"/>
-          </a:effectRef>
-          <a:fontRef idx="minor">
-            <a:schemeClr val="lt1"/>
-          </a:fontRef>
-        </p:style>
-        <p:txBody>
-          <a:bodyPr rtlCol="0" anchor="ctr"/>
-          <a:lstStyle/>
-          <a:p>
-            <a:pPr algn="ctr"/>
-            <a:r>
-              <a:rPr lang="en-US" sz="1100" dirty="0">
-                <a:solidFill>
-                  <a:schemeClr val="tx1"/>
-                </a:solidFill>
-              </a:rPr>
-              <a:t>fig_responses_screenings_validation_line_graph.Rmd</a:t>
-            </a:r>
-          </a:p>
-        </p:txBody>
-      </p:sp>
       <p:cxnSp>
         <p:nvCxnSpPr>
           <p:cNvPr id="13" name="Straight Arrow Connector 12">
@@ -8579,7 +8732,7 @@
         </p:nvCxnSpPr>
         <p:spPr>
           <a:xfrm>
-            <a:off x="10951368" y="3137955"/>
+            <a:off x="9625740" y="3127847"/>
             <a:ext cx="1" cy="272264"/>
           </a:xfrm>
           <a:prstGeom prst="straightConnector1">
@@ -8618,7 +8771,7 @@
         </p:nvSpPr>
         <p:spPr>
           <a:xfrm>
-            <a:off x="79996" y="3410218"/>
+            <a:off x="1068034" y="3406849"/>
             <a:ext cx="2550187" cy="359595"/>
           </a:xfrm>
           <a:prstGeom prst="rect">
@@ -8681,10 +8834,10 @@
       </p:sp>
       <p:sp>
         <p:nvSpPr>
-          <p:cNvPr id="50" name="Rectangle 49">
-            <a:extLst>
-              <a:ext uri="{FF2B5EF4-FFF2-40B4-BE49-F238E27FC236}">
-                <a16:creationId xmlns:a16="http://schemas.microsoft.com/office/drawing/2014/main" id="{C6899DAF-AB10-EC4C-BCEE-2CFAD5902879}"/>
+          <p:cNvPr id="53" name="Rectangle 52">
+            <a:extLst>
+              <a:ext uri="{FF2B5EF4-FFF2-40B4-BE49-F238E27FC236}">
+                <a16:creationId xmlns:a16="http://schemas.microsoft.com/office/drawing/2014/main" id="{5D3C8E0C-97FF-D84A-9801-566ADB694C5B}"/>
               </a:ext>
             </a:extLst>
           </p:cNvPr>
@@ -8693,8 +8846,8 @@
         </p:nvSpPr>
         <p:spPr>
           <a:xfrm>
-            <a:off x="2723832" y="3410218"/>
-            <a:ext cx="1881527" cy="359595"/>
+            <a:off x="4687442" y="3406849"/>
+            <a:ext cx="2613606" cy="359595"/>
           </a:xfrm>
           <a:prstGeom prst="rect">
             <a:avLst/>
@@ -8738,228 +8891,11 @@
                   <a:schemeClr val="tx1"/>
                 </a:solidFill>
               </a:rPr>
-              <a:t>fig_2015_medic_reports_to_compliance.png      </a:t>
-            </a:r>
-          </a:p>
-        </p:txBody>
-      </p:sp>
-      <p:sp>
-        <p:nvSpPr>
-          <p:cNvPr id="53" name="Rectangle 52">
-            <a:extLst>
-              <a:ext uri="{FF2B5EF4-FFF2-40B4-BE49-F238E27FC236}">
-                <a16:creationId xmlns:a16="http://schemas.microsoft.com/office/drawing/2014/main" id="{5D3C8E0C-97FF-D84A-9801-566ADB694C5B}"/>
-              </a:ext>
-            </a:extLst>
-          </p:cNvPr>
-          <p:cNvSpPr/>
-          <p:nvPr/>
-        </p:nvSpPr>
-        <p:spPr>
-          <a:xfrm>
-            <a:off x="4687442" y="3406849"/>
-            <a:ext cx="2613606" cy="359595"/>
-          </a:xfrm>
-          <a:prstGeom prst="rect">
-            <a:avLst/>
-          </a:prstGeom>
-          <a:solidFill>
-            <a:schemeClr val="accent6">
-              <a:lumMod val="20000"/>
-              <a:lumOff val="80000"/>
-            </a:schemeClr>
-          </a:solidFill>
-          <a:ln>
-            <a:solidFill>
-              <a:schemeClr val="tx1"/>
-            </a:solidFill>
-          </a:ln>
-        </p:spPr>
-        <p:style>
-          <a:lnRef idx="2">
-            <a:schemeClr val="accent1">
-              <a:shade val="50000"/>
-            </a:schemeClr>
-          </a:lnRef>
-          <a:fillRef idx="1">
-            <a:schemeClr val="accent1"/>
-          </a:fillRef>
-          <a:effectRef idx="0">
-            <a:schemeClr val="accent1"/>
-          </a:effectRef>
-          <a:fontRef idx="minor">
-            <a:schemeClr val="lt1"/>
-          </a:fontRef>
-        </p:style>
-        <p:txBody>
-          <a:bodyPr rtlCol="0" anchor="ctr"/>
-          <a:lstStyle/>
-          <a:p>
-            <a:pPr algn="ctr"/>
-            <a:r>
-              <a:rPr lang="en-US" sz="1100" dirty="0">
-                <a:solidFill>
-                  <a:schemeClr val="tx1"/>
-                </a:solidFill>
-              </a:rPr>
               <a:t>fig_detect_5wk_screening_and_reporting_flow_diagram.jpg</a:t>
             </a:r>
           </a:p>
         </p:txBody>
       </p:sp>
-      <p:sp>
-        <p:nvSpPr>
-          <p:cNvPr id="54" name="Rectangle 53">
-            <a:extLst>
-              <a:ext uri="{FF2B5EF4-FFF2-40B4-BE49-F238E27FC236}">
-                <a16:creationId xmlns:a16="http://schemas.microsoft.com/office/drawing/2014/main" id="{F5E26A8C-C69F-4446-8E80-E8AEB80BA4C9}"/>
-              </a:ext>
-            </a:extLst>
-          </p:cNvPr>
-          <p:cNvSpPr/>
-          <p:nvPr/>
-        </p:nvSpPr>
-        <p:spPr>
-          <a:xfrm>
-            <a:off x="7389041" y="3403480"/>
-            <a:ext cx="2314741" cy="359595"/>
-          </a:xfrm>
-          <a:prstGeom prst="rect">
-            <a:avLst/>
-          </a:prstGeom>
-          <a:solidFill>
-            <a:schemeClr val="accent6">
-              <a:lumMod val="20000"/>
-              <a:lumOff val="80000"/>
-            </a:schemeClr>
-          </a:solidFill>
-          <a:ln>
-            <a:solidFill>
-              <a:schemeClr val="tx1"/>
-            </a:solidFill>
-          </a:ln>
-        </p:spPr>
-        <p:style>
-          <a:lnRef idx="2">
-            <a:schemeClr val="accent1">
-              <a:shade val="50000"/>
-            </a:schemeClr>
-          </a:lnRef>
-          <a:fillRef idx="1">
-            <a:schemeClr val="accent1"/>
-          </a:fillRef>
-          <a:effectRef idx="0">
-            <a:schemeClr val="accent1"/>
-          </a:effectRef>
-          <a:fontRef idx="minor">
-            <a:schemeClr val="lt1"/>
-          </a:fontRef>
-        </p:style>
-        <p:txBody>
-          <a:bodyPr rtlCol="0" anchor="ctr"/>
-          <a:lstStyle/>
-          <a:p>
-            <a:pPr algn="ctr"/>
-            <a:r>
-              <a:rPr lang="en-US" sz="1100" dirty="0" err="1">
-                <a:solidFill>
-                  <a:schemeClr val="tx1"/>
-                </a:solidFill>
-              </a:rPr>
-              <a:t>fig_responses_screenings_validation_line_graph.jpeg</a:t>
-            </a:r>
-            <a:endParaRPr lang="en-US" sz="1100" dirty="0">
-              <a:solidFill>
-                <a:schemeClr val="tx1"/>
-              </a:solidFill>
-            </a:endParaRPr>
-          </a:p>
-        </p:txBody>
-      </p:sp>
-      <p:cxnSp>
-        <p:nvCxnSpPr>
-          <p:cNvPr id="21" name="Elbow Connector 20">
-            <a:extLst>
-              <a:ext uri="{FF2B5EF4-FFF2-40B4-BE49-F238E27FC236}">
-                <a16:creationId xmlns:a16="http://schemas.microsoft.com/office/drawing/2014/main" id="{126059CB-91B7-2B42-8322-4BC50945124F}"/>
-              </a:ext>
-            </a:extLst>
-          </p:cNvPr>
-          <p:cNvCxnSpPr>
-            <a:stCxn id="56" idx="2"/>
-            <a:endCxn id="38" idx="0"/>
-          </p:cNvCxnSpPr>
-          <p:nvPr/>
-        </p:nvCxnSpPr>
-        <p:spPr>
-          <a:xfrm rot="5400000">
-            <a:off x="4736242" y="1418601"/>
-            <a:ext cx="283113" cy="2436404"/>
-          </a:xfrm>
-          <a:prstGeom prst="bentConnector3">
-            <a:avLst/>
-          </a:prstGeom>
-          <a:ln>
-            <a:tailEnd type="triangle"/>
-          </a:ln>
-        </p:spPr>
-        <p:style>
-          <a:lnRef idx="1">
-            <a:schemeClr val="accent1"/>
-          </a:lnRef>
-          <a:fillRef idx="0">
-            <a:schemeClr val="accent1"/>
-          </a:fillRef>
-          <a:effectRef idx="0">
-            <a:schemeClr val="accent1"/>
-          </a:effectRef>
-          <a:fontRef idx="minor">
-            <a:schemeClr val="tx1"/>
-          </a:fontRef>
-        </p:style>
-      </p:cxnSp>
-      <p:cxnSp>
-        <p:nvCxnSpPr>
-          <p:cNvPr id="23" name="Elbow Connector 22">
-            <a:extLst>
-              <a:ext uri="{FF2B5EF4-FFF2-40B4-BE49-F238E27FC236}">
-                <a16:creationId xmlns:a16="http://schemas.microsoft.com/office/drawing/2014/main" id="{E27CAFF2-1528-2140-95AE-1F086DAC6ACF}"/>
-              </a:ext>
-            </a:extLst>
-          </p:cNvPr>
-          <p:cNvCxnSpPr>
-            <a:stCxn id="56" idx="2"/>
-            <a:endCxn id="41" idx="0"/>
-          </p:cNvCxnSpPr>
-          <p:nvPr/>
-        </p:nvCxnSpPr>
-        <p:spPr>
-          <a:xfrm rot="16200000" flipH="1">
-            <a:off x="7180761" y="1410486"/>
-            <a:ext cx="283113" cy="2452634"/>
-          </a:xfrm>
-          <a:prstGeom prst="bentConnector3">
-            <a:avLst/>
-          </a:prstGeom>
-          <a:ln>
-            <a:tailEnd type="triangle"/>
-          </a:ln>
-        </p:spPr>
-        <p:style>
-          <a:lnRef idx="1">
-            <a:schemeClr val="accent1"/>
-          </a:lnRef>
-          <a:fillRef idx="0">
-            <a:schemeClr val="accent1"/>
-          </a:fillRef>
-          <a:effectRef idx="0">
-            <a:schemeClr val="accent1"/>
-          </a:effectRef>
-          <a:fontRef idx="minor">
-            <a:schemeClr val="tx1"/>
-          </a:fontRef>
-        </p:style>
-      </p:cxnSp>
       <p:cxnSp>
         <p:nvCxnSpPr>
           <p:cNvPr id="25" name="Elbow Connector 24">
@@ -8977,8 +8913,8 @@
         </p:nvCxnSpPr>
         <p:spPr>
           <a:xfrm rot="5400000">
-            <a:off x="3583989" y="266348"/>
-            <a:ext cx="283113" cy="4740910"/>
+            <a:off x="4079692" y="758683"/>
+            <a:ext cx="279744" cy="3752872"/>
           </a:xfrm>
           <a:prstGeom prst="bentConnector3">
             <a:avLst/>
@@ -9019,52 +8955,10 @@
         </p:nvCxnSpPr>
         <p:spPr>
           <a:xfrm rot="16200000" flipH="1">
-            <a:off x="8382128" y="209119"/>
-            <a:ext cx="283113" cy="4855368"/>
+            <a:off x="7724368" y="866879"/>
+            <a:ext cx="273005" cy="3529740"/>
           </a:xfrm>
           <a:prstGeom prst="bentConnector3">
-            <a:avLst/>
-          </a:prstGeom>
-          <a:ln>
-            <a:tailEnd type="triangle"/>
-          </a:ln>
-        </p:spPr>
-        <p:style>
-          <a:lnRef idx="1">
-            <a:schemeClr val="accent1"/>
-          </a:lnRef>
-          <a:fillRef idx="0">
-            <a:schemeClr val="accent1"/>
-          </a:fillRef>
-          <a:effectRef idx="0">
-            <a:schemeClr val="accent1"/>
-          </a:effectRef>
-          <a:fontRef idx="minor">
-            <a:schemeClr val="tx1"/>
-          </a:fontRef>
-        </p:style>
-      </p:cxnSp>
-      <p:cxnSp>
-        <p:nvCxnSpPr>
-          <p:cNvPr id="30" name="Straight Arrow Connector 29">
-            <a:extLst>
-              <a:ext uri="{FF2B5EF4-FFF2-40B4-BE49-F238E27FC236}">
-                <a16:creationId xmlns:a16="http://schemas.microsoft.com/office/drawing/2014/main" id="{B33A5E8F-FE53-264A-90AB-ED91905E11E6}"/>
-              </a:ext>
-            </a:extLst>
-          </p:cNvPr>
-          <p:cNvCxnSpPr>
-            <a:stCxn id="41" idx="2"/>
-            <a:endCxn id="54" idx="0"/>
-          </p:cNvCxnSpPr>
-          <p:nvPr/>
-        </p:nvCxnSpPr>
-        <p:spPr>
-          <a:xfrm flipH="1">
-            <a:off x="8546412" y="3137955"/>
-            <a:ext cx="2222" cy="265525"/>
-          </a:xfrm>
-          <a:prstGeom prst="straightConnector1">
             <a:avLst/>
           </a:prstGeom>
           <a:ln>
@@ -9130,48 +9024,6 @@
       </p:cxnSp>
       <p:cxnSp>
         <p:nvCxnSpPr>
-          <p:cNvPr id="55" name="Straight Arrow Connector 54">
-            <a:extLst>
-              <a:ext uri="{FF2B5EF4-FFF2-40B4-BE49-F238E27FC236}">
-                <a16:creationId xmlns:a16="http://schemas.microsoft.com/office/drawing/2014/main" id="{34A0317E-B4EA-1E4E-B964-52CCBA8B91B0}"/>
-              </a:ext>
-            </a:extLst>
-          </p:cNvPr>
-          <p:cNvCxnSpPr>
-            <a:stCxn id="38" idx="2"/>
-            <a:endCxn id="50" idx="0"/>
-          </p:cNvCxnSpPr>
-          <p:nvPr/>
-        </p:nvCxnSpPr>
-        <p:spPr>
-          <a:xfrm>
-            <a:off x="3659596" y="3137955"/>
-            <a:ext cx="5000" cy="272263"/>
-          </a:xfrm>
-          <a:prstGeom prst="straightConnector1">
-            <a:avLst/>
-          </a:prstGeom>
-          <a:ln>
-            <a:tailEnd type="triangle"/>
-          </a:ln>
-        </p:spPr>
-        <p:style>
-          <a:lnRef idx="1">
-            <a:schemeClr val="accent1"/>
-          </a:lnRef>
-          <a:fillRef idx="0">
-            <a:schemeClr val="accent1"/>
-          </a:fillRef>
-          <a:effectRef idx="0">
-            <a:schemeClr val="accent1"/>
-          </a:effectRef>
-          <a:fontRef idx="minor">
-            <a:schemeClr val="tx1"/>
-          </a:fontRef>
-        </p:style>
-      </p:cxnSp>
-      <p:cxnSp>
-        <p:nvCxnSpPr>
           <p:cNvPr id="58" name="Straight Arrow Connector 57">
             <a:extLst>
               <a:ext uri="{FF2B5EF4-FFF2-40B4-BE49-F238E27FC236}">
@@ -9186,7 +9038,7 @@
         </p:nvCxnSpPr>
         <p:spPr>
           <a:xfrm>
-            <a:off x="1355090" y="3137955"/>
+            <a:off x="2343128" y="3134586"/>
             <a:ext cx="0" cy="265525"/>
           </a:xfrm>
           <a:prstGeom prst="straightConnector1">

</xml_diff>

<commit_message>
Generated pdfs of project file flow diagram for README
</commit_message>
<xml_diff>
--- a/images/project_file_flow_diagram.pptx
+++ b/images/project_file_flow_diagram.pptx
@@ -210,7 +210,7 @@
           <a:p>
             <a:fld id="{8FE2B474-E812-5843-ACE1-440DA6EE3C7C}" type="datetimeFigureOut">
               <a:rPr lang="en-US" smtClean="0"/>
-              <a:t>11/19/18</a:t>
+              <a:t>12/9/18</a:t>
             </a:fld>
             <a:endParaRPr lang="en-US"/>
           </a:p>
@@ -792,7 +792,7 @@
           <a:p>
             <a:fld id="{50C38AD0-C4FF-AF45-A138-96117B098541}" type="datetimeFigureOut">
               <a:rPr lang="en-US" smtClean="0"/>
-              <a:t>11/19/18</a:t>
+              <a:t>12/9/18</a:t>
             </a:fld>
             <a:endParaRPr lang="en-US"/>
           </a:p>
@@ -990,7 +990,7 @@
           <a:p>
             <a:fld id="{50C38AD0-C4FF-AF45-A138-96117B098541}" type="datetimeFigureOut">
               <a:rPr lang="en-US" smtClean="0"/>
-              <a:t>11/19/18</a:t>
+              <a:t>12/9/18</a:t>
             </a:fld>
             <a:endParaRPr lang="en-US"/>
           </a:p>
@@ -1198,7 +1198,7 @@
           <a:p>
             <a:fld id="{50C38AD0-C4FF-AF45-A138-96117B098541}" type="datetimeFigureOut">
               <a:rPr lang="en-US" smtClean="0"/>
-              <a:t>11/19/18</a:t>
+              <a:t>12/9/18</a:t>
             </a:fld>
             <a:endParaRPr lang="en-US"/>
           </a:p>
@@ -1396,7 +1396,7 @@
           <a:p>
             <a:fld id="{50C38AD0-C4FF-AF45-A138-96117B098541}" type="datetimeFigureOut">
               <a:rPr lang="en-US" smtClean="0"/>
-              <a:t>11/19/18</a:t>
+              <a:t>12/9/18</a:t>
             </a:fld>
             <a:endParaRPr lang="en-US"/>
           </a:p>
@@ -1671,7 +1671,7 @@
           <a:p>
             <a:fld id="{50C38AD0-C4FF-AF45-A138-96117B098541}" type="datetimeFigureOut">
               <a:rPr lang="en-US" smtClean="0"/>
-              <a:t>11/19/18</a:t>
+              <a:t>12/9/18</a:t>
             </a:fld>
             <a:endParaRPr lang="en-US"/>
           </a:p>
@@ -1936,7 +1936,7 @@
           <a:p>
             <a:fld id="{50C38AD0-C4FF-AF45-A138-96117B098541}" type="datetimeFigureOut">
               <a:rPr lang="en-US" smtClean="0"/>
-              <a:t>11/19/18</a:t>
+              <a:t>12/9/18</a:t>
             </a:fld>
             <a:endParaRPr lang="en-US"/>
           </a:p>
@@ -2348,7 +2348,7 @@
           <a:p>
             <a:fld id="{50C38AD0-C4FF-AF45-A138-96117B098541}" type="datetimeFigureOut">
               <a:rPr lang="en-US" smtClean="0"/>
-              <a:t>11/19/18</a:t>
+              <a:t>12/9/18</a:t>
             </a:fld>
             <a:endParaRPr lang="en-US"/>
           </a:p>
@@ -2489,7 +2489,7 @@
           <a:p>
             <a:fld id="{50C38AD0-C4FF-AF45-A138-96117B098541}" type="datetimeFigureOut">
               <a:rPr lang="en-US" smtClean="0"/>
-              <a:t>11/19/18</a:t>
+              <a:t>12/9/18</a:t>
             </a:fld>
             <a:endParaRPr lang="en-US"/>
           </a:p>
@@ -2602,7 +2602,7 @@
           <a:p>
             <a:fld id="{50C38AD0-C4FF-AF45-A138-96117B098541}" type="datetimeFigureOut">
               <a:rPr lang="en-US" smtClean="0"/>
-              <a:t>11/19/18</a:t>
+              <a:t>12/9/18</a:t>
             </a:fld>
             <a:endParaRPr lang="en-US"/>
           </a:p>
@@ -2913,7 +2913,7 @@
           <a:p>
             <a:fld id="{50C38AD0-C4FF-AF45-A138-96117B098541}" type="datetimeFigureOut">
               <a:rPr lang="en-US" smtClean="0"/>
-              <a:t>11/19/18</a:t>
+              <a:t>12/9/18</a:t>
             </a:fld>
             <a:endParaRPr lang="en-US"/>
           </a:p>
@@ -3201,7 +3201,7 @@
           <a:p>
             <a:fld id="{50C38AD0-C4FF-AF45-A138-96117B098541}" type="datetimeFigureOut">
               <a:rPr lang="en-US" smtClean="0"/>
-              <a:t>11/19/18</a:t>
+              <a:t>12/9/18</a:t>
             </a:fld>
             <a:endParaRPr lang="en-US"/>
           </a:p>
@@ -3442,7 +3442,7 @@
           <a:p>
             <a:fld id="{50C38AD0-C4FF-AF45-A138-96117B098541}" type="datetimeFigureOut">
               <a:rPr lang="en-US" smtClean="0"/>
-              <a:t>11/19/18</a:t>
+              <a:t>12/9/18</a:t>
             </a:fld>
             <a:endParaRPr lang="en-US"/>
           </a:p>
@@ -4002,47 +4002,6 @@
                 <a:schemeClr val="tx1"/>
               </a:solidFill>
             </a:endParaRPr>
-          </a:p>
-        </p:txBody>
-      </p:sp>
-      <p:sp>
-        <p:nvSpPr>
-          <p:cNvPr id="52" name="TextBox 51">
-            <a:extLst>
-              <a:ext uri="{FF2B5EF4-FFF2-40B4-BE49-F238E27FC236}">
-                <a16:creationId xmlns:a16="http://schemas.microsoft.com/office/drawing/2014/main" id="{243B2E37-9861-2F40-B61A-3C73ACEEB57D}"/>
-              </a:ext>
-            </a:extLst>
-          </p:cNvPr>
-          <p:cNvSpPr txBox="1"/>
-          <p:nvPr/>
-        </p:nvSpPr>
-        <p:spPr>
-          <a:xfrm>
-            <a:off x="0" y="190453"/>
-            <a:ext cx="297950" cy="261610"/>
-          </a:xfrm>
-          <a:prstGeom prst="rect">
-            <a:avLst/>
-          </a:prstGeom>
-          <a:noFill/>
-          <a:ln>
-            <a:solidFill>
-              <a:schemeClr val="tx1"/>
-            </a:solidFill>
-          </a:ln>
-        </p:spPr>
-        <p:txBody>
-          <a:bodyPr wrap="square" rtlCol="0">
-            <a:spAutoFit/>
-          </a:bodyPr>
-          <a:lstStyle/>
-          <a:p>
-            <a:pPr algn="ctr"/>
-            <a:r>
-              <a:rPr lang="en-US" sz="1100" dirty="0"/>
-              <a:t>1</a:t>
-            </a:r>
           </a:p>
         </p:txBody>
       </p:sp>

</xml_diff>